<commit_message>
inserting domains and real world impacts
</commit_message>
<xml_diff>
--- a/Microservices Overview.pptx
+++ b/Microservices Overview.pptx
@@ -7,6 +7,23 @@
   <p:sldIdLst>
     <p:sldId id="256" r:id="rId2"/>
     <p:sldId id="257" r:id="rId3"/>
+    <p:sldId id="263" r:id="rId4"/>
+    <p:sldId id="264" r:id="rId5"/>
+    <p:sldId id="265" r:id="rId6"/>
+    <p:sldId id="266" r:id="rId7"/>
+    <p:sldId id="267" r:id="rId8"/>
+    <p:sldId id="268" r:id="rId9"/>
+    <p:sldId id="269" r:id="rId10"/>
+    <p:sldId id="270" r:id="rId11"/>
+    <p:sldId id="271" r:id="rId12"/>
+    <p:sldId id="272" r:id="rId13"/>
+    <p:sldId id="273" r:id="rId14"/>
+    <p:sldId id="274" r:id="rId15"/>
+    <p:sldId id="258" r:id="rId16"/>
+    <p:sldId id="262" r:id="rId17"/>
+    <p:sldId id="260" r:id="rId18"/>
+    <p:sldId id="259" r:id="rId19"/>
+    <p:sldId id="261" r:id="rId20"/>
   </p:sldIdLst>
   <p:sldSz cx="12192000" cy="6858000"/>
   <p:notesSz cx="6858000" cy="9144000"/>
@@ -105,6 +122,42 @@
       </a:defRPr>
     </a:lvl9pPr>
   </p:defaultTextStyle>
+  <p:extLst>
+    <p:ext uri="{521415D9-36F7-43E2-AB2F-B90AF26B5E84}">
+      <p14:sectionLst xmlns:p14="http://schemas.microsoft.com/office/powerpoint/2010/main">
+        <p14:section name="Default Section" id="{0228FF79-4C01-4694-A2EC-A89D196705CF}">
+          <p14:sldIdLst>
+            <p14:sldId id="256"/>
+            <p14:sldId id="257"/>
+          </p14:sldIdLst>
+        </p14:section>
+        <p14:section name="Microservices architectural approach" id="{437C8F33-37E2-4A27-BE81-D5098B017A47}">
+          <p14:sldIdLst>
+            <p14:sldId id="263"/>
+            <p14:sldId id="264"/>
+            <p14:sldId id="265"/>
+            <p14:sldId id="266"/>
+            <p14:sldId id="267"/>
+            <p14:sldId id="268"/>
+            <p14:sldId id="269"/>
+            <p14:sldId id="270"/>
+            <p14:sldId id="271"/>
+            <p14:sldId id="272"/>
+            <p14:sldId id="273"/>
+            <p14:sldId id="274"/>
+            <p14:sldId id="258"/>
+            <p14:sldId id="262"/>
+            <p14:sldId id="260"/>
+            <p14:sldId id="259"/>
+            <p14:sldId id="261"/>
+          </p14:sldIdLst>
+        </p14:section>
+      </p14:sectionLst>
+    </p:ext>
+    <p:ext uri="{EFAFB233-063F-42B5-8137-9DF3F51BA10A}">
+      <p15:sldGuideLst xmlns:p15="http://schemas.microsoft.com/office/powerpoint/2012/main"/>
+    </p:ext>
+  </p:extLst>
 </p:presentation>
 </file>
 
@@ -294,7 +347,7 @@
           <a:p>
             <a:fld id="{4AAD347D-5ACD-4C99-B74B-A9C85AD731AF}" type="datetimeFigureOut">
               <a:rPr lang="en-US" dirty="0"/>
-              <a:t>5/8/2015</a:t>
+              <a:t>5/9/2015</a:t>
             </a:fld>
             <a:endParaRPr lang="en-US" dirty="0"/>
           </a:p>
@@ -564,7 +617,7 @@
           <a:p>
             <a:fld id="{4509A250-FF31-4206-8172-F9D3106AACB1}" type="datetimeFigureOut">
               <a:rPr lang="en-US" dirty="0"/>
-              <a:t>5/8/2015</a:t>
+              <a:t>5/9/2015</a:t>
             </a:fld>
             <a:endParaRPr lang="en-US" dirty="0"/>
           </a:p>
@@ -753,7 +806,7 @@
           <a:p>
             <a:fld id="{4509A250-FF31-4206-8172-F9D3106AACB1}" type="datetimeFigureOut">
               <a:rPr lang="en-US" dirty="0"/>
-              <a:t>5/8/2015</a:t>
+              <a:t>5/9/2015</a:t>
             </a:fld>
             <a:endParaRPr lang="en-US" dirty="0"/>
           </a:p>
@@ -1021,7 +1074,7 @@
           <a:p>
             <a:fld id="{4509A250-FF31-4206-8172-F9D3106AACB1}" type="datetimeFigureOut">
               <a:rPr lang="en-US" dirty="0"/>
-              <a:t>5/8/2015</a:t>
+              <a:t>5/9/2015</a:t>
             </a:fld>
             <a:endParaRPr lang="en-US" dirty="0"/>
           </a:p>
@@ -1357,7 +1410,7 @@
           <a:p>
             <a:fld id="{4509A250-FF31-4206-8172-F9D3106AACB1}" type="datetimeFigureOut">
               <a:rPr lang="en-US" dirty="0"/>
-              <a:t>5/8/2015</a:t>
+              <a:t>5/9/2015</a:t>
             </a:fld>
             <a:endParaRPr lang="en-US" dirty="0"/>
           </a:p>
@@ -1975,7 +2028,7 @@
           <a:p>
             <a:fld id="{4509A250-FF31-4206-8172-F9D3106AACB1}" type="datetimeFigureOut">
               <a:rPr lang="en-US" dirty="0"/>
-              <a:t>5/8/2015</a:t>
+              <a:t>5/9/2015</a:t>
             </a:fld>
             <a:endParaRPr lang="en-US" dirty="0"/>
           </a:p>
@@ -2830,7 +2883,7 @@
           <a:p>
             <a:fld id="{4509A250-FF31-4206-8172-F9D3106AACB1}" type="datetimeFigureOut">
               <a:rPr lang="en-US" dirty="0"/>
-              <a:t>5/8/2015</a:t>
+              <a:t>5/9/2015</a:t>
             </a:fld>
             <a:endParaRPr lang="en-US" dirty="0"/>
           </a:p>
@@ -2995,7 +3048,7 @@
           <a:p>
             <a:fld id="{4509A250-FF31-4206-8172-F9D3106AACB1}" type="datetimeFigureOut">
               <a:rPr lang="en-US" dirty="0"/>
-              <a:t>5/8/2015</a:t>
+              <a:t>5/9/2015</a:t>
             </a:fld>
             <a:endParaRPr lang="en-US" dirty="0"/>
           </a:p>
@@ -3170,7 +3223,7 @@
           <a:p>
             <a:fld id="{4509A250-FF31-4206-8172-F9D3106AACB1}" type="datetimeFigureOut">
               <a:rPr lang="en-US" dirty="0"/>
-              <a:t>5/8/2015</a:t>
+              <a:t>5/9/2015</a:t>
             </a:fld>
             <a:endParaRPr lang="en-US" dirty="0"/>
           </a:p>
@@ -3335,7 +3388,7 @@
           <a:p>
             <a:fld id="{4509A250-FF31-4206-8172-F9D3106AACB1}" type="datetimeFigureOut">
               <a:rPr lang="en-US" dirty="0"/>
-              <a:t>5/8/2015</a:t>
+              <a:t>5/9/2015</a:t>
             </a:fld>
             <a:endParaRPr lang="en-US" dirty="0"/>
           </a:p>
@@ -3577,7 +3630,7 @@
           <a:p>
             <a:fld id="{9796027F-7875-4030-9381-8BD8C4F21935}" type="datetimeFigureOut">
               <a:rPr lang="en-US" dirty="0"/>
-              <a:t>5/8/2015</a:t>
+              <a:t>5/9/2015</a:t>
             </a:fld>
             <a:endParaRPr lang="en-US" dirty="0"/>
           </a:p>
@@ -3864,7 +3917,7 @@
           <a:p>
             <a:fld id="{9796027F-7875-4030-9381-8BD8C4F21935}" type="datetimeFigureOut">
               <a:rPr lang="en-US" dirty="0"/>
-              <a:t>5/8/2015</a:t>
+              <a:t>5/9/2015</a:t>
             </a:fld>
             <a:endParaRPr lang="en-US" dirty="0"/>
           </a:p>
@@ -4303,7 +4356,7 @@
           <a:p>
             <a:fld id="{9796027F-7875-4030-9381-8BD8C4F21935}" type="datetimeFigureOut">
               <a:rPr lang="en-US" dirty="0"/>
-              <a:t>5/8/2015</a:t>
+              <a:t>5/9/2015</a:t>
             </a:fld>
             <a:endParaRPr lang="en-US" dirty="0"/>
           </a:p>
@@ -4416,7 +4469,7 @@
           <a:p>
             <a:fld id="{4509A250-FF31-4206-8172-F9D3106AACB1}" type="datetimeFigureOut">
               <a:rPr lang="en-US" dirty="0"/>
-              <a:t>5/8/2015</a:t>
+              <a:t>5/9/2015</a:t>
             </a:fld>
             <a:endParaRPr lang="en-US" dirty="0"/>
           </a:p>
@@ -4506,7 +4559,7 @@
           <a:p>
             <a:fld id="{4509A250-FF31-4206-8172-F9D3106AACB1}" type="datetimeFigureOut">
               <a:rPr lang="en-US" dirty="0"/>
-              <a:t>5/8/2015</a:t>
+              <a:t>5/9/2015</a:t>
             </a:fld>
             <a:endParaRPr lang="en-US" dirty="0"/>
           </a:p>
@@ -4780,7 +4833,7 @@
           <a:p>
             <a:fld id="{4509A250-FF31-4206-8172-F9D3106AACB1}" type="datetimeFigureOut">
               <a:rPr lang="en-US" dirty="0"/>
-              <a:t>5/8/2015</a:t>
+              <a:t>5/9/2015</a:t>
             </a:fld>
             <a:endParaRPr lang="en-US" dirty="0"/>
           </a:p>
@@ -5050,7 +5103,7 @@
           <a:p>
             <a:fld id="{4509A250-FF31-4206-8172-F9D3106AACB1}" type="datetimeFigureOut">
               <a:rPr lang="en-US" dirty="0"/>
-              <a:t>5/8/2015</a:t>
+              <a:t>5/9/2015</a:t>
             </a:fld>
             <a:endParaRPr lang="en-US" dirty="0"/>
           </a:p>
@@ -5474,7 +5527,7 @@
           <a:p>
             <a:fld id="{4AAD347D-5ACD-4C99-B74B-A9C85AD731AF}" type="datetimeFigureOut">
               <a:rPr lang="en-US" dirty="0"/>
-              <a:t>5/8/2015</a:t>
+              <a:t>5/9/2015</a:t>
             </a:fld>
             <a:endParaRPr lang="en-US" dirty="0"/>
           </a:p>
@@ -6038,8 +6091,9 @@
           <a:p>
             <a:r>
               <a:rPr lang="en-US" dirty="0" smtClean="0"/>
-              <a:t>Ralph Squillace</a:t>
-            </a:r>
+              <a:t>And domain-driven design (DDD)</a:t>
+            </a:r>
+            <a:endParaRPr lang="en-US" dirty="0" smtClean="0"/>
           </a:p>
           <a:p>
             <a:r>
@@ -6060,6 +6114,1075 @@
   <p:clrMapOvr>
     <a:masterClrMapping/>
   </p:clrMapOvr>
+  <p:timing>
+    <p:tnLst>
+      <p:par>
+        <p:cTn id="1" dur="indefinite" restart="never" nodeType="tmRoot"/>
+      </p:par>
+    </p:tnLst>
+  </p:timing>
+</p:sld>
+</file>
+
+<file path=ppt/slides/slide10.xml><?xml version="1.0" encoding="utf-8"?>
+<p:sld xmlns:a="http://schemas.openxmlformats.org/drawingml/2006/main" xmlns:r="http://schemas.openxmlformats.org/officeDocument/2006/relationships" xmlns:p="http://schemas.openxmlformats.org/presentationml/2006/main">
+  <p:cSld>
+    <p:spTree>
+      <p:nvGrpSpPr>
+        <p:cNvPr id="1" name=""/>
+        <p:cNvGrpSpPr/>
+        <p:nvPr/>
+      </p:nvGrpSpPr>
+      <p:grpSpPr>
+        <a:xfrm>
+          <a:off x="0" y="0"/>
+          <a:ext cx="0" cy="0"/>
+          <a:chOff x="0" y="0"/>
+          <a:chExt cx="0" cy="0"/>
+        </a:xfrm>
+      </p:grpSpPr>
+      <p:sp>
+        <p:nvSpPr>
+          <p:cNvPr id="2" name="Title 1"/>
+          <p:cNvSpPr>
+            <a:spLocks noGrp="1"/>
+          </p:cNvSpPr>
+          <p:nvPr>
+            <p:ph type="title"/>
+          </p:nvPr>
+        </p:nvSpPr>
+        <p:spPr/>
+        <p:txBody>
+          <a:bodyPr/>
+          <a:lstStyle/>
+          <a:p>
+            <a:r>
+              <a:rPr lang="en-US" dirty="0" smtClean="0"/>
+              <a:t>Implications for humans</a:t>
+            </a:r>
+            <a:endParaRPr lang="en-US" dirty="0"/>
+          </a:p>
+        </p:txBody>
+      </p:sp>
+      <p:sp>
+        <p:nvSpPr>
+          <p:cNvPr id="3" name="Content Placeholder 2"/>
+          <p:cNvSpPr>
+            <a:spLocks noGrp="1"/>
+          </p:cNvSpPr>
+          <p:nvPr>
+            <p:ph idx="1"/>
+          </p:nvPr>
+        </p:nvSpPr>
+        <p:spPr/>
+        <p:txBody>
+          <a:bodyPr/>
+          <a:lstStyle/>
+          <a:p>
+            <a:r>
+              <a:rPr lang="en-US" dirty="0" smtClean="0"/>
+              <a:t>Ah, execution. Tough stuff.</a:t>
+            </a:r>
+          </a:p>
+        </p:txBody>
+      </p:sp>
+    </p:spTree>
+    <p:extLst>
+      <p:ext uri="{BB962C8B-B14F-4D97-AF65-F5344CB8AC3E}">
+        <p14:creationId xmlns:p14="http://schemas.microsoft.com/office/powerpoint/2010/main" val="3061661963"/>
+      </p:ext>
+    </p:extLst>
+  </p:cSld>
+  <p:clrMapOvr>
+    <a:masterClrMapping/>
+  </p:clrMapOvr>
+  <p:timing>
+    <p:tnLst>
+      <p:par>
+        <p:cTn id="1" dur="indefinite" restart="never" nodeType="tmRoot"/>
+      </p:par>
+    </p:tnLst>
+  </p:timing>
+</p:sld>
+</file>
+
+<file path=ppt/slides/slide11.xml><?xml version="1.0" encoding="utf-8"?>
+<p:sld xmlns:a="http://schemas.openxmlformats.org/drawingml/2006/main" xmlns:r="http://schemas.openxmlformats.org/officeDocument/2006/relationships" xmlns:p="http://schemas.openxmlformats.org/presentationml/2006/main">
+  <p:cSld>
+    <p:spTree>
+      <p:nvGrpSpPr>
+        <p:cNvPr id="1" name=""/>
+        <p:cNvGrpSpPr/>
+        <p:nvPr/>
+      </p:nvGrpSpPr>
+      <p:grpSpPr>
+        <a:xfrm>
+          <a:off x="0" y="0"/>
+          <a:ext cx="0" cy="0"/>
+          <a:chOff x="0" y="0"/>
+          <a:chExt cx="0" cy="0"/>
+        </a:xfrm>
+      </p:grpSpPr>
+      <p:sp>
+        <p:nvSpPr>
+          <p:cNvPr id="2" name="Title 1"/>
+          <p:cNvSpPr>
+            <a:spLocks noGrp="1"/>
+          </p:cNvSpPr>
+          <p:nvPr>
+            <p:ph type="title"/>
+          </p:nvPr>
+        </p:nvSpPr>
+        <p:spPr/>
+        <p:txBody>
+          <a:bodyPr/>
+          <a:lstStyle/>
+          <a:p>
+            <a:r>
+              <a:rPr lang="en-US" dirty="0" smtClean="0"/>
+              <a:t>Implications for humans</a:t>
+            </a:r>
+            <a:endParaRPr lang="en-US" dirty="0"/>
+          </a:p>
+        </p:txBody>
+      </p:sp>
+      <p:sp>
+        <p:nvSpPr>
+          <p:cNvPr id="3" name="Content Placeholder 2"/>
+          <p:cNvSpPr>
+            <a:spLocks noGrp="1"/>
+          </p:cNvSpPr>
+          <p:nvPr>
+            <p:ph idx="1"/>
+          </p:nvPr>
+        </p:nvSpPr>
+        <p:spPr/>
+        <p:txBody>
+          <a:bodyPr/>
+          <a:lstStyle/>
+          <a:p>
+            <a:r>
+              <a:rPr lang="en-US" dirty="0"/>
+              <a:t>Developers think they gain impact; they’re right. They also gain complete responsibility for failure.</a:t>
+            </a:r>
+          </a:p>
+        </p:txBody>
+      </p:sp>
+    </p:spTree>
+    <p:extLst>
+      <p:ext uri="{BB962C8B-B14F-4D97-AF65-F5344CB8AC3E}">
+        <p14:creationId xmlns:p14="http://schemas.microsoft.com/office/powerpoint/2010/main" val="4179829595"/>
+      </p:ext>
+    </p:extLst>
+  </p:cSld>
+  <p:clrMapOvr>
+    <a:masterClrMapping/>
+  </p:clrMapOvr>
+  <p:timing>
+    <p:tnLst>
+      <p:par>
+        <p:cTn id="1" dur="indefinite" restart="never" nodeType="tmRoot"/>
+      </p:par>
+    </p:tnLst>
+  </p:timing>
+</p:sld>
+</file>
+
+<file path=ppt/slides/slide12.xml><?xml version="1.0" encoding="utf-8"?>
+<p:sld xmlns:a="http://schemas.openxmlformats.org/drawingml/2006/main" xmlns:r="http://schemas.openxmlformats.org/officeDocument/2006/relationships" xmlns:p="http://schemas.openxmlformats.org/presentationml/2006/main">
+  <p:cSld>
+    <p:spTree>
+      <p:nvGrpSpPr>
+        <p:cNvPr id="1" name=""/>
+        <p:cNvGrpSpPr/>
+        <p:nvPr/>
+      </p:nvGrpSpPr>
+      <p:grpSpPr>
+        <a:xfrm>
+          <a:off x="0" y="0"/>
+          <a:ext cx="0" cy="0"/>
+          <a:chOff x="0" y="0"/>
+          <a:chExt cx="0" cy="0"/>
+        </a:xfrm>
+      </p:grpSpPr>
+      <p:sp>
+        <p:nvSpPr>
+          <p:cNvPr id="2" name="Title 1"/>
+          <p:cNvSpPr>
+            <a:spLocks noGrp="1"/>
+          </p:cNvSpPr>
+          <p:nvPr>
+            <p:ph type="title"/>
+          </p:nvPr>
+        </p:nvSpPr>
+        <p:spPr/>
+        <p:txBody>
+          <a:bodyPr/>
+          <a:lstStyle/>
+          <a:p>
+            <a:r>
+              <a:rPr lang="en-US" dirty="0" smtClean="0"/>
+              <a:t>Implications for humans</a:t>
+            </a:r>
+            <a:endParaRPr lang="en-US" dirty="0"/>
+          </a:p>
+        </p:txBody>
+      </p:sp>
+      <p:sp>
+        <p:nvSpPr>
+          <p:cNvPr id="3" name="Content Placeholder 2"/>
+          <p:cNvSpPr>
+            <a:spLocks noGrp="1"/>
+          </p:cNvSpPr>
+          <p:nvPr>
+            <p:ph idx="1"/>
+          </p:nvPr>
+        </p:nvSpPr>
+        <p:spPr/>
+        <p:txBody>
+          <a:bodyPr/>
+          <a:lstStyle/>
+          <a:p>
+            <a:r>
+              <a:rPr lang="en-US" dirty="0" smtClean="0"/>
+              <a:t>Operations focused on hardware drops massively over the next five years.</a:t>
+            </a:r>
+          </a:p>
+          <a:p>
+            <a:r>
+              <a:rPr lang="en-US" dirty="0" smtClean="0"/>
+              <a:t>Operations focused on developing and managing software compute abstractions increases dramatically.</a:t>
+            </a:r>
+            <a:endParaRPr lang="en-US" dirty="0"/>
+          </a:p>
+        </p:txBody>
+      </p:sp>
+    </p:spTree>
+    <p:extLst>
+      <p:ext uri="{BB962C8B-B14F-4D97-AF65-F5344CB8AC3E}">
+        <p14:creationId xmlns:p14="http://schemas.microsoft.com/office/powerpoint/2010/main" val="1961395226"/>
+      </p:ext>
+    </p:extLst>
+  </p:cSld>
+  <p:clrMapOvr>
+    <a:masterClrMapping/>
+  </p:clrMapOvr>
+  <p:timing>
+    <p:tnLst>
+      <p:par>
+        <p:cTn id="1" dur="indefinite" restart="never" nodeType="tmRoot"/>
+      </p:par>
+    </p:tnLst>
+  </p:timing>
+</p:sld>
+</file>
+
+<file path=ppt/slides/slide13.xml><?xml version="1.0" encoding="utf-8"?>
+<p:sld xmlns:a="http://schemas.openxmlformats.org/drawingml/2006/main" xmlns:r="http://schemas.openxmlformats.org/officeDocument/2006/relationships" xmlns:p="http://schemas.openxmlformats.org/presentationml/2006/main">
+  <p:cSld>
+    <p:spTree>
+      <p:nvGrpSpPr>
+        <p:cNvPr id="1" name=""/>
+        <p:cNvGrpSpPr/>
+        <p:nvPr/>
+      </p:nvGrpSpPr>
+      <p:grpSpPr>
+        <a:xfrm>
+          <a:off x="0" y="0"/>
+          <a:ext cx="0" cy="0"/>
+          <a:chOff x="0" y="0"/>
+          <a:chExt cx="0" cy="0"/>
+        </a:xfrm>
+      </p:grpSpPr>
+      <p:sp>
+        <p:nvSpPr>
+          <p:cNvPr id="2" name="Title 1"/>
+          <p:cNvSpPr>
+            <a:spLocks noGrp="1"/>
+          </p:cNvSpPr>
+          <p:nvPr>
+            <p:ph type="title"/>
+          </p:nvPr>
+        </p:nvSpPr>
+        <p:spPr/>
+        <p:txBody>
+          <a:bodyPr/>
+          <a:lstStyle/>
+          <a:p>
+            <a:r>
+              <a:rPr lang="en-US" dirty="0" smtClean="0"/>
+              <a:t>Implications for humans</a:t>
+            </a:r>
+            <a:endParaRPr lang="en-US" dirty="0"/>
+          </a:p>
+        </p:txBody>
+      </p:sp>
+      <p:sp>
+        <p:nvSpPr>
+          <p:cNvPr id="3" name="Content Placeholder 2"/>
+          <p:cNvSpPr>
+            <a:spLocks noGrp="1"/>
+          </p:cNvSpPr>
+          <p:nvPr>
+            <p:ph idx="1"/>
+          </p:nvPr>
+        </p:nvSpPr>
+        <p:spPr/>
+        <p:txBody>
+          <a:bodyPr/>
+          <a:lstStyle/>
+          <a:p>
+            <a:r>
+              <a:rPr lang="en-US" dirty="0" smtClean="0"/>
+              <a:t>Architects focus on everything more and more. </a:t>
+            </a:r>
+          </a:p>
+          <a:p>
+            <a:r>
+              <a:rPr lang="en-US" dirty="0" smtClean="0"/>
+              <a:t>Datacenters are now </a:t>
+            </a:r>
+            <a:r>
+              <a:rPr lang="en-US" i="1" dirty="0" smtClean="0"/>
+              <a:t>programs</a:t>
+            </a:r>
+            <a:r>
+              <a:rPr lang="en-US" dirty="0" smtClean="0"/>
+              <a:t>. Programs in datacenters are programs running in programs.</a:t>
+            </a:r>
+            <a:endParaRPr lang="en-US" dirty="0"/>
+          </a:p>
+        </p:txBody>
+      </p:sp>
+    </p:spTree>
+    <p:extLst>
+      <p:ext uri="{BB962C8B-B14F-4D97-AF65-F5344CB8AC3E}">
+        <p14:creationId xmlns:p14="http://schemas.microsoft.com/office/powerpoint/2010/main" val="201479358"/>
+      </p:ext>
+    </p:extLst>
+  </p:cSld>
+  <p:clrMapOvr>
+    <a:masterClrMapping/>
+  </p:clrMapOvr>
+  <p:timing>
+    <p:tnLst>
+      <p:par>
+        <p:cTn id="1" dur="indefinite" restart="never" nodeType="tmRoot"/>
+      </p:par>
+    </p:tnLst>
+  </p:timing>
+</p:sld>
+</file>
+
+<file path=ppt/slides/slide14.xml><?xml version="1.0" encoding="utf-8"?>
+<p:sld xmlns:a="http://schemas.openxmlformats.org/drawingml/2006/main" xmlns:r="http://schemas.openxmlformats.org/officeDocument/2006/relationships" xmlns:p="http://schemas.openxmlformats.org/presentationml/2006/main">
+  <p:cSld>
+    <p:spTree>
+      <p:nvGrpSpPr>
+        <p:cNvPr id="1" name=""/>
+        <p:cNvGrpSpPr/>
+        <p:nvPr/>
+      </p:nvGrpSpPr>
+      <p:grpSpPr>
+        <a:xfrm>
+          <a:off x="0" y="0"/>
+          <a:ext cx="0" cy="0"/>
+          <a:chOff x="0" y="0"/>
+          <a:chExt cx="0" cy="0"/>
+        </a:xfrm>
+      </p:grpSpPr>
+      <p:sp>
+        <p:nvSpPr>
+          <p:cNvPr id="2" name="Title 1"/>
+          <p:cNvSpPr>
+            <a:spLocks noGrp="1"/>
+          </p:cNvSpPr>
+          <p:nvPr>
+            <p:ph type="title"/>
+          </p:nvPr>
+        </p:nvSpPr>
+        <p:spPr/>
+        <p:txBody>
+          <a:bodyPr/>
+          <a:lstStyle/>
+          <a:p>
+            <a:r>
+              <a:rPr lang="en-US" dirty="0" smtClean="0"/>
+              <a:t>Implications for humans</a:t>
+            </a:r>
+            <a:endParaRPr lang="en-US" dirty="0"/>
+          </a:p>
+        </p:txBody>
+      </p:sp>
+      <p:sp>
+        <p:nvSpPr>
+          <p:cNvPr id="3" name="Content Placeholder 2"/>
+          <p:cNvSpPr>
+            <a:spLocks noGrp="1"/>
+          </p:cNvSpPr>
+          <p:nvPr>
+            <p:ph idx="1"/>
+          </p:nvPr>
+        </p:nvSpPr>
+        <p:spPr>
+          <a:xfrm>
+            <a:off x="1103312" y="2052918"/>
+            <a:ext cx="8946541" cy="1044509"/>
+          </a:xfrm>
+        </p:spPr>
+        <p:txBody>
+          <a:bodyPr/>
+          <a:lstStyle/>
+          <a:p>
+            <a:r>
+              <a:rPr lang="en-US" dirty="0" smtClean="0"/>
+              <a:t>Because everyone has more focus on apps and infrastructures as apps, that means….</a:t>
+            </a:r>
+            <a:endParaRPr lang="en-US" dirty="0"/>
+          </a:p>
+        </p:txBody>
+      </p:sp>
+      <p:sp>
+        <p:nvSpPr>
+          <p:cNvPr id="4" name="TextBox 3"/>
+          <p:cNvSpPr txBox="1"/>
+          <p:nvPr/>
+        </p:nvSpPr>
+        <p:spPr>
+          <a:xfrm>
+            <a:off x="4324865" y="4069492"/>
+            <a:ext cx="4168346" cy="1200329"/>
+          </a:xfrm>
+          <a:prstGeom prst="rect">
+            <a:avLst/>
+          </a:prstGeom>
+          <a:noFill/>
+        </p:spPr>
+        <p:txBody>
+          <a:bodyPr wrap="square" rtlCol="0">
+            <a:spAutoFit/>
+          </a:bodyPr>
+          <a:lstStyle/>
+          <a:p>
+            <a:r>
+              <a:rPr lang="en-US" sz="7200" dirty="0" smtClean="0"/>
+              <a:t>Reorg!!!</a:t>
+            </a:r>
+            <a:endParaRPr lang="en-US" sz="7200" dirty="0"/>
+          </a:p>
+        </p:txBody>
+      </p:sp>
+    </p:spTree>
+    <p:extLst>
+      <p:ext uri="{BB962C8B-B14F-4D97-AF65-F5344CB8AC3E}">
+        <p14:creationId xmlns:p14="http://schemas.microsoft.com/office/powerpoint/2010/main" val="2576605311"/>
+      </p:ext>
+    </p:extLst>
+  </p:cSld>
+  <p:clrMapOvr>
+    <a:masterClrMapping/>
+  </p:clrMapOvr>
+  <p:timing>
+    <p:tnLst>
+      <p:par>
+        <p:cTn id="1" dur="indefinite" restart="never" nodeType="tmRoot">
+          <p:childTnLst>
+            <p:seq concurrent="1" nextAc="seek">
+              <p:cTn id="2" dur="indefinite" nodeType="mainSeq">
+                <p:childTnLst>
+                  <p:par>
+                    <p:cTn id="3" fill="hold">
+                      <p:stCondLst>
+                        <p:cond delay="indefinite"/>
+                      </p:stCondLst>
+                      <p:childTnLst>
+                        <p:par>
+                          <p:cTn id="4" fill="hold">
+                            <p:stCondLst>
+                              <p:cond delay="0"/>
+                            </p:stCondLst>
+                            <p:childTnLst>
+                              <p:par>
+                                <p:cTn id="5" presetID="10" presetClass="entr" presetSubtype="0" fill="hold" nodeType="clickEffect">
+                                  <p:stCondLst>
+                                    <p:cond delay="0"/>
+                                  </p:stCondLst>
+                                  <p:childTnLst>
+                                    <p:set>
+                                      <p:cBhvr>
+                                        <p:cTn id="6" dur="1" fill="hold">
+                                          <p:stCondLst>
+                                            <p:cond delay="0"/>
+                                          </p:stCondLst>
+                                        </p:cTn>
+                                        <p:tgtEl>
+                                          <p:spTgt spid="4">
+                                            <p:txEl>
+                                              <p:pRg st="0" end="0"/>
+                                            </p:txEl>
+                                          </p:spTgt>
+                                        </p:tgtEl>
+                                        <p:attrNameLst>
+                                          <p:attrName>style.visibility</p:attrName>
+                                        </p:attrNameLst>
+                                      </p:cBhvr>
+                                      <p:to>
+                                        <p:strVal val="visible"/>
+                                      </p:to>
+                                    </p:set>
+                                    <p:animEffect transition="in" filter="fade">
+                                      <p:cBhvr>
+                                        <p:cTn id="7" dur="500"/>
+                                        <p:tgtEl>
+                                          <p:spTgt spid="4">
+                                            <p:txEl>
+                                              <p:pRg st="0" end="0"/>
+                                            </p:txEl>
+                                          </p:spTgt>
+                                        </p:tgtEl>
+                                      </p:cBhvr>
+                                    </p:animEffect>
+                                  </p:childTnLst>
+                                </p:cTn>
+                              </p:par>
+                            </p:childTnLst>
+                          </p:cTn>
+                        </p:par>
+                      </p:childTnLst>
+                    </p:cTn>
+                  </p:par>
+                </p:childTnLst>
+              </p:cTn>
+              <p:prevCondLst>
+                <p:cond evt="onPrev" delay="0">
+                  <p:tgtEl>
+                    <p:sldTgt/>
+                  </p:tgtEl>
+                </p:cond>
+              </p:prevCondLst>
+              <p:nextCondLst>
+                <p:cond evt="onNext" delay="0">
+                  <p:tgtEl>
+                    <p:sldTgt/>
+                  </p:tgtEl>
+                </p:cond>
+              </p:nextCondLst>
+            </p:seq>
+          </p:childTnLst>
+        </p:cTn>
+      </p:par>
+    </p:tnLst>
+  </p:timing>
+</p:sld>
+</file>
+
+<file path=ppt/slides/slide15.xml><?xml version="1.0" encoding="utf-8"?>
+<p:sld xmlns:a="http://schemas.openxmlformats.org/drawingml/2006/main" xmlns:r="http://schemas.openxmlformats.org/officeDocument/2006/relationships" xmlns:p="http://schemas.openxmlformats.org/presentationml/2006/main">
+  <p:cSld>
+    <p:spTree>
+      <p:nvGrpSpPr>
+        <p:cNvPr id="1" name=""/>
+        <p:cNvGrpSpPr/>
+        <p:nvPr/>
+      </p:nvGrpSpPr>
+      <p:grpSpPr>
+        <a:xfrm>
+          <a:off x="0" y="0"/>
+          <a:ext cx="0" cy="0"/>
+          <a:chOff x="0" y="0"/>
+          <a:chExt cx="0" cy="0"/>
+        </a:xfrm>
+      </p:grpSpPr>
+      <p:sp>
+        <p:nvSpPr>
+          <p:cNvPr id="2" name="Title 1"/>
+          <p:cNvSpPr>
+            <a:spLocks noGrp="1"/>
+          </p:cNvSpPr>
+          <p:nvPr>
+            <p:ph type="title"/>
+          </p:nvPr>
+        </p:nvSpPr>
+        <p:spPr/>
+        <p:txBody>
+          <a:bodyPr/>
+          <a:lstStyle/>
+          <a:p>
+            <a:r>
+              <a:rPr lang="en-US" dirty="0" smtClean="0"/>
+              <a:t>Thing to </a:t>
+            </a:r>
+            <a:r>
+              <a:rPr lang="en-US" dirty="0" err="1" smtClean="0"/>
+              <a:t>grok</a:t>
+            </a:r>
+            <a:r>
+              <a:rPr lang="en-US" dirty="0" smtClean="0"/>
+              <a:t>: Throw it away, NOW.	</a:t>
+            </a:r>
+            <a:endParaRPr lang="en-US" dirty="0"/>
+          </a:p>
+        </p:txBody>
+      </p:sp>
+      <p:sp>
+        <p:nvSpPr>
+          <p:cNvPr id="3" name="Content Placeholder 2"/>
+          <p:cNvSpPr>
+            <a:spLocks noGrp="1"/>
+          </p:cNvSpPr>
+          <p:nvPr>
+            <p:ph idx="1"/>
+          </p:nvPr>
+        </p:nvSpPr>
+        <p:spPr/>
+        <p:txBody>
+          <a:bodyPr/>
+          <a:lstStyle/>
+          <a:p>
+            <a:r>
+              <a:rPr lang="en-US" dirty="0" smtClean="0"/>
+              <a:t>If the point of a bunch of services is independence and the ability to survive errors, then when there’s an error, collect what you need and throw it away. </a:t>
+            </a:r>
+          </a:p>
+          <a:p>
+            <a:pPr lvl="1"/>
+            <a:r>
+              <a:rPr lang="en-US" dirty="0" smtClean="0"/>
+              <a:t>NEVER connect to a service to manually debug. What are you thinking?</a:t>
+            </a:r>
+            <a:endParaRPr lang="en-US" dirty="0"/>
+          </a:p>
+        </p:txBody>
+      </p:sp>
+    </p:spTree>
+    <p:extLst>
+      <p:ext uri="{BB962C8B-B14F-4D97-AF65-F5344CB8AC3E}">
+        <p14:creationId xmlns:p14="http://schemas.microsoft.com/office/powerpoint/2010/main" val="981274950"/>
+      </p:ext>
+    </p:extLst>
+  </p:cSld>
+  <p:clrMapOvr>
+    <a:masterClrMapping/>
+  </p:clrMapOvr>
+  <p:timing>
+    <p:tnLst>
+      <p:par>
+        <p:cTn id="1" dur="indefinite" restart="never" nodeType="tmRoot"/>
+      </p:par>
+    </p:tnLst>
+  </p:timing>
+</p:sld>
+</file>
+
+<file path=ppt/slides/slide16.xml><?xml version="1.0" encoding="utf-8"?>
+<p:sld xmlns:a="http://schemas.openxmlformats.org/drawingml/2006/main" xmlns:r="http://schemas.openxmlformats.org/officeDocument/2006/relationships" xmlns:p="http://schemas.openxmlformats.org/presentationml/2006/main">
+  <p:cSld>
+    <p:spTree>
+      <p:nvGrpSpPr>
+        <p:cNvPr id="1" name=""/>
+        <p:cNvGrpSpPr/>
+        <p:nvPr/>
+      </p:nvGrpSpPr>
+      <p:grpSpPr>
+        <a:xfrm>
+          <a:off x="0" y="0"/>
+          <a:ext cx="0" cy="0"/>
+          <a:chOff x="0" y="0"/>
+          <a:chExt cx="0" cy="0"/>
+        </a:xfrm>
+      </p:grpSpPr>
+      <p:sp>
+        <p:nvSpPr>
+          <p:cNvPr id="2" name="Title 1"/>
+          <p:cNvSpPr>
+            <a:spLocks noGrp="1"/>
+          </p:cNvSpPr>
+          <p:nvPr>
+            <p:ph type="title"/>
+          </p:nvPr>
+        </p:nvSpPr>
+        <p:spPr/>
+        <p:txBody>
+          <a:bodyPr/>
+          <a:lstStyle/>
+          <a:p>
+            <a:r>
+              <a:rPr lang="en-US" dirty="0" smtClean="0"/>
+              <a:t>Thing to </a:t>
+            </a:r>
+            <a:r>
+              <a:rPr lang="en-US" dirty="0" err="1" smtClean="0"/>
+              <a:t>grok</a:t>
+            </a:r>
+            <a:r>
+              <a:rPr lang="en-US" dirty="0" smtClean="0"/>
+              <a:t>: any blocking call should be destroyed</a:t>
+            </a:r>
+            <a:endParaRPr lang="en-US" dirty="0"/>
+          </a:p>
+        </p:txBody>
+      </p:sp>
+      <p:sp>
+        <p:nvSpPr>
+          <p:cNvPr id="3" name="Content Placeholder 2"/>
+          <p:cNvSpPr>
+            <a:spLocks noGrp="1"/>
+          </p:cNvSpPr>
+          <p:nvPr>
+            <p:ph idx="1"/>
+          </p:nvPr>
+        </p:nvSpPr>
+        <p:spPr/>
+        <p:txBody>
+          <a:bodyPr/>
+          <a:lstStyle/>
+          <a:p>
+            <a:r>
+              <a:rPr lang="en-US" dirty="0" smtClean="0"/>
+              <a:t>Duh. Event driven.</a:t>
+            </a:r>
+            <a:endParaRPr lang="en-US" dirty="0"/>
+          </a:p>
+        </p:txBody>
+      </p:sp>
+    </p:spTree>
+    <p:extLst>
+      <p:ext uri="{BB962C8B-B14F-4D97-AF65-F5344CB8AC3E}">
+        <p14:creationId xmlns:p14="http://schemas.microsoft.com/office/powerpoint/2010/main" val="1752963072"/>
+      </p:ext>
+    </p:extLst>
+  </p:cSld>
+  <p:clrMapOvr>
+    <a:masterClrMapping/>
+  </p:clrMapOvr>
+  <p:timing>
+    <p:tnLst>
+      <p:par>
+        <p:cTn id="1" dur="indefinite" restart="never" nodeType="tmRoot"/>
+      </p:par>
+    </p:tnLst>
+  </p:timing>
+</p:sld>
+</file>
+
+<file path=ppt/slides/slide17.xml><?xml version="1.0" encoding="utf-8"?>
+<p:sld xmlns:a="http://schemas.openxmlformats.org/drawingml/2006/main" xmlns:r="http://schemas.openxmlformats.org/officeDocument/2006/relationships" xmlns:p="http://schemas.openxmlformats.org/presentationml/2006/main">
+  <p:cSld>
+    <p:spTree>
+      <p:nvGrpSpPr>
+        <p:cNvPr id="1" name=""/>
+        <p:cNvGrpSpPr/>
+        <p:nvPr/>
+      </p:nvGrpSpPr>
+      <p:grpSpPr>
+        <a:xfrm>
+          <a:off x="0" y="0"/>
+          <a:ext cx="0" cy="0"/>
+          <a:chOff x="0" y="0"/>
+          <a:chExt cx="0" cy="0"/>
+        </a:xfrm>
+      </p:grpSpPr>
+      <p:sp>
+        <p:nvSpPr>
+          <p:cNvPr id="2" name="Title 1"/>
+          <p:cNvSpPr>
+            <a:spLocks noGrp="1"/>
+          </p:cNvSpPr>
+          <p:nvPr>
+            <p:ph type="title"/>
+          </p:nvPr>
+        </p:nvSpPr>
+        <p:spPr/>
+        <p:txBody>
+          <a:bodyPr/>
+          <a:lstStyle/>
+          <a:p>
+            <a:r>
+              <a:rPr lang="en-US" dirty="0" smtClean="0"/>
+              <a:t>Things to </a:t>
+            </a:r>
+            <a:r>
+              <a:rPr lang="en-US" dirty="0" err="1" smtClean="0"/>
+              <a:t>grok</a:t>
+            </a:r>
+            <a:r>
+              <a:rPr lang="en-US" dirty="0" smtClean="0"/>
+              <a:t>: know </a:t>
+            </a:r>
+            <a:r>
+              <a:rPr lang="en-US" i="1" dirty="0" smtClean="0"/>
+              <a:t>precisely</a:t>
+            </a:r>
+            <a:r>
+              <a:rPr lang="en-US" dirty="0" smtClean="0"/>
+              <a:t> your </a:t>
+            </a:r>
+            <a:r>
+              <a:rPr lang="en-US" dirty="0" err="1" smtClean="0"/>
+              <a:t>microservice’s</a:t>
+            </a:r>
+            <a:r>
+              <a:rPr lang="en-US" dirty="0" smtClean="0"/>
+              <a:t> domain</a:t>
+            </a:r>
+            <a:endParaRPr lang="en-US" dirty="0"/>
+          </a:p>
+        </p:txBody>
+      </p:sp>
+      <p:sp>
+        <p:nvSpPr>
+          <p:cNvPr id="3" name="Content Placeholder 2"/>
+          <p:cNvSpPr>
+            <a:spLocks noGrp="1"/>
+          </p:cNvSpPr>
+          <p:nvPr>
+            <p:ph idx="1"/>
+          </p:nvPr>
+        </p:nvSpPr>
+        <p:spPr/>
+        <p:txBody>
+          <a:bodyPr/>
+          <a:lstStyle/>
+          <a:p>
+            <a:r>
+              <a:rPr lang="en-US" dirty="0" smtClean="0"/>
+              <a:t>This is, in essence, the ability to understand what you own and what you do not.</a:t>
+            </a:r>
+          </a:p>
+          <a:p>
+            <a:r>
+              <a:rPr lang="en-US" dirty="0" smtClean="0"/>
+              <a:t>*(and stick to it)</a:t>
+            </a:r>
+          </a:p>
+          <a:p>
+            <a:r>
+              <a:rPr lang="en-US" dirty="0" smtClean="0"/>
+              <a:t>NOT. SIMPLE.</a:t>
+            </a:r>
+          </a:p>
+          <a:p>
+            <a:r>
+              <a:rPr lang="en-US" dirty="0" smtClean="0"/>
+              <a:t>Means you might dabble in….</a:t>
+            </a:r>
+            <a:endParaRPr lang="en-US" dirty="0"/>
+          </a:p>
+        </p:txBody>
+      </p:sp>
+    </p:spTree>
+    <p:extLst>
+      <p:ext uri="{BB962C8B-B14F-4D97-AF65-F5344CB8AC3E}">
+        <p14:creationId xmlns:p14="http://schemas.microsoft.com/office/powerpoint/2010/main" val="3591277867"/>
+      </p:ext>
+    </p:extLst>
+  </p:cSld>
+  <p:clrMapOvr>
+    <a:masterClrMapping/>
+  </p:clrMapOvr>
+  <p:timing>
+    <p:tnLst>
+      <p:par>
+        <p:cTn id="1" dur="indefinite" restart="never" nodeType="tmRoot"/>
+      </p:par>
+    </p:tnLst>
+  </p:timing>
+</p:sld>
+</file>
+
+<file path=ppt/slides/slide18.xml><?xml version="1.0" encoding="utf-8"?>
+<p:sld xmlns:a="http://schemas.openxmlformats.org/drawingml/2006/main" xmlns:r="http://schemas.openxmlformats.org/officeDocument/2006/relationships" xmlns:p="http://schemas.openxmlformats.org/presentationml/2006/main">
+  <p:cSld>
+    <p:spTree>
+      <p:nvGrpSpPr>
+        <p:cNvPr id="1" name=""/>
+        <p:cNvGrpSpPr/>
+        <p:nvPr/>
+      </p:nvGrpSpPr>
+      <p:grpSpPr>
+        <a:xfrm>
+          <a:off x="0" y="0"/>
+          <a:ext cx="0" cy="0"/>
+          <a:chOff x="0" y="0"/>
+          <a:chExt cx="0" cy="0"/>
+        </a:xfrm>
+      </p:grpSpPr>
+      <p:sp>
+        <p:nvSpPr>
+          <p:cNvPr id="2" name="Title 1"/>
+          <p:cNvSpPr>
+            <a:spLocks noGrp="1"/>
+          </p:cNvSpPr>
+          <p:nvPr>
+            <p:ph type="title"/>
+          </p:nvPr>
+        </p:nvSpPr>
+        <p:spPr/>
+        <p:txBody>
+          <a:bodyPr/>
+          <a:lstStyle/>
+          <a:p>
+            <a:r>
+              <a:rPr lang="en-US" dirty="0" smtClean="0"/>
+              <a:t>Digression: Domain-driven design: DDD	</a:t>
+            </a:r>
+            <a:endParaRPr lang="en-US" dirty="0"/>
+          </a:p>
+        </p:txBody>
+      </p:sp>
+      <p:sp>
+        <p:nvSpPr>
+          <p:cNvPr id="3" name="Content Placeholder 2"/>
+          <p:cNvSpPr>
+            <a:spLocks noGrp="1"/>
+          </p:cNvSpPr>
+          <p:nvPr>
+            <p:ph idx="1"/>
+          </p:nvPr>
+        </p:nvSpPr>
+        <p:spPr/>
+        <p:txBody>
+          <a:bodyPr/>
+          <a:lstStyle/>
+          <a:p>
+            <a:endParaRPr lang="en-US"/>
+          </a:p>
+        </p:txBody>
+      </p:sp>
+    </p:spTree>
+    <p:extLst>
+      <p:ext uri="{BB962C8B-B14F-4D97-AF65-F5344CB8AC3E}">
+        <p14:creationId xmlns:p14="http://schemas.microsoft.com/office/powerpoint/2010/main" val="1192333209"/>
+      </p:ext>
+    </p:extLst>
+  </p:cSld>
+  <p:clrMapOvr>
+    <a:masterClrMapping/>
+  </p:clrMapOvr>
+  <p:timing>
+    <p:tnLst>
+      <p:par>
+        <p:cTn id="1" dur="indefinite" restart="never" nodeType="tmRoot"/>
+      </p:par>
+    </p:tnLst>
+  </p:timing>
+</p:sld>
+</file>
+
+<file path=ppt/slides/slide19.xml><?xml version="1.0" encoding="utf-8"?>
+<p:sld xmlns:a="http://schemas.openxmlformats.org/drawingml/2006/main" xmlns:r="http://schemas.openxmlformats.org/officeDocument/2006/relationships" xmlns:p="http://schemas.openxmlformats.org/presentationml/2006/main">
+  <p:cSld>
+    <p:spTree>
+      <p:nvGrpSpPr>
+        <p:cNvPr id="1" name=""/>
+        <p:cNvGrpSpPr/>
+        <p:nvPr/>
+      </p:nvGrpSpPr>
+      <p:grpSpPr>
+        <a:xfrm>
+          <a:off x="0" y="0"/>
+          <a:ext cx="0" cy="0"/>
+          <a:chOff x="0" y="0"/>
+          <a:chExt cx="0" cy="0"/>
+        </a:xfrm>
+      </p:grpSpPr>
+      <p:sp>
+        <p:nvSpPr>
+          <p:cNvPr id="2" name="Title 1"/>
+          <p:cNvSpPr>
+            <a:spLocks noGrp="1"/>
+          </p:cNvSpPr>
+          <p:nvPr>
+            <p:ph type="title"/>
+          </p:nvPr>
+        </p:nvSpPr>
+        <p:spPr/>
+        <p:txBody>
+          <a:bodyPr/>
+          <a:lstStyle/>
+          <a:p>
+            <a:r>
+              <a:rPr lang="en-US" dirty="0" smtClean="0"/>
+              <a:t>Things to </a:t>
+            </a:r>
+            <a:r>
+              <a:rPr lang="en-US" dirty="0" err="1" smtClean="0"/>
+              <a:t>grok</a:t>
+            </a:r>
+            <a:r>
+              <a:rPr lang="en-US" dirty="0" smtClean="0"/>
+              <a:t>: The app is everything at once</a:t>
+            </a:r>
+            <a:endParaRPr lang="en-US" dirty="0"/>
+          </a:p>
+        </p:txBody>
+      </p:sp>
+      <p:sp>
+        <p:nvSpPr>
+          <p:cNvPr id="3" name="Content Placeholder 2"/>
+          <p:cNvSpPr>
+            <a:spLocks noGrp="1"/>
+          </p:cNvSpPr>
+          <p:nvPr>
+            <p:ph idx="1"/>
+          </p:nvPr>
+        </p:nvSpPr>
+        <p:spPr/>
+        <p:txBody>
+          <a:bodyPr/>
+          <a:lstStyle/>
+          <a:p>
+            <a:r>
+              <a:rPr lang="en-US" dirty="0" smtClean="0"/>
+              <a:t>Two levels of architecture: </a:t>
+            </a:r>
+          </a:p>
+          <a:p>
+            <a:pPr lvl="1"/>
+            <a:r>
+              <a:rPr lang="en-US" dirty="0" err="1" smtClean="0"/>
+              <a:t>Microservices</a:t>
+            </a:r>
+            <a:r>
+              <a:rPr lang="en-US" dirty="0" smtClean="0"/>
+              <a:t> themselves</a:t>
+            </a:r>
+          </a:p>
+          <a:p>
+            <a:pPr lvl="1"/>
+            <a:r>
+              <a:rPr lang="en-US" dirty="0" smtClean="0"/>
+              <a:t>How all the </a:t>
+            </a:r>
+            <a:r>
+              <a:rPr lang="en-US" dirty="0" err="1" smtClean="0"/>
+              <a:t>microservices</a:t>
+            </a:r>
+            <a:r>
+              <a:rPr lang="en-US" dirty="0" smtClean="0"/>
+              <a:t> work together</a:t>
+            </a:r>
+            <a:endParaRPr lang="en-US" dirty="0"/>
+          </a:p>
+        </p:txBody>
+      </p:sp>
+    </p:spTree>
+    <p:extLst>
+      <p:ext uri="{BB962C8B-B14F-4D97-AF65-F5344CB8AC3E}">
+        <p14:creationId xmlns:p14="http://schemas.microsoft.com/office/powerpoint/2010/main" val="2659673164"/>
+      </p:ext>
+    </p:extLst>
+  </p:cSld>
+  <p:clrMapOvr>
+    <a:masterClrMapping/>
+  </p:clrMapOvr>
+  <p:timing>
+    <p:tnLst>
+      <p:par>
+        <p:cTn id="1" dur="indefinite" restart="never" nodeType="tmRoot"/>
+      </p:par>
+    </p:tnLst>
+  </p:timing>
 </p:sld>
 </file>
 
@@ -6150,6 +7273,869 @@
     <p:extLst>
       <p:ext uri="{BB962C8B-B14F-4D97-AF65-F5344CB8AC3E}">
         <p14:creationId xmlns:p14="http://schemas.microsoft.com/office/powerpoint/2010/main" val="184206870"/>
+      </p:ext>
+    </p:extLst>
+  </p:cSld>
+  <p:clrMapOvr>
+    <a:masterClrMapping/>
+  </p:clrMapOvr>
+  <p:timing>
+    <p:tnLst>
+      <p:par>
+        <p:cTn id="1" dur="indefinite" restart="never" nodeType="tmRoot"/>
+      </p:par>
+    </p:tnLst>
+  </p:timing>
+</p:sld>
+</file>
+
+<file path=ppt/slides/slide3.xml><?xml version="1.0" encoding="utf-8"?>
+<p:sld xmlns:a="http://schemas.openxmlformats.org/drawingml/2006/main" xmlns:r="http://schemas.openxmlformats.org/officeDocument/2006/relationships" xmlns:p="http://schemas.openxmlformats.org/presentationml/2006/main">
+  <p:cSld>
+    <p:spTree>
+      <p:nvGrpSpPr>
+        <p:cNvPr id="1" name=""/>
+        <p:cNvGrpSpPr/>
+        <p:nvPr/>
+      </p:nvGrpSpPr>
+      <p:grpSpPr>
+        <a:xfrm>
+          <a:off x="0" y="0"/>
+          <a:ext cx="0" cy="0"/>
+          <a:chOff x="0" y="0"/>
+          <a:chExt cx="0" cy="0"/>
+        </a:xfrm>
+      </p:grpSpPr>
+      <p:sp>
+        <p:nvSpPr>
+          <p:cNvPr id="2" name="Title 1"/>
+          <p:cNvSpPr>
+            <a:spLocks noGrp="1"/>
+          </p:cNvSpPr>
+          <p:nvPr>
+            <p:ph type="title"/>
+          </p:nvPr>
+        </p:nvSpPr>
+        <p:spPr/>
+        <p:txBody>
+          <a:bodyPr/>
+          <a:lstStyle/>
+          <a:p>
+            <a:r>
+              <a:rPr lang="en-US" dirty="0" smtClean="0"/>
+              <a:t>My version of 12factor.net:</a:t>
+            </a:r>
+            <a:endParaRPr lang="en-US" dirty="0"/>
+          </a:p>
+        </p:txBody>
+      </p:sp>
+      <p:sp>
+        <p:nvSpPr>
+          <p:cNvPr id="3" name="Content Placeholder 2"/>
+          <p:cNvSpPr>
+            <a:spLocks noGrp="1"/>
+          </p:cNvSpPr>
+          <p:nvPr>
+            <p:ph idx="1"/>
+          </p:nvPr>
+        </p:nvSpPr>
+        <p:spPr>
+          <a:xfrm>
+            <a:off x="1103312" y="1342768"/>
+            <a:ext cx="8946541" cy="4905631"/>
+          </a:xfrm>
+        </p:spPr>
+        <p:txBody>
+          <a:bodyPr>
+            <a:normAutofit fontScale="92500" lnSpcReduction="10000"/>
+          </a:bodyPr>
+          <a:lstStyle/>
+          <a:p>
+            <a:r>
+              <a:rPr lang="en-US" dirty="0" smtClean="0"/>
+              <a:t>All stuff in origin/master, or it goes there.</a:t>
+            </a:r>
+          </a:p>
+          <a:p>
+            <a:r>
+              <a:rPr lang="en-US" dirty="0" err="1" smtClean="0"/>
+              <a:t>Microservice</a:t>
+            </a:r>
+            <a:r>
+              <a:rPr lang="en-US" dirty="0" smtClean="0"/>
+              <a:t> code </a:t>
+            </a:r>
+            <a:r>
+              <a:rPr lang="en-US" i="1" dirty="0" smtClean="0"/>
+              <a:t>and </a:t>
+            </a:r>
+            <a:r>
+              <a:rPr lang="en-US" dirty="0" err="1" smtClean="0"/>
+              <a:t>config</a:t>
+            </a:r>
+            <a:r>
+              <a:rPr lang="en-US" dirty="0" smtClean="0"/>
+              <a:t> </a:t>
+            </a:r>
+            <a:r>
+              <a:rPr lang="en-US" i="1" dirty="0" smtClean="0"/>
+              <a:t>completely</a:t>
+            </a:r>
+            <a:r>
+              <a:rPr lang="en-US" dirty="0" smtClean="0"/>
+              <a:t> autonomous.</a:t>
+            </a:r>
+          </a:p>
+          <a:p>
+            <a:r>
+              <a:rPr lang="en-US" dirty="0" smtClean="0"/>
+              <a:t>All non-domain resources are autonomous addressable resources.</a:t>
+            </a:r>
+          </a:p>
+          <a:p>
+            <a:r>
+              <a:rPr lang="en-US" dirty="0" smtClean="0"/>
+              <a:t>Building, releasing, and running are autonomous.</a:t>
+            </a:r>
+          </a:p>
+          <a:p>
+            <a:r>
+              <a:rPr lang="en-US" dirty="0" err="1" smtClean="0"/>
+              <a:t>Microservice</a:t>
+            </a:r>
+            <a:r>
+              <a:rPr lang="en-US" dirty="0" smtClean="0"/>
+              <a:t> goal: one stateless process.</a:t>
+            </a:r>
+          </a:p>
+          <a:p>
+            <a:pPr lvl="1"/>
+            <a:r>
+              <a:rPr lang="en-US" dirty="0" smtClean="0"/>
+              <a:t>Caveat: when point of service is to do </a:t>
+            </a:r>
+            <a:r>
+              <a:rPr lang="en-US" dirty="0" err="1" smtClean="0"/>
+              <a:t>multiprocess</a:t>
+            </a:r>
+            <a:r>
+              <a:rPr lang="en-US" dirty="0" smtClean="0"/>
+              <a:t> or </a:t>
+            </a:r>
+            <a:r>
+              <a:rPr lang="en-US" dirty="0" err="1" smtClean="0"/>
+              <a:t>stateful</a:t>
+            </a:r>
+            <a:r>
+              <a:rPr lang="en-US" dirty="0" smtClean="0"/>
+              <a:t> work (</a:t>
+            </a:r>
+            <a:r>
+              <a:rPr lang="en-US" dirty="0" err="1" smtClean="0"/>
+              <a:t>dbs</a:t>
+            </a:r>
+            <a:r>
+              <a:rPr lang="en-US" dirty="0" smtClean="0"/>
+              <a:t>).</a:t>
+            </a:r>
+          </a:p>
+          <a:p>
+            <a:r>
+              <a:rPr lang="en-US" dirty="0" smtClean="0"/>
+              <a:t>If service is hosted in other framework, </a:t>
+            </a:r>
+            <a:r>
+              <a:rPr lang="en-US" dirty="0" err="1" smtClean="0"/>
+              <a:t>microservice</a:t>
+            </a:r>
+            <a:r>
+              <a:rPr lang="en-US" dirty="0"/>
+              <a:t> </a:t>
+            </a:r>
+            <a:r>
+              <a:rPr lang="en-US" dirty="0" smtClean="0"/>
+              <a:t>treats framework as part of </a:t>
+            </a:r>
+            <a:r>
+              <a:rPr lang="en-US" dirty="0" err="1" smtClean="0"/>
+              <a:t>microservice</a:t>
+            </a:r>
+            <a:r>
+              <a:rPr lang="en-US" dirty="0"/>
+              <a:t> </a:t>
+            </a:r>
+            <a:r>
+              <a:rPr lang="en-US" dirty="0" smtClean="0"/>
+              <a:t>as a unit.</a:t>
+            </a:r>
+          </a:p>
+          <a:p>
+            <a:r>
+              <a:rPr lang="en-US" dirty="0" smtClean="0"/>
+              <a:t>Don’t block. Ever. </a:t>
+            </a:r>
+          </a:p>
+          <a:p>
+            <a:r>
+              <a:rPr lang="en-US" dirty="0" smtClean="0"/>
+              <a:t>Throw problems away and start a fresh un-problem.</a:t>
+            </a:r>
+          </a:p>
+          <a:p>
+            <a:r>
+              <a:rPr lang="en-US" dirty="0" smtClean="0"/>
+              <a:t>Test in production.</a:t>
+            </a:r>
+          </a:p>
+          <a:p>
+            <a:r>
+              <a:rPr lang="en-US" dirty="0" smtClean="0"/>
+              <a:t>Logs are live test streams; see previous.</a:t>
+            </a:r>
+          </a:p>
+          <a:p>
+            <a:r>
+              <a:rPr lang="en-US" dirty="0" smtClean="0"/>
+              <a:t>Admin processes: rarely, but against live code. See previous^2.</a:t>
+            </a:r>
+          </a:p>
+          <a:p>
+            <a:endParaRPr lang="en-US" dirty="0"/>
+          </a:p>
+        </p:txBody>
+      </p:sp>
+    </p:spTree>
+    <p:extLst>
+      <p:ext uri="{BB962C8B-B14F-4D97-AF65-F5344CB8AC3E}">
+        <p14:creationId xmlns:p14="http://schemas.microsoft.com/office/powerpoint/2010/main" val="8698433"/>
+      </p:ext>
+    </p:extLst>
+  </p:cSld>
+  <p:clrMapOvr>
+    <a:masterClrMapping/>
+  </p:clrMapOvr>
+  <p:timing>
+    <p:tnLst>
+      <p:par>
+        <p:cTn id="1" dur="indefinite" restart="never" nodeType="tmRoot"/>
+      </p:par>
+    </p:tnLst>
+  </p:timing>
+</p:sld>
+</file>
+
+<file path=ppt/slides/slide4.xml><?xml version="1.0" encoding="utf-8"?>
+<p:sld xmlns:a="http://schemas.openxmlformats.org/drawingml/2006/main" xmlns:r="http://schemas.openxmlformats.org/officeDocument/2006/relationships" xmlns:p="http://schemas.openxmlformats.org/presentationml/2006/main">
+  <p:cSld>
+    <p:spTree>
+      <p:nvGrpSpPr>
+        <p:cNvPr id="1" name=""/>
+        <p:cNvGrpSpPr/>
+        <p:nvPr/>
+      </p:nvGrpSpPr>
+      <p:grpSpPr>
+        <a:xfrm>
+          <a:off x="0" y="0"/>
+          <a:ext cx="0" cy="0"/>
+          <a:chOff x="0" y="0"/>
+          <a:chExt cx="0" cy="0"/>
+        </a:xfrm>
+      </p:grpSpPr>
+      <p:sp>
+        <p:nvSpPr>
+          <p:cNvPr id="2" name="Title 1"/>
+          <p:cNvSpPr>
+            <a:spLocks noGrp="1"/>
+          </p:cNvSpPr>
+          <p:nvPr>
+            <p:ph type="title"/>
+          </p:nvPr>
+        </p:nvSpPr>
+        <p:spPr/>
+        <p:txBody>
+          <a:bodyPr/>
+          <a:lstStyle/>
+          <a:p>
+            <a:r>
+              <a:rPr lang="en-US" dirty="0" smtClean="0"/>
+              <a:t>My version of Martin Fowler:</a:t>
+            </a:r>
+            <a:br>
+              <a:rPr lang="en-US" dirty="0" smtClean="0"/>
+            </a:br>
+            <a:r>
+              <a:rPr lang="en-US" sz="1400" dirty="0" smtClean="0"/>
+              <a:t>“</a:t>
+            </a:r>
+            <a:r>
+              <a:rPr lang="en-US" sz="1400" i="1" dirty="0"/>
+              <a:t>While there is no precise definition of this architectural style, there are certain common characteristics around organization around business capability, automated deployment, intelligence in the endpoints, and decentralized control of languages and data</a:t>
+            </a:r>
+            <a:r>
+              <a:rPr lang="en-US" sz="1400" i="1" dirty="0" smtClean="0"/>
+              <a:t>.</a:t>
+            </a:r>
+            <a:r>
+              <a:rPr lang="en-US" sz="1400" dirty="0"/>
+              <a:t>”</a:t>
+            </a:r>
+            <a:br>
+              <a:rPr lang="en-US" sz="1400" dirty="0"/>
+            </a:br>
+            <a:r>
+              <a:rPr lang="en-US" sz="1400" dirty="0"/>
+              <a:t>-- http://martinfowler.com/articles/microservices.html</a:t>
+            </a:r>
+          </a:p>
+        </p:txBody>
+      </p:sp>
+      <p:sp>
+        <p:nvSpPr>
+          <p:cNvPr id="3" name="Content Placeholder 2"/>
+          <p:cNvSpPr>
+            <a:spLocks noGrp="1"/>
+          </p:cNvSpPr>
+          <p:nvPr>
+            <p:ph idx="1"/>
+          </p:nvPr>
+        </p:nvSpPr>
+        <p:spPr>
+          <a:xfrm>
+            <a:off x="1104293" y="2192961"/>
+            <a:ext cx="8946541" cy="4195481"/>
+          </a:xfrm>
+        </p:spPr>
+        <p:txBody>
+          <a:bodyPr>
+            <a:normAutofit fontScale="85000" lnSpcReduction="10000"/>
+          </a:bodyPr>
+          <a:lstStyle/>
+          <a:p>
+            <a:r>
+              <a:rPr lang="en-US" dirty="0" smtClean="0"/>
+              <a:t>Components are called “services”</a:t>
+            </a:r>
+          </a:p>
+          <a:p>
+            <a:r>
+              <a:rPr lang="en-US" dirty="0" smtClean="0"/>
+              <a:t>Services based on business capabilities or processes, not skills.</a:t>
+            </a:r>
+          </a:p>
+          <a:p>
+            <a:r>
+              <a:rPr lang="en-US" dirty="0" smtClean="0"/>
+              <a:t>Services are never finished, even when shipping.</a:t>
+            </a:r>
+          </a:p>
+          <a:p>
+            <a:r>
+              <a:rPr lang="en-US" dirty="0" smtClean="0"/>
+              <a:t>Simplest communication possible (REST/oauth2); service logic can be complex.</a:t>
+            </a:r>
+          </a:p>
+          <a:p>
+            <a:pPr lvl="1"/>
+            <a:r>
+              <a:rPr lang="en-US" dirty="0" smtClean="0"/>
+              <a:t>Note: this is NOT the SOA approach!</a:t>
+            </a:r>
+          </a:p>
+          <a:p>
+            <a:r>
+              <a:rPr lang="en-US" dirty="0" smtClean="0"/>
+              <a:t>Destroy implementation code/library standards. Only service façade and behavior matters.</a:t>
+            </a:r>
+          </a:p>
+          <a:p>
+            <a:r>
+              <a:rPr lang="en-US" dirty="0" smtClean="0"/>
+              <a:t>Data just more </a:t>
+            </a:r>
+            <a:r>
+              <a:rPr lang="en-US" dirty="0" err="1" smtClean="0"/>
+              <a:t>microservices</a:t>
+            </a:r>
+            <a:r>
+              <a:rPr lang="en-US" dirty="0" smtClean="0"/>
+              <a:t>.</a:t>
+            </a:r>
+          </a:p>
+          <a:p>
+            <a:r>
+              <a:rPr lang="en-US" dirty="0" smtClean="0"/>
+              <a:t>Automate EVERYTHING.</a:t>
+            </a:r>
+          </a:p>
+          <a:p>
+            <a:r>
+              <a:rPr lang="en-US" dirty="0" smtClean="0"/>
+              <a:t>Failure is a normal part of entropy.</a:t>
+            </a:r>
+          </a:p>
+          <a:p>
+            <a:pPr lvl="1"/>
+            <a:r>
+              <a:rPr lang="en-US" dirty="0" smtClean="0"/>
+              <a:t>Chaos Monkey, the </a:t>
+            </a:r>
+            <a:r>
+              <a:rPr lang="en-US" dirty="0" smtClean="0">
+                <a:hlinkClick r:id="rId2"/>
+              </a:rPr>
+              <a:t>Simian army</a:t>
+            </a:r>
+            <a:r>
+              <a:rPr lang="en-US" dirty="0" smtClean="0"/>
+              <a:t>, and the </a:t>
+            </a:r>
+            <a:r>
+              <a:rPr lang="en-US" dirty="0" smtClean="0">
+                <a:hlinkClick r:id="rId3"/>
+              </a:rPr>
+              <a:t>Circuit Breaker pattern</a:t>
+            </a:r>
+            <a:r>
+              <a:rPr lang="en-US" dirty="0" smtClean="0"/>
+              <a:t>.</a:t>
+            </a:r>
+          </a:p>
+          <a:p>
+            <a:r>
+              <a:rPr lang="en-US" dirty="0" smtClean="0"/>
+              <a:t>Evolutionary design – see point three, above.</a:t>
+            </a:r>
+          </a:p>
+          <a:p>
+            <a:endParaRPr lang="en-US" dirty="0"/>
+          </a:p>
+        </p:txBody>
+      </p:sp>
+    </p:spTree>
+    <p:extLst>
+      <p:ext uri="{BB962C8B-B14F-4D97-AF65-F5344CB8AC3E}">
+        <p14:creationId xmlns:p14="http://schemas.microsoft.com/office/powerpoint/2010/main" val="770515004"/>
+      </p:ext>
+    </p:extLst>
+  </p:cSld>
+  <p:clrMapOvr>
+    <a:masterClrMapping/>
+  </p:clrMapOvr>
+  <p:timing>
+    <p:tnLst>
+      <p:par>
+        <p:cTn id="1" dur="indefinite" restart="never" nodeType="tmRoot"/>
+      </p:par>
+    </p:tnLst>
+  </p:timing>
+</p:sld>
+</file>
+
+<file path=ppt/slides/slide5.xml><?xml version="1.0" encoding="utf-8"?>
+<p:sld xmlns:a="http://schemas.openxmlformats.org/drawingml/2006/main" xmlns:r="http://schemas.openxmlformats.org/officeDocument/2006/relationships" xmlns:p="http://schemas.openxmlformats.org/presentationml/2006/main">
+  <p:cSld>
+    <p:spTree>
+      <p:nvGrpSpPr>
+        <p:cNvPr id="1" name=""/>
+        <p:cNvGrpSpPr/>
+        <p:nvPr/>
+      </p:nvGrpSpPr>
+      <p:grpSpPr>
+        <a:xfrm>
+          <a:off x="0" y="0"/>
+          <a:ext cx="0" cy="0"/>
+          <a:chOff x="0" y="0"/>
+          <a:chExt cx="0" cy="0"/>
+        </a:xfrm>
+      </p:grpSpPr>
+      <p:sp>
+        <p:nvSpPr>
+          <p:cNvPr id="2" name="Title 1"/>
+          <p:cNvSpPr>
+            <a:spLocks noGrp="1"/>
+          </p:cNvSpPr>
+          <p:nvPr>
+            <p:ph type="title"/>
+          </p:nvPr>
+        </p:nvSpPr>
+        <p:spPr/>
+        <p:txBody>
+          <a:bodyPr/>
+          <a:lstStyle/>
+          <a:p>
+            <a:r>
+              <a:rPr lang="en-US" dirty="0" smtClean="0"/>
+              <a:t>Let’s break out the similarities:</a:t>
+            </a:r>
+            <a:endParaRPr lang="en-US" dirty="0"/>
+          </a:p>
+        </p:txBody>
+      </p:sp>
+      <p:sp>
+        <p:nvSpPr>
+          <p:cNvPr id="3" name="Content Placeholder 2"/>
+          <p:cNvSpPr>
+            <a:spLocks noGrp="1"/>
+          </p:cNvSpPr>
+          <p:nvPr>
+            <p:ph idx="1"/>
+          </p:nvPr>
+        </p:nvSpPr>
+        <p:spPr/>
+        <p:txBody>
+          <a:bodyPr/>
+          <a:lstStyle/>
+          <a:p>
+            <a:r>
+              <a:rPr lang="en-US" dirty="0" smtClean="0"/>
+              <a:t>Services are focused, entirely self-sustaining, largely single processes.</a:t>
+            </a:r>
+          </a:p>
+          <a:p>
+            <a:r>
+              <a:rPr lang="en-US" dirty="0" smtClean="0"/>
+              <a:t>Everything external to the </a:t>
+            </a:r>
+            <a:r>
+              <a:rPr lang="en-US" i="1" dirty="0" smtClean="0"/>
+              <a:t>domain context</a:t>
+            </a:r>
+            <a:r>
+              <a:rPr lang="en-US" dirty="0" smtClean="0"/>
+              <a:t> of the service is a REST call (98% case) to another service for </a:t>
+            </a:r>
+            <a:r>
+              <a:rPr lang="en-US" i="1" dirty="0" smtClean="0"/>
+              <a:t>that domain</a:t>
+            </a:r>
+            <a:r>
+              <a:rPr lang="en-US" dirty="0" smtClean="0"/>
+              <a:t>.</a:t>
+            </a:r>
+          </a:p>
+          <a:p>
+            <a:r>
+              <a:rPr lang="en-US" dirty="0" smtClean="0"/>
+              <a:t>Never tell the team how to build the service from the point of view of another service.</a:t>
+            </a:r>
+          </a:p>
+          <a:p>
+            <a:r>
+              <a:rPr lang="en-US" dirty="0" smtClean="0"/>
+              <a:t>Failing services are destroyed and replaced as fast as possible. Period.</a:t>
+            </a:r>
+          </a:p>
+          <a:p>
+            <a:r>
+              <a:rPr lang="en-US" dirty="0" smtClean="0"/>
+              <a:t>At scale, monitoring, logging, and testing are identical. </a:t>
+            </a:r>
+          </a:p>
+          <a:p>
+            <a:endParaRPr lang="en-US" dirty="0" smtClean="0"/>
+          </a:p>
+          <a:p>
+            <a:endParaRPr lang="en-US" dirty="0"/>
+          </a:p>
+        </p:txBody>
+      </p:sp>
+    </p:spTree>
+    <p:extLst>
+      <p:ext uri="{BB962C8B-B14F-4D97-AF65-F5344CB8AC3E}">
+        <p14:creationId xmlns:p14="http://schemas.microsoft.com/office/powerpoint/2010/main" val="1393165500"/>
+      </p:ext>
+    </p:extLst>
+  </p:cSld>
+  <p:clrMapOvr>
+    <a:masterClrMapping/>
+  </p:clrMapOvr>
+  <p:timing>
+    <p:tnLst>
+      <p:par>
+        <p:cTn id="1" dur="indefinite" restart="never" nodeType="tmRoot"/>
+      </p:par>
+    </p:tnLst>
+  </p:timing>
+</p:sld>
+</file>
+
+<file path=ppt/slides/slide6.xml><?xml version="1.0" encoding="utf-8"?>
+<p:sld xmlns:a="http://schemas.openxmlformats.org/drawingml/2006/main" xmlns:r="http://schemas.openxmlformats.org/officeDocument/2006/relationships" xmlns:p="http://schemas.openxmlformats.org/presentationml/2006/main">
+  <p:cSld>
+    <p:spTree>
+      <p:nvGrpSpPr>
+        <p:cNvPr id="1" name=""/>
+        <p:cNvGrpSpPr/>
+        <p:nvPr/>
+      </p:nvGrpSpPr>
+      <p:grpSpPr>
+        <a:xfrm>
+          <a:off x="0" y="0"/>
+          <a:ext cx="0" cy="0"/>
+          <a:chOff x="0" y="0"/>
+          <a:chExt cx="0" cy="0"/>
+        </a:xfrm>
+      </p:grpSpPr>
+      <p:sp>
+        <p:nvSpPr>
+          <p:cNvPr id="2" name="Title 1"/>
+          <p:cNvSpPr>
+            <a:spLocks noGrp="1"/>
+          </p:cNvSpPr>
+          <p:nvPr>
+            <p:ph type="title"/>
+          </p:nvPr>
+        </p:nvSpPr>
+        <p:spPr/>
+        <p:txBody>
+          <a:bodyPr/>
+          <a:lstStyle/>
+          <a:p>
+            <a:endParaRPr lang="en-US"/>
+          </a:p>
+        </p:txBody>
+      </p:sp>
+      <p:sp>
+        <p:nvSpPr>
+          <p:cNvPr id="3" name="Content Placeholder 2"/>
+          <p:cNvSpPr>
+            <a:spLocks noGrp="1"/>
+          </p:cNvSpPr>
+          <p:nvPr>
+            <p:ph idx="1"/>
+          </p:nvPr>
+        </p:nvSpPr>
+        <p:spPr/>
+        <p:txBody>
+          <a:bodyPr/>
+          <a:lstStyle/>
+          <a:p>
+            <a:endParaRPr lang="en-US"/>
+          </a:p>
+        </p:txBody>
+      </p:sp>
+    </p:spTree>
+    <p:extLst>
+      <p:ext uri="{BB962C8B-B14F-4D97-AF65-F5344CB8AC3E}">
+        <p14:creationId xmlns:p14="http://schemas.microsoft.com/office/powerpoint/2010/main" val="81343035"/>
+      </p:ext>
+    </p:extLst>
+  </p:cSld>
+  <p:clrMapOvr>
+    <a:masterClrMapping/>
+  </p:clrMapOvr>
+  <p:timing>
+    <p:tnLst>
+      <p:par>
+        <p:cTn id="1" dur="indefinite" restart="never" nodeType="tmRoot"/>
+      </p:par>
+    </p:tnLst>
+  </p:timing>
+</p:sld>
+</file>
+
+<file path=ppt/slides/slide7.xml><?xml version="1.0" encoding="utf-8"?>
+<p:sld xmlns:a="http://schemas.openxmlformats.org/drawingml/2006/main" xmlns:r="http://schemas.openxmlformats.org/officeDocument/2006/relationships" xmlns:p="http://schemas.openxmlformats.org/presentationml/2006/main">
+  <p:cSld>
+    <p:spTree>
+      <p:nvGrpSpPr>
+        <p:cNvPr id="1" name=""/>
+        <p:cNvGrpSpPr/>
+        <p:nvPr/>
+      </p:nvGrpSpPr>
+      <p:grpSpPr>
+        <a:xfrm>
+          <a:off x="0" y="0"/>
+          <a:ext cx="0" cy="0"/>
+          <a:chOff x="0" y="0"/>
+          <a:chExt cx="0" cy="0"/>
+        </a:xfrm>
+      </p:grpSpPr>
+      <p:sp>
+        <p:nvSpPr>
+          <p:cNvPr id="2" name="Title 1"/>
+          <p:cNvSpPr>
+            <a:spLocks noGrp="1"/>
+          </p:cNvSpPr>
+          <p:nvPr>
+            <p:ph type="title"/>
+          </p:nvPr>
+        </p:nvSpPr>
+        <p:spPr/>
+        <p:txBody>
+          <a:bodyPr/>
+          <a:lstStyle/>
+          <a:p>
+            <a:endParaRPr lang="en-US"/>
+          </a:p>
+        </p:txBody>
+      </p:sp>
+      <p:sp>
+        <p:nvSpPr>
+          <p:cNvPr id="3" name="Content Placeholder 2"/>
+          <p:cNvSpPr>
+            <a:spLocks noGrp="1"/>
+          </p:cNvSpPr>
+          <p:nvPr>
+            <p:ph idx="1"/>
+          </p:nvPr>
+        </p:nvSpPr>
+        <p:spPr/>
+        <p:txBody>
+          <a:bodyPr/>
+          <a:lstStyle/>
+          <a:p>
+            <a:endParaRPr lang="en-US"/>
+          </a:p>
+        </p:txBody>
+      </p:sp>
+    </p:spTree>
+    <p:extLst>
+      <p:ext uri="{BB962C8B-B14F-4D97-AF65-F5344CB8AC3E}">
+        <p14:creationId xmlns:p14="http://schemas.microsoft.com/office/powerpoint/2010/main" val="1810700810"/>
+      </p:ext>
+    </p:extLst>
+  </p:cSld>
+  <p:clrMapOvr>
+    <a:masterClrMapping/>
+  </p:clrMapOvr>
+</p:sld>
+</file>
+
+<file path=ppt/slides/slide8.xml><?xml version="1.0" encoding="utf-8"?>
+<p:sld xmlns:a="http://schemas.openxmlformats.org/drawingml/2006/main" xmlns:r="http://schemas.openxmlformats.org/officeDocument/2006/relationships" xmlns:p="http://schemas.openxmlformats.org/presentationml/2006/main">
+  <p:cSld>
+    <p:spTree>
+      <p:nvGrpSpPr>
+        <p:cNvPr id="1" name=""/>
+        <p:cNvGrpSpPr/>
+        <p:nvPr/>
+      </p:nvGrpSpPr>
+      <p:grpSpPr>
+        <a:xfrm>
+          <a:off x="0" y="0"/>
+          <a:ext cx="0" cy="0"/>
+          <a:chOff x="0" y="0"/>
+          <a:chExt cx="0" cy="0"/>
+        </a:xfrm>
+      </p:grpSpPr>
+      <p:sp>
+        <p:nvSpPr>
+          <p:cNvPr id="2" name="Title 1"/>
+          <p:cNvSpPr>
+            <a:spLocks noGrp="1"/>
+          </p:cNvSpPr>
+          <p:nvPr>
+            <p:ph type="title"/>
+          </p:nvPr>
+        </p:nvSpPr>
+        <p:spPr/>
+        <p:txBody>
+          <a:bodyPr/>
+          <a:lstStyle/>
+          <a:p>
+            <a:endParaRPr lang="en-US"/>
+          </a:p>
+        </p:txBody>
+      </p:sp>
+      <p:sp>
+        <p:nvSpPr>
+          <p:cNvPr id="3" name="Content Placeholder 2"/>
+          <p:cNvSpPr>
+            <a:spLocks noGrp="1"/>
+          </p:cNvSpPr>
+          <p:nvPr>
+            <p:ph idx="1"/>
+          </p:nvPr>
+        </p:nvSpPr>
+        <p:spPr/>
+        <p:txBody>
+          <a:bodyPr/>
+          <a:lstStyle/>
+          <a:p>
+            <a:endParaRPr lang="en-US"/>
+          </a:p>
+        </p:txBody>
+      </p:sp>
+    </p:spTree>
+    <p:extLst>
+      <p:ext uri="{BB962C8B-B14F-4D97-AF65-F5344CB8AC3E}">
+        <p14:creationId xmlns:p14="http://schemas.microsoft.com/office/powerpoint/2010/main" val="2922543099"/>
+      </p:ext>
+    </p:extLst>
+  </p:cSld>
+  <p:clrMapOvr>
+    <a:masterClrMapping/>
+  </p:clrMapOvr>
+  <p:timing>
+    <p:tnLst>
+      <p:par>
+        <p:cTn id="1" dur="indefinite" restart="never" nodeType="tmRoot"/>
+      </p:par>
+    </p:tnLst>
+  </p:timing>
+</p:sld>
+</file>
+
+<file path=ppt/slides/slide9.xml><?xml version="1.0" encoding="utf-8"?>
+<p:sld xmlns:a="http://schemas.openxmlformats.org/drawingml/2006/main" xmlns:r="http://schemas.openxmlformats.org/officeDocument/2006/relationships" xmlns:p="http://schemas.openxmlformats.org/presentationml/2006/main">
+  <p:cSld>
+    <p:spTree>
+      <p:nvGrpSpPr>
+        <p:cNvPr id="1" name=""/>
+        <p:cNvGrpSpPr/>
+        <p:nvPr/>
+      </p:nvGrpSpPr>
+      <p:grpSpPr>
+        <a:xfrm>
+          <a:off x="0" y="0"/>
+          <a:ext cx="0" cy="0"/>
+          <a:chOff x="0" y="0"/>
+          <a:chExt cx="0" cy="0"/>
+        </a:xfrm>
+      </p:grpSpPr>
+      <p:sp>
+        <p:nvSpPr>
+          <p:cNvPr id="2" name="Title 1"/>
+          <p:cNvSpPr>
+            <a:spLocks noGrp="1"/>
+          </p:cNvSpPr>
+          <p:nvPr>
+            <p:ph type="title"/>
+          </p:nvPr>
+        </p:nvSpPr>
+        <p:spPr/>
+        <p:txBody>
+          <a:bodyPr/>
+          <a:lstStyle/>
+          <a:p>
+            <a:endParaRPr lang="en-US"/>
+          </a:p>
+        </p:txBody>
+      </p:sp>
+      <p:sp>
+        <p:nvSpPr>
+          <p:cNvPr id="3" name="Content Placeholder 2"/>
+          <p:cNvSpPr>
+            <a:spLocks noGrp="1"/>
+          </p:cNvSpPr>
+          <p:nvPr>
+            <p:ph idx="1"/>
+          </p:nvPr>
+        </p:nvSpPr>
+        <p:spPr/>
+        <p:txBody>
+          <a:bodyPr/>
+          <a:lstStyle/>
+          <a:p>
+            <a:endParaRPr lang="en-US"/>
+          </a:p>
+        </p:txBody>
+      </p:sp>
+    </p:spTree>
+    <p:extLst>
+      <p:ext uri="{BB962C8B-B14F-4D97-AF65-F5344CB8AC3E}">
+        <p14:creationId xmlns:p14="http://schemas.microsoft.com/office/powerpoint/2010/main" val="482022322"/>
       </p:ext>
     </p:extLst>
   </p:cSld>

</xml_diff>

<commit_message>
basic domain design high-level
</commit_message>
<xml_diff>
--- a/Microservices Overview.pptx
+++ b/Microservices Overview.pptx
@@ -21,28 +21,32 @@
     <p:sldId id="267" r:id="rId15"/>
     <p:sldId id="292" r:id="rId16"/>
     <p:sldId id="284" r:id="rId17"/>
-    <p:sldId id="268" r:id="rId18"/>
-    <p:sldId id="285" r:id="rId19"/>
-    <p:sldId id="269" r:id="rId20"/>
-    <p:sldId id="287" r:id="rId21"/>
-    <p:sldId id="288" r:id="rId22"/>
-    <p:sldId id="290" r:id="rId23"/>
-    <p:sldId id="291" r:id="rId24"/>
-    <p:sldId id="293" r:id="rId25"/>
-    <p:sldId id="294" r:id="rId26"/>
-    <p:sldId id="297" r:id="rId27"/>
-    <p:sldId id="289" r:id="rId28"/>
-    <p:sldId id="270" r:id="rId29"/>
-    <p:sldId id="271" r:id="rId30"/>
-    <p:sldId id="272" r:id="rId31"/>
-    <p:sldId id="273" r:id="rId32"/>
-    <p:sldId id="274" r:id="rId33"/>
-    <p:sldId id="281" r:id="rId34"/>
-    <p:sldId id="282" r:id="rId35"/>
-    <p:sldId id="283" r:id="rId36"/>
-    <p:sldId id="262" r:id="rId37"/>
-    <p:sldId id="298" r:id="rId38"/>
-    <p:sldId id="261" r:id="rId39"/>
+    <p:sldId id="299" r:id="rId18"/>
+    <p:sldId id="300" r:id="rId19"/>
+    <p:sldId id="301" r:id="rId20"/>
+    <p:sldId id="302" r:id="rId21"/>
+    <p:sldId id="268" r:id="rId22"/>
+    <p:sldId id="285" r:id="rId23"/>
+    <p:sldId id="269" r:id="rId24"/>
+    <p:sldId id="287" r:id="rId25"/>
+    <p:sldId id="288" r:id="rId26"/>
+    <p:sldId id="290" r:id="rId27"/>
+    <p:sldId id="291" r:id="rId28"/>
+    <p:sldId id="293" r:id="rId29"/>
+    <p:sldId id="294" r:id="rId30"/>
+    <p:sldId id="297" r:id="rId31"/>
+    <p:sldId id="289" r:id="rId32"/>
+    <p:sldId id="270" r:id="rId33"/>
+    <p:sldId id="271" r:id="rId34"/>
+    <p:sldId id="272" r:id="rId35"/>
+    <p:sldId id="273" r:id="rId36"/>
+    <p:sldId id="274" r:id="rId37"/>
+    <p:sldId id="281" r:id="rId38"/>
+    <p:sldId id="282" r:id="rId39"/>
+    <p:sldId id="283" r:id="rId40"/>
+    <p:sldId id="262" r:id="rId41"/>
+    <p:sldId id="298" r:id="rId42"/>
+    <p:sldId id="261" r:id="rId43"/>
   </p:sldIdLst>
   <p:sldSz cx="12192000" cy="6858000"/>
   <p:notesSz cx="6858000" cy="9144000"/>
@@ -170,6 +174,10 @@
         <p14:section name="Digression: Domain Driven Design" id="{2838D50D-C5FF-4B0F-867D-8AFECB339ED3}">
           <p14:sldIdLst>
             <p14:sldId id="284"/>
+            <p14:sldId id="299"/>
+            <p14:sldId id="300"/>
+            <p14:sldId id="301"/>
+            <p14:sldId id="302"/>
           </p14:sldIdLst>
         </p14:section>
         <p14:section name="End Digression" id="{FBBA807F-00FE-49C4-A6CF-76FCD46BD6CA}">
@@ -393,7 +401,7 @@
           <a:p>
             <a:fld id="{4AAD347D-5ACD-4C99-B74B-A9C85AD731AF}" type="datetimeFigureOut">
               <a:rPr lang="en-US" dirty="0"/>
-              <a:t>5/9/2015</a:t>
+              <a:t>5/10/2015</a:t>
             </a:fld>
             <a:endParaRPr lang="en-US" dirty="0"/>
           </a:p>
@@ -663,7 +671,7 @@
           <a:p>
             <a:fld id="{4509A250-FF31-4206-8172-F9D3106AACB1}" type="datetimeFigureOut">
               <a:rPr lang="en-US" dirty="0"/>
-              <a:t>5/9/2015</a:t>
+              <a:t>5/10/2015</a:t>
             </a:fld>
             <a:endParaRPr lang="en-US" dirty="0"/>
           </a:p>
@@ -852,7 +860,7 @@
           <a:p>
             <a:fld id="{4509A250-FF31-4206-8172-F9D3106AACB1}" type="datetimeFigureOut">
               <a:rPr lang="en-US" dirty="0"/>
-              <a:t>5/9/2015</a:t>
+              <a:t>5/10/2015</a:t>
             </a:fld>
             <a:endParaRPr lang="en-US" dirty="0"/>
           </a:p>
@@ -1120,7 +1128,7 @@
           <a:p>
             <a:fld id="{4509A250-FF31-4206-8172-F9D3106AACB1}" type="datetimeFigureOut">
               <a:rPr lang="en-US" dirty="0"/>
-              <a:t>5/9/2015</a:t>
+              <a:t>5/10/2015</a:t>
             </a:fld>
             <a:endParaRPr lang="en-US" dirty="0"/>
           </a:p>
@@ -1456,7 +1464,7 @@
           <a:p>
             <a:fld id="{4509A250-FF31-4206-8172-F9D3106AACB1}" type="datetimeFigureOut">
               <a:rPr lang="en-US" dirty="0"/>
-              <a:t>5/9/2015</a:t>
+              <a:t>5/10/2015</a:t>
             </a:fld>
             <a:endParaRPr lang="en-US" dirty="0"/>
           </a:p>
@@ -2074,7 +2082,7 @@
           <a:p>
             <a:fld id="{4509A250-FF31-4206-8172-F9D3106AACB1}" type="datetimeFigureOut">
               <a:rPr lang="en-US" dirty="0"/>
-              <a:t>5/9/2015</a:t>
+              <a:t>5/10/2015</a:t>
             </a:fld>
             <a:endParaRPr lang="en-US" dirty="0"/>
           </a:p>
@@ -2929,7 +2937,7 @@
           <a:p>
             <a:fld id="{4509A250-FF31-4206-8172-F9D3106AACB1}" type="datetimeFigureOut">
               <a:rPr lang="en-US" dirty="0"/>
-              <a:t>5/9/2015</a:t>
+              <a:t>5/10/2015</a:t>
             </a:fld>
             <a:endParaRPr lang="en-US" dirty="0"/>
           </a:p>
@@ -3094,7 +3102,7 @@
           <a:p>
             <a:fld id="{4509A250-FF31-4206-8172-F9D3106AACB1}" type="datetimeFigureOut">
               <a:rPr lang="en-US" dirty="0"/>
-              <a:t>5/9/2015</a:t>
+              <a:t>5/10/2015</a:t>
             </a:fld>
             <a:endParaRPr lang="en-US" dirty="0"/>
           </a:p>
@@ -3269,7 +3277,7 @@
           <a:p>
             <a:fld id="{4509A250-FF31-4206-8172-F9D3106AACB1}" type="datetimeFigureOut">
               <a:rPr lang="en-US" dirty="0"/>
-              <a:t>5/9/2015</a:t>
+              <a:t>5/10/2015</a:t>
             </a:fld>
             <a:endParaRPr lang="en-US" dirty="0"/>
           </a:p>
@@ -3506,7 +3514,7 @@
           <a:p>
             <a:fld id="{4509A250-FF31-4206-8172-F9D3106AACB1}" type="datetimeFigureOut">
               <a:rPr lang="en-US" dirty="0"/>
-              <a:t>5/9/2015</a:t>
+              <a:t>5/10/2015</a:t>
             </a:fld>
             <a:endParaRPr lang="en-US" dirty="0"/>
           </a:p>
@@ -3748,7 +3756,7 @@
           <a:p>
             <a:fld id="{9796027F-7875-4030-9381-8BD8C4F21935}" type="datetimeFigureOut">
               <a:rPr lang="en-US" dirty="0"/>
-              <a:t>5/9/2015</a:t>
+              <a:t>5/10/2015</a:t>
             </a:fld>
             <a:endParaRPr lang="en-US" dirty="0"/>
           </a:p>
@@ -4035,7 +4043,7 @@
           <a:p>
             <a:fld id="{9796027F-7875-4030-9381-8BD8C4F21935}" type="datetimeFigureOut">
               <a:rPr lang="en-US" dirty="0"/>
-              <a:t>5/9/2015</a:t>
+              <a:t>5/10/2015</a:t>
             </a:fld>
             <a:endParaRPr lang="en-US" dirty="0"/>
           </a:p>
@@ -4474,7 +4482,7 @@
           <a:p>
             <a:fld id="{9796027F-7875-4030-9381-8BD8C4F21935}" type="datetimeFigureOut">
               <a:rPr lang="en-US" dirty="0"/>
-              <a:t>5/9/2015</a:t>
+              <a:t>5/10/2015</a:t>
             </a:fld>
             <a:endParaRPr lang="en-US" dirty="0"/>
           </a:p>
@@ -4587,7 +4595,7 @@
           <a:p>
             <a:fld id="{4509A250-FF31-4206-8172-F9D3106AACB1}" type="datetimeFigureOut">
               <a:rPr lang="en-US" dirty="0"/>
-              <a:t>5/9/2015</a:t>
+              <a:t>5/10/2015</a:t>
             </a:fld>
             <a:endParaRPr lang="en-US" dirty="0"/>
           </a:p>
@@ -4677,7 +4685,7 @@
           <a:p>
             <a:fld id="{4509A250-FF31-4206-8172-F9D3106AACB1}" type="datetimeFigureOut">
               <a:rPr lang="en-US" dirty="0"/>
-              <a:t>5/9/2015</a:t>
+              <a:t>5/10/2015</a:t>
             </a:fld>
             <a:endParaRPr lang="en-US" dirty="0"/>
           </a:p>
@@ -4951,7 +4959,7 @@
           <a:p>
             <a:fld id="{4509A250-FF31-4206-8172-F9D3106AACB1}" type="datetimeFigureOut">
               <a:rPr lang="en-US" dirty="0"/>
-              <a:t>5/9/2015</a:t>
+              <a:t>5/10/2015</a:t>
             </a:fld>
             <a:endParaRPr lang="en-US" dirty="0"/>
           </a:p>
@@ -5221,7 +5229,7 @@
           <a:p>
             <a:fld id="{4509A250-FF31-4206-8172-F9D3106AACB1}" type="datetimeFigureOut">
               <a:rPr lang="en-US" dirty="0"/>
-              <a:t>5/9/2015</a:t>
+              <a:t>5/10/2015</a:t>
             </a:fld>
             <a:endParaRPr lang="en-US" dirty="0"/>
           </a:p>
@@ -5645,7 +5653,7 @@
           <a:p>
             <a:fld id="{4AAD347D-5ACD-4C99-B74B-A9C85AD731AF}" type="datetimeFigureOut">
               <a:rPr lang="en-US" dirty="0"/>
-              <a:t>5/9/2015</a:t>
+              <a:t>5/10/2015</a:t>
             </a:fld>
             <a:endParaRPr lang="en-US" dirty="0"/>
           </a:p>
@@ -6212,7 +6220,6 @@
               <a:rPr lang="en-US" dirty="0" smtClean="0"/>
               <a:t>And domain-driven design (DDD)</a:t>
             </a:r>
-            <a:endParaRPr lang="en-US" dirty="0" smtClean="0"/>
           </a:p>
           <a:p>
             <a:r>
@@ -6233,13 +6240,13 @@
   <p:clrMapOvr>
     <a:masterClrMapping/>
   </p:clrMapOvr>
-  <mc:AlternateContent xmlns:mc="http://schemas.openxmlformats.org/markup-compatibility/2006">
-    <mc:Choice xmlns:p14="http://schemas.microsoft.com/office/powerpoint/2010/main" Requires="p14">
+  <mc:AlternateContent xmlns:mc="http://schemas.openxmlformats.org/markup-compatibility/2006" xmlns:p14="http://schemas.microsoft.com/office/powerpoint/2010/main">
+    <mc:Choice Requires="p14">
       <p:transition spd="med" p14:dur="700">
         <p:fade/>
       </p:transition>
     </mc:Choice>
-    <mc:Fallback>
+    <mc:Fallback xmlns="">
       <p:transition spd="med">
         <p:fade/>
       </p:transition>
@@ -6641,24 +6648,7 @@
                   </a:gradFill>
                   <a:latin typeface="+mj-lt"/>
                 </a:rPr>
-                <a:t>r</a:t>
-              </a:r>
-              <a:r>
-                <a:rPr lang="en-US" sz="2353" b="1" dirty="0">
-                  <a:gradFill>
-                    <a:gsLst>
-                      <a:gs pos="2917">
-                        <a:schemeClr val="tx1"/>
-                      </a:gs>
-                      <a:gs pos="30000">
-                        <a:schemeClr val="tx1"/>
-                      </a:gs>
-                    </a:gsLst>
-                    <a:lin ang="5400000" scaled="0"/>
-                  </a:gradFill>
-                  <a:latin typeface="+mj-lt"/>
-                </a:rPr>
-                <a:t>edis (C4)</a:t>
+                <a:t>redis (C4)</a:t>
               </a:r>
             </a:p>
           </p:txBody>
@@ -6801,24 +6791,7 @@
                   </a:gradFill>
                   <a:latin typeface="+mj-lt"/>
                 </a:rPr>
-                <a:t>s</a:t>
-              </a:r>
-              <a:r>
-                <a:rPr lang="en-US" sz="2353" b="1" dirty="0">
-                  <a:gradFill>
-                    <a:gsLst>
-                      <a:gs pos="2917">
-                        <a:schemeClr val="tx1"/>
-                      </a:gs>
-                      <a:gs pos="30000">
-                        <a:schemeClr val="tx1"/>
-                      </a:gs>
-                    </a:gsLst>
-                    <a:lin ang="5400000" scaled="0"/>
-                  </a:gradFill>
-                  <a:latin typeface="+mj-lt"/>
-                </a:rPr>
-                <a:t>ms (C2)</a:t>
+                <a:t>sms (C2)</a:t>
               </a:r>
             </a:p>
           </p:txBody>
@@ -7159,13 +7132,13 @@
   <p:clrMapOvr>
     <a:masterClrMapping/>
   </p:clrMapOvr>
-  <mc:AlternateContent xmlns:mc="http://schemas.openxmlformats.org/markup-compatibility/2006">
-    <mc:Choice xmlns:p14="http://schemas.microsoft.com/office/powerpoint/2010/main" Requires="p14">
+  <mc:AlternateContent xmlns:mc="http://schemas.openxmlformats.org/markup-compatibility/2006" xmlns:p14="http://schemas.microsoft.com/office/powerpoint/2010/main">
+    <mc:Choice Requires="p14">
       <p:transition spd="med" p14:dur="700">
         <p:fade/>
       </p:transition>
     </mc:Choice>
-    <mc:Fallback>
+    <mc:Fallback xmlns="">
       <p:transition spd="med">
         <p:fade/>
       </p:transition>
@@ -7479,24 +7452,7 @@
                   </a:gradFill>
                   <a:latin typeface="+mj-lt"/>
                 </a:rPr>
-                <a:t>r</a:t>
-              </a:r>
-              <a:r>
-                <a:rPr lang="en-US" sz="2353" b="1" dirty="0">
-                  <a:gradFill>
-                    <a:gsLst>
-                      <a:gs pos="2917">
-                        <a:schemeClr val="tx1"/>
-                      </a:gs>
-                      <a:gs pos="30000">
-                        <a:schemeClr val="tx1"/>
-                      </a:gs>
-                    </a:gsLst>
-                    <a:lin ang="5400000" scaled="0"/>
-                  </a:gradFill>
-                  <a:latin typeface="+mj-lt"/>
-                </a:rPr>
-                <a:t>edis (C4)</a:t>
+                <a:t>redis (C4)</a:t>
               </a:r>
             </a:p>
           </p:txBody>
@@ -7639,24 +7595,7 @@
                   </a:gradFill>
                   <a:latin typeface="+mj-lt"/>
                 </a:rPr>
-                <a:t>s</a:t>
-              </a:r>
-              <a:r>
-                <a:rPr lang="en-US" sz="2353" b="1" dirty="0">
-                  <a:gradFill>
-                    <a:gsLst>
-                      <a:gs pos="2917">
-                        <a:schemeClr val="tx1"/>
-                      </a:gs>
-                      <a:gs pos="30000">
-                        <a:schemeClr val="tx1"/>
-                      </a:gs>
-                    </a:gsLst>
-                    <a:lin ang="5400000" scaled="0"/>
-                  </a:gradFill>
-                  <a:latin typeface="+mj-lt"/>
-                </a:rPr>
-                <a:t>ms (C2)</a:t>
+                <a:t>sms (C2)</a:t>
               </a:r>
             </a:p>
           </p:txBody>
@@ -8272,24 +8211,7 @@
                   </a:gradFill>
                   <a:latin typeface="+mj-lt"/>
                 </a:rPr>
-                <a:t>s</a:t>
-              </a:r>
-              <a:r>
-                <a:rPr lang="en-US" sz="2353" b="1" dirty="0">
-                  <a:gradFill>
-                    <a:gsLst>
-                      <a:gs pos="2917">
-                        <a:schemeClr val="tx1"/>
-                      </a:gs>
-                      <a:gs pos="30000">
-                        <a:schemeClr val="tx1"/>
-                      </a:gs>
-                    </a:gsLst>
-                    <a:lin ang="5400000" scaled="0"/>
-                  </a:gradFill>
-                  <a:latin typeface="+mj-lt"/>
-                </a:rPr>
-                <a:t>ms (C2)</a:t>
+                <a:t>sms (C2)</a:t>
               </a:r>
             </a:p>
           </p:txBody>
@@ -8595,13 +8517,13 @@
   <p:clrMapOvr>
     <a:masterClrMapping/>
   </p:clrMapOvr>
-  <mc:AlternateContent xmlns:mc="http://schemas.openxmlformats.org/markup-compatibility/2006">
-    <mc:Choice xmlns:p14="http://schemas.microsoft.com/office/powerpoint/2010/main" Requires="p14">
+  <mc:AlternateContent xmlns:mc="http://schemas.openxmlformats.org/markup-compatibility/2006" xmlns:p14="http://schemas.microsoft.com/office/powerpoint/2010/main">
+    <mc:Choice Requires="p14">
       <p:transition spd="med" p14:dur="700">
         <p:fade/>
       </p:transition>
     </mc:Choice>
-    <mc:Fallback>
+    <mc:Fallback xmlns="">
       <p:transition spd="med">
         <p:fade/>
       </p:transition>
@@ -9127,13 +9049,13 @@
   <p:clrMapOvr>
     <a:masterClrMapping/>
   </p:clrMapOvr>
-  <mc:AlternateContent xmlns:mc="http://schemas.openxmlformats.org/markup-compatibility/2006">
-    <mc:Choice xmlns:p14="http://schemas.microsoft.com/office/powerpoint/2010/main" Requires="p14">
+  <mc:AlternateContent xmlns:mc="http://schemas.openxmlformats.org/markup-compatibility/2006" xmlns:p14="http://schemas.microsoft.com/office/powerpoint/2010/main">
+    <mc:Choice Requires="p14">
       <p:transition spd="med" p14:dur="700">
         <p:fade/>
       </p:transition>
     </mc:Choice>
-    <mc:Fallback>
+    <mc:Fallback xmlns="">
       <p:transition spd="med">
         <p:fade/>
       </p:transition>
@@ -9264,13 +9186,13 @@
   <p:clrMapOvr>
     <a:masterClrMapping/>
   </p:clrMapOvr>
-  <mc:AlternateContent xmlns:mc="http://schemas.openxmlformats.org/markup-compatibility/2006">
-    <mc:Choice xmlns:p14="http://schemas.microsoft.com/office/powerpoint/2010/main" Requires="p14">
+  <mc:AlternateContent xmlns:mc="http://schemas.openxmlformats.org/markup-compatibility/2006" xmlns:p14="http://schemas.microsoft.com/office/powerpoint/2010/main">
+    <mc:Choice Requires="p14">
       <p:transition spd="med" p14:dur="700">
         <p:fade/>
       </p:transition>
     </mc:Choice>
-    <mc:Fallback>
+    <mc:Fallback xmlns="">
       <p:transition spd="med">
         <p:fade/>
       </p:transition>
@@ -9625,13 +9547,13 @@
   <p:clrMapOvr>
     <a:masterClrMapping/>
   </p:clrMapOvr>
-  <mc:AlternateContent xmlns:mc="http://schemas.openxmlformats.org/markup-compatibility/2006">
-    <mc:Choice xmlns:p14="http://schemas.microsoft.com/office/powerpoint/2010/main" Requires="p14">
+  <mc:AlternateContent xmlns:mc="http://schemas.openxmlformats.org/markup-compatibility/2006" xmlns:p14="http://schemas.microsoft.com/office/powerpoint/2010/main">
+    <mc:Choice Requires="p14">
       <p:transition spd="med" p14:dur="700">
         <p:fade/>
       </p:transition>
     </mc:Choice>
-    <mc:Fallback>
+    <mc:Fallback xmlns="">
       <p:transition spd="med">
         <p:fade/>
       </p:transition>
@@ -9681,6 +9603,707 @@
           <a:p>
             <a:r>
               <a:rPr lang="en-US" dirty="0" smtClean="0"/>
+              <a:t>Book: Eric Evans, </a:t>
+            </a:r>
+            <a:r>
+              <a:rPr lang="en-US" i="1" dirty="0" smtClean="0">
+                <a:hlinkClick r:id="rId2"/>
+              </a:rPr>
+              <a:t>Domain-driven Design</a:t>
+            </a:r>
+            <a:r>
+              <a:rPr lang="en-US" i="1" dirty="0" smtClean="0"/>
+              <a:t> </a:t>
+            </a:r>
+            <a:r>
+              <a:rPr lang="en-US" dirty="0" smtClean="0"/>
+              <a:t>(2003)</a:t>
+            </a:r>
+            <a:endParaRPr lang="en-US" dirty="0"/>
+          </a:p>
+        </p:txBody>
+      </p:sp>
+      <p:sp>
+        <p:nvSpPr>
+          <p:cNvPr id="3" name="Content Placeholder 2"/>
+          <p:cNvSpPr>
+            <a:spLocks noGrp="1"/>
+          </p:cNvSpPr>
+          <p:nvPr>
+            <p:ph idx="1"/>
+          </p:nvPr>
+        </p:nvSpPr>
+        <p:spPr/>
+        <p:txBody>
+          <a:bodyPr/>
+          <a:lstStyle/>
+          <a:p>
+            <a:r>
+              <a:rPr lang="en-US" dirty="0" smtClean="0"/>
+              <a:t>At a high level, much of the approach is already part of common knowledge: </a:t>
+            </a:r>
+          </a:p>
+          <a:p>
+            <a:pPr lvl="1"/>
+            <a:r>
+              <a:rPr lang="en-US" dirty="0" smtClean="0"/>
+              <a:t>Primary focus is on core domain and domain logic</a:t>
+            </a:r>
+          </a:p>
+          <a:p>
+            <a:pPr lvl="1"/>
+            <a:r>
+              <a:rPr lang="en-US" dirty="0" smtClean="0"/>
+              <a:t>Designs are based on evolving model of that domain</a:t>
+            </a:r>
+          </a:p>
+          <a:p>
+            <a:r>
+              <a:rPr lang="en-US" dirty="0" smtClean="0"/>
+              <a:t>Core Concept to keep in mind</a:t>
+            </a:r>
+          </a:p>
+          <a:p>
+            <a:pPr lvl="1"/>
+            <a:r>
+              <a:rPr lang="en-US" i="1" dirty="0" smtClean="0"/>
+              <a:t>Bounded Context</a:t>
+            </a:r>
+          </a:p>
+        </p:txBody>
+      </p:sp>
+    </p:spTree>
+    <p:extLst>
+      <p:ext uri="{BB962C8B-B14F-4D97-AF65-F5344CB8AC3E}">
+        <p14:creationId xmlns:p14="http://schemas.microsoft.com/office/powerpoint/2010/main" val="824817531"/>
+      </p:ext>
+    </p:extLst>
+  </p:cSld>
+  <p:clrMapOvr>
+    <a:masterClrMapping/>
+  </p:clrMapOvr>
+  <p:timing>
+    <p:tnLst>
+      <p:par>
+        <p:cTn id="1" dur="indefinite" restart="never" nodeType="tmRoot"/>
+      </p:par>
+    </p:tnLst>
+  </p:timing>
+</p:sld>
+</file>
+
+<file path=ppt/slides/slide18.xml><?xml version="1.0" encoding="utf-8"?>
+<p:sld xmlns:a="http://schemas.openxmlformats.org/drawingml/2006/main" xmlns:r="http://schemas.openxmlformats.org/officeDocument/2006/relationships" xmlns:p="http://schemas.openxmlformats.org/presentationml/2006/main">
+  <p:cSld>
+    <p:spTree>
+      <p:nvGrpSpPr>
+        <p:cNvPr id="1" name=""/>
+        <p:cNvGrpSpPr/>
+        <p:nvPr/>
+      </p:nvGrpSpPr>
+      <p:grpSpPr>
+        <a:xfrm>
+          <a:off x="0" y="0"/>
+          <a:ext cx="0" cy="0"/>
+          <a:chOff x="0" y="0"/>
+          <a:chExt cx="0" cy="0"/>
+        </a:xfrm>
+      </p:grpSpPr>
+      <p:sp>
+        <p:nvSpPr>
+          <p:cNvPr id="2" name="Title 1"/>
+          <p:cNvSpPr>
+            <a:spLocks noGrp="1"/>
+          </p:cNvSpPr>
+          <p:nvPr>
+            <p:ph type="title"/>
+          </p:nvPr>
+        </p:nvSpPr>
+        <p:spPr/>
+        <p:txBody>
+          <a:bodyPr/>
+          <a:lstStyle/>
+          <a:p>
+            <a:r>
+              <a:rPr lang="en-US" dirty="0" smtClean="0"/>
+              <a:t>My take on DDD – uh, yeah.</a:t>
+            </a:r>
+            <a:endParaRPr lang="en-US" dirty="0"/>
+          </a:p>
+        </p:txBody>
+      </p:sp>
+      <p:sp>
+        <p:nvSpPr>
+          <p:cNvPr id="3" name="Content Placeholder 2"/>
+          <p:cNvSpPr>
+            <a:spLocks noGrp="1"/>
+          </p:cNvSpPr>
+          <p:nvPr>
+            <p:ph idx="1"/>
+          </p:nvPr>
+        </p:nvSpPr>
+        <p:spPr/>
+        <p:txBody>
+          <a:bodyPr/>
+          <a:lstStyle/>
+          <a:p>
+            <a:r>
+              <a:rPr lang="en-US" dirty="0" smtClean="0"/>
+              <a:t>Understand, model precisely, communicate, and iterate over the model of a specific </a:t>
+            </a:r>
+            <a:r>
+              <a:rPr lang="en-US" i="1" dirty="0" smtClean="0"/>
+              <a:t>bounded context</a:t>
+            </a:r>
+            <a:r>
+              <a:rPr lang="en-US" dirty="0" smtClean="0"/>
+              <a:t>. </a:t>
+            </a:r>
+          </a:p>
+          <a:p>
+            <a:r>
+              <a:rPr lang="en-US" dirty="0" smtClean="0"/>
+              <a:t>Models abound; </a:t>
+            </a:r>
+            <a:r>
+              <a:rPr lang="en-US" i="1" dirty="0" smtClean="0"/>
+              <a:t>this</a:t>
+            </a:r>
+            <a:r>
+              <a:rPr lang="en-US" dirty="0" smtClean="0"/>
+              <a:t> model only makes sense in a </a:t>
+            </a:r>
+            <a:r>
+              <a:rPr lang="en-US" i="1" dirty="0" smtClean="0"/>
+              <a:t>specific context</a:t>
+            </a:r>
+            <a:r>
+              <a:rPr lang="en-US" dirty="0" smtClean="0"/>
+              <a:t>. </a:t>
+            </a:r>
+          </a:p>
+          <a:p>
+            <a:r>
+              <a:rPr lang="en-US" dirty="0" smtClean="0"/>
+              <a:t>You avoid huge problems if you try to stretch models beyond their context. </a:t>
+            </a:r>
+          </a:p>
+          <a:p>
+            <a:pPr lvl="1"/>
+            <a:r>
+              <a:rPr lang="en-US" dirty="0" smtClean="0"/>
+              <a:t>Example: An address object might have “commonality” but it might </a:t>
+            </a:r>
+            <a:r>
+              <a:rPr lang="en-US" i="1" dirty="0" smtClean="0"/>
+              <a:t>not, </a:t>
+            </a:r>
+            <a:r>
+              <a:rPr lang="en-US" dirty="0" smtClean="0"/>
+              <a:t>also. But it </a:t>
+            </a:r>
+            <a:r>
+              <a:rPr lang="en-US" i="1" dirty="0" smtClean="0"/>
+              <a:t>does inside our </a:t>
+            </a:r>
+            <a:r>
+              <a:rPr lang="en-US" i="1" dirty="0" err="1" smtClean="0"/>
+              <a:t>microservice</a:t>
+            </a:r>
+            <a:r>
+              <a:rPr lang="en-US" dirty="0" smtClean="0"/>
+              <a:t>.</a:t>
+            </a:r>
+          </a:p>
+          <a:p>
+            <a:endParaRPr lang="en-US" dirty="0"/>
+          </a:p>
+        </p:txBody>
+      </p:sp>
+    </p:spTree>
+    <p:extLst>
+      <p:ext uri="{BB962C8B-B14F-4D97-AF65-F5344CB8AC3E}">
+        <p14:creationId xmlns:p14="http://schemas.microsoft.com/office/powerpoint/2010/main" val="3256017868"/>
+      </p:ext>
+    </p:extLst>
+  </p:cSld>
+  <p:clrMapOvr>
+    <a:masterClrMapping/>
+  </p:clrMapOvr>
+  <p:timing>
+    <p:tnLst>
+      <p:par>
+        <p:cTn id="1" dur="indefinite" restart="never" nodeType="tmRoot"/>
+      </p:par>
+    </p:tnLst>
+  </p:timing>
+</p:sld>
+</file>
+
+<file path=ppt/slides/slide19.xml><?xml version="1.0" encoding="utf-8"?>
+<p:sld xmlns:a="http://schemas.openxmlformats.org/drawingml/2006/main" xmlns:r="http://schemas.openxmlformats.org/officeDocument/2006/relationships" xmlns:p="http://schemas.openxmlformats.org/presentationml/2006/main">
+  <p:cSld>
+    <p:spTree>
+      <p:nvGrpSpPr>
+        <p:cNvPr id="1" name=""/>
+        <p:cNvGrpSpPr/>
+        <p:nvPr/>
+      </p:nvGrpSpPr>
+      <p:grpSpPr>
+        <a:xfrm>
+          <a:off x="0" y="0"/>
+          <a:ext cx="0" cy="0"/>
+          <a:chOff x="0" y="0"/>
+          <a:chExt cx="0" cy="0"/>
+        </a:xfrm>
+      </p:grpSpPr>
+      <p:sp>
+        <p:nvSpPr>
+          <p:cNvPr id="2" name="Title 1"/>
+          <p:cNvSpPr>
+            <a:spLocks noGrp="1"/>
+          </p:cNvSpPr>
+          <p:nvPr>
+            <p:ph type="title"/>
+          </p:nvPr>
+        </p:nvSpPr>
+        <p:spPr/>
+        <p:txBody>
+          <a:bodyPr/>
+          <a:lstStyle/>
+          <a:p>
+            <a:r>
+              <a:rPr lang="en-US" dirty="0" smtClean="0"/>
+              <a:t>My take on DDD, Part Two</a:t>
+            </a:r>
+            <a:endParaRPr lang="en-US" dirty="0"/>
+          </a:p>
+        </p:txBody>
+      </p:sp>
+      <p:sp>
+        <p:nvSpPr>
+          <p:cNvPr id="3" name="Content Placeholder 2"/>
+          <p:cNvSpPr>
+            <a:spLocks noGrp="1"/>
+          </p:cNvSpPr>
+          <p:nvPr>
+            <p:ph idx="1"/>
+          </p:nvPr>
+        </p:nvSpPr>
+        <p:spPr>
+          <a:xfrm>
+            <a:off x="1103312" y="1359244"/>
+            <a:ext cx="8946541" cy="4889156"/>
+          </a:xfrm>
+        </p:spPr>
+        <p:txBody>
+          <a:bodyPr>
+            <a:normAutofit/>
+          </a:bodyPr>
+          <a:lstStyle/>
+          <a:p>
+            <a:r>
+              <a:rPr lang="en-US" dirty="0" smtClean="0"/>
+              <a:t>There are funny things about the original works and up to and including work on it in 2010.</a:t>
+            </a:r>
+          </a:p>
+          <a:p>
+            <a:r>
+              <a:rPr lang="en-US" dirty="0" smtClean="0"/>
+              <a:t>Was focused on work done in object-oriented systems, which were hard to scale out. Largest thrust was on scoping down and focusing on controlling inputs and outputs of components (not called “services” originally). </a:t>
+            </a:r>
+          </a:p>
+          <a:p>
+            <a:r>
+              <a:rPr lang="en-US" dirty="0" smtClean="0"/>
+              <a:t>“services” were mentioned: operations that do not conceptually belong to objects. </a:t>
+            </a:r>
+            <a:r>
+              <a:rPr lang="en-US" dirty="0" smtClean="0">
+                <a:sym typeface="Wingdings" panose="05000000000000000000" pitchFamily="2" charset="2"/>
+              </a:rPr>
+              <a:t></a:t>
+            </a:r>
+          </a:p>
+          <a:p>
+            <a:r>
+              <a:rPr lang="en-US" dirty="0" smtClean="0">
+                <a:sym typeface="Wingdings" panose="05000000000000000000" pitchFamily="2" charset="2"/>
+              </a:rPr>
+              <a:t>Microsoft’s take in </a:t>
+            </a:r>
+            <a:r>
+              <a:rPr lang="en-US" dirty="0" smtClean="0">
+                <a:sym typeface="Wingdings" panose="05000000000000000000" pitchFamily="2" charset="2"/>
+                <a:hlinkClick r:id="rId2"/>
+              </a:rPr>
+              <a:t>2009 guidance</a:t>
+            </a:r>
+            <a:r>
+              <a:rPr lang="en-US" dirty="0" smtClean="0">
+                <a:sym typeface="Wingdings" panose="05000000000000000000" pitchFamily="2" charset="2"/>
+              </a:rPr>
+              <a:t>:</a:t>
+            </a:r>
+            <a:br>
+              <a:rPr lang="en-US" dirty="0" smtClean="0">
+                <a:sym typeface="Wingdings" panose="05000000000000000000" pitchFamily="2" charset="2"/>
+              </a:rPr>
+            </a:br>
+            <a:r>
+              <a:rPr lang="en-US" sz="1300" dirty="0" smtClean="0">
+                <a:sym typeface="Wingdings" panose="05000000000000000000" pitchFamily="2" charset="2"/>
+              </a:rPr>
+              <a:t>“</a:t>
+            </a:r>
+            <a:r>
+              <a:rPr lang="en-US" sz="1300" dirty="0"/>
+              <a:t>In order to help maintain the model as a pure and helpful language construct, you must typically implement a great deal of isolation and encapsulation within the domain model. Consequently, a system based on Domain Driven Design can come at a relatively high cost. While Domain Driven Design provides many technical benefits, such as maintainability</a:t>
+            </a:r>
+            <a:r>
+              <a:rPr lang="en-US" sz="1300" b="1" dirty="0">
+                <a:solidFill>
+                  <a:srgbClr val="FFFF00"/>
+                </a:solidFill>
+              </a:rPr>
+              <a:t>, it should be applied only to complex domains where the model and the linguistic processes provide clear benefits in the communication of complex information</a:t>
+            </a:r>
+            <a:r>
+              <a:rPr lang="en-US" sz="1300" dirty="0"/>
+              <a:t>, and in the formulation of a </a:t>
+            </a:r>
+            <a:r>
+              <a:rPr lang="en-US" sz="1300" dirty="0" smtClean="0"/>
+              <a:t>common </a:t>
+            </a:r>
+            <a:r>
+              <a:rPr lang="en-US" sz="1300" dirty="0"/>
+              <a:t>understanding of the domain</a:t>
+            </a:r>
+            <a:r>
+              <a:rPr lang="en-US" sz="1300" dirty="0" smtClean="0"/>
+              <a:t>.</a:t>
+            </a:r>
+            <a:r>
+              <a:rPr lang="en-US" sz="1300" dirty="0" smtClean="0">
+                <a:sym typeface="Wingdings" panose="05000000000000000000" pitchFamily="2" charset="2"/>
+              </a:rPr>
+              <a:t>”</a:t>
+            </a:r>
+          </a:p>
+        </p:txBody>
+      </p:sp>
+    </p:spTree>
+    <p:extLst>
+      <p:ext uri="{BB962C8B-B14F-4D97-AF65-F5344CB8AC3E}">
+        <p14:creationId xmlns:p14="http://schemas.microsoft.com/office/powerpoint/2010/main" val="46852448"/>
+      </p:ext>
+    </p:extLst>
+  </p:cSld>
+  <p:clrMapOvr>
+    <a:masterClrMapping/>
+  </p:clrMapOvr>
+  <p:timing>
+    <p:tnLst>
+      <p:par>
+        <p:cTn id="1" dur="indefinite" restart="never" nodeType="tmRoot"/>
+      </p:par>
+    </p:tnLst>
+  </p:timing>
+</p:sld>
+</file>
+
+<file path=ppt/slides/slide2.xml><?xml version="1.0" encoding="utf-8"?>
+<p:sld xmlns:a="http://schemas.openxmlformats.org/drawingml/2006/main" xmlns:r="http://schemas.openxmlformats.org/officeDocument/2006/relationships" xmlns:p="http://schemas.openxmlformats.org/presentationml/2006/main">
+  <p:cSld>
+    <p:spTree>
+      <p:nvGrpSpPr>
+        <p:cNvPr id="1" name=""/>
+        <p:cNvGrpSpPr/>
+        <p:nvPr/>
+      </p:nvGrpSpPr>
+      <p:grpSpPr>
+        <a:xfrm>
+          <a:off x="0" y="0"/>
+          <a:ext cx="0" cy="0"/>
+          <a:chOff x="0" y="0"/>
+          <a:chExt cx="0" cy="0"/>
+        </a:xfrm>
+      </p:grpSpPr>
+      <p:sp>
+        <p:nvSpPr>
+          <p:cNvPr id="2" name="Title 1"/>
+          <p:cNvSpPr>
+            <a:spLocks noGrp="1"/>
+          </p:cNvSpPr>
+          <p:nvPr>
+            <p:ph type="title"/>
+          </p:nvPr>
+        </p:nvSpPr>
+        <p:spPr/>
+        <p:txBody>
+          <a:bodyPr/>
+          <a:lstStyle/>
+          <a:p>
+            <a:r>
+              <a:rPr lang="en-US" dirty="0" smtClean="0"/>
+              <a:t>The short version</a:t>
+            </a:r>
+            <a:endParaRPr lang="en-US" dirty="0"/>
+          </a:p>
+        </p:txBody>
+      </p:sp>
+      <p:sp>
+        <p:nvSpPr>
+          <p:cNvPr id="3" name="Content Placeholder 2"/>
+          <p:cNvSpPr>
+            <a:spLocks noGrp="1"/>
+          </p:cNvSpPr>
+          <p:nvPr>
+            <p:ph idx="1"/>
+          </p:nvPr>
+        </p:nvSpPr>
+        <p:spPr/>
+        <p:txBody>
+          <a:bodyPr/>
+          <a:lstStyle/>
+          <a:p>
+            <a:r>
+              <a:rPr lang="en-US" dirty="0" smtClean="0"/>
+              <a:t>What a </a:t>
+            </a:r>
+            <a:r>
+              <a:rPr lang="en-US" dirty="0" err="1" smtClean="0"/>
+              <a:t>microservice</a:t>
+            </a:r>
+            <a:r>
+              <a:rPr lang="en-US" dirty="0" smtClean="0"/>
+              <a:t> architecture is</a:t>
+            </a:r>
+          </a:p>
+          <a:p>
+            <a:r>
+              <a:rPr lang="en-US" dirty="0" smtClean="0"/>
+              <a:t>Why now</a:t>
+            </a:r>
+          </a:p>
+          <a:p>
+            <a:r>
+              <a:rPr lang="en-US" dirty="0" smtClean="0"/>
+              <a:t>What you need to know</a:t>
+            </a:r>
+            <a:endParaRPr lang="en-US" dirty="0"/>
+          </a:p>
+        </p:txBody>
+      </p:sp>
+    </p:spTree>
+    <p:extLst>
+      <p:ext uri="{BB962C8B-B14F-4D97-AF65-F5344CB8AC3E}">
+        <p14:creationId xmlns:p14="http://schemas.microsoft.com/office/powerpoint/2010/main" val="184206870"/>
+      </p:ext>
+    </p:extLst>
+  </p:cSld>
+  <p:clrMapOvr>
+    <a:masterClrMapping/>
+  </p:clrMapOvr>
+  <mc:AlternateContent xmlns:mc="http://schemas.openxmlformats.org/markup-compatibility/2006" xmlns:p14="http://schemas.microsoft.com/office/powerpoint/2010/main">
+    <mc:Choice Requires="p14">
+      <p:transition spd="med" p14:dur="700">
+        <p:fade/>
+      </p:transition>
+    </mc:Choice>
+    <mc:Fallback xmlns="">
+      <p:transition spd="med">
+        <p:fade/>
+      </p:transition>
+    </mc:Fallback>
+  </mc:AlternateContent>
+  <p:timing>
+    <p:tnLst>
+      <p:par>
+        <p:cTn id="1" dur="indefinite" restart="never" nodeType="tmRoot"/>
+      </p:par>
+    </p:tnLst>
+  </p:timing>
+</p:sld>
+</file>
+
+<file path=ppt/slides/slide20.xml><?xml version="1.0" encoding="utf-8"?>
+<p:sld xmlns:a="http://schemas.openxmlformats.org/drawingml/2006/main" xmlns:r="http://schemas.openxmlformats.org/officeDocument/2006/relationships" xmlns:p="http://schemas.openxmlformats.org/presentationml/2006/main">
+  <p:cSld>
+    <p:spTree>
+      <p:nvGrpSpPr>
+        <p:cNvPr id="1" name=""/>
+        <p:cNvGrpSpPr/>
+        <p:nvPr/>
+      </p:nvGrpSpPr>
+      <p:grpSpPr>
+        <a:xfrm>
+          <a:off x="0" y="0"/>
+          <a:ext cx="0" cy="0"/>
+          <a:chOff x="0" y="0"/>
+          <a:chExt cx="0" cy="0"/>
+        </a:xfrm>
+      </p:grpSpPr>
+      <p:sp>
+        <p:nvSpPr>
+          <p:cNvPr id="2" name="Title 1"/>
+          <p:cNvSpPr>
+            <a:spLocks noGrp="1"/>
+          </p:cNvSpPr>
+          <p:nvPr>
+            <p:ph type="title"/>
+          </p:nvPr>
+        </p:nvSpPr>
+        <p:spPr/>
+        <p:txBody>
+          <a:bodyPr/>
+          <a:lstStyle/>
+          <a:p>
+            <a:r>
+              <a:rPr lang="en-US" dirty="0" smtClean="0"/>
+              <a:t>My take on DDD, Part Three</a:t>
+            </a:r>
+            <a:endParaRPr lang="en-US" dirty="0"/>
+          </a:p>
+        </p:txBody>
+      </p:sp>
+      <p:sp>
+        <p:nvSpPr>
+          <p:cNvPr id="3" name="Content Placeholder 2"/>
+          <p:cNvSpPr>
+            <a:spLocks noGrp="1"/>
+          </p:cNvSpPr>
+          <p:nvPr>
+            <p:ph idx="1"/>
+          </p:nvPr>
+        </p:nvSpPr>
+        <p:spPr/>
+        <p:txBody>
+          <a:bodyPr/>
+          <a:lstStyle/>
+          <a:p>
+            <a:r>
+              <a:rPr lang="en-US" dirty="0">
+                <a:sym typeface="Wingdings" panose="05000000000000000000" pitchFamily="2" charset="2"/>
+              </a:rPr>
+              <a:t>Hilarious. Sounds like, if you embrace the </a:t>
+            </a:r>
+            <a:r>
+              <a:rPr lang="en-US" dirty="0" err="1">
+                <a:sym typeface="Wingdings" panose="05000000000000000000" pitchFamily="2" charset="2"/>
+              </a:rPr>
+              <a:t>microservice</a:t>
+            </a:r>
+            <a:r>
+              <a:rPr lang="en-US" dirty="0">
+                <a:sym typeface="Wingdings" panose="05000000000000000000" pitchFamily="2" charset="2"/>
+              </a:rPr>
+              <a:t> way, you’re going to be embracing a </a:t>
+            </a:r>
+            <a:r>
+              <a:rPr lang="en-US" i="1" dirty="0">
+                <a:sym typeface="Wingdings" panose="05000000000000000000" pitchFamily="2" charset="2"/>
+              </a:rPr>
+              <a:t>strongly </a:t>
+            </a:r>
+            <a:r>
+              <a:rPr lang="en-US" dirty="0">
+                <a:sym typeface="Wingdings" panose="05000000000000000000" pitchFamily="2" charset="2"/>
+              </a:rPr>
+              <a:t>domain-driven design approach. Each </a:t>
+            </a:r>
+            <a:r>
+              <a:rPr lang="en-US" dirty="0" err="1">
+                <a:sym typeface="Wingdings" panose="05000000000000000000" pitchFamily="2" charset="2"/>
+              </a:rPr>
+              <a:t>microservice</a:t>
+            </a:r>
+            <a:r>
+              <a:rPr lang="en-US" dirty="0">
+                <a:sym typeface="Wingdings" panose="05000000000000000000" pitchFamily="2" charset="2"/>
+              </a:rPr>
+              <a:t> has its own strongly bounded domain context; they are immutable once deployed; they expose only their own contracts; they perform only one business task.</a:t>
+            </a:r>
+            <a:endParaRPr lang="en-US" dirty="0"/>
+          </a:p>
+          <a:p>
+            <a:r>
+              <a:rPr lang="en-US" dirty="0" smtClean="0"/>
+              <a:t>Performing your work this way leads you directly into a strong consideration of another approach, Command Query Responsibility Segregation (CQRS), which is an approach that firmly keeps read requests separate from write requests. </a:t>
+            </a:r>
+          </a:p>
+          <a:p>
+            <a:r>
+              <a:rPr lang="en-US" dirty="0" smtClean="0"/>
+              <a:t>Finally, note that DDD </a:t>
+            </a:r>
+            <a:r>
+              <a:rPr lang="en-US" i="1" dirty="0" smtClean="0"/>
+              <a:t>says nothing about persistence</a:t>
+            </a:r>
+            <a:r>
+              <a:rPr lang="en-US" dirty="0" smtClean="0"/>
+              <a:t>. That is not part of “the model”.</a:t>
+            </a:r>
+            <a:endParaRPr lang="en-US" dirty="0"/>
+          </a:p>
+        </p:txBody>
+      </p:sp>
+    </p:spTree>
+    <p:extLst>
+      <p:ext uri="{BB962C8B-B14F-4D97-AF65-F5344CB8AC3E}">
+        <p14:creationId xmlns:p14="http://schemas.microsoft.com/office/powerpoint/2010/main" val="435968076"/>
+      </p:ext>
+    </p:extLst>
+  </p:cSld>
+  <p:clrMapOvr>
+    <a:masterClrMapping/>
+  </p:clrMapOvr>
+  <p:timing>
+    <p:tnLst>
+      <p:par>
+        <p:cTn id="1" dur="indefinite" restart="never" nodeType="tmRoot"/>
+      </p:par>
+    </p:tnLst>
+  </p:timing>
+</p:sld>
+</file>
+
+<file path=ppt/slides/slide21.xml><?xml version="1.0" encoding="utf-8"?>
+<p:sld xmlns:a="http://schemas.openxmlformats.org/drawingml/2006/main" xmlns:r="http://schemas.openxmlformats.org/officeDocument/2006/relationships" xmlns:p="http://schemas.openxmlformats.org/presentationml/2006/main">
+  <p:cSld>
+    <p:spTree>
+      <p:nvGrpSpPr>
+        <p:cNvPr id="1" name=""/>
+        <p:cNvGrpSpPr/>
+        <p:nvPr/>
+      </p:nvGrpSpPr>
+      <p:grpSpPr>
+        <a:xfrm>
+          <a:off x="0" y="0"/>
+          <a:ext cx="0" cy="0"/>
+          <a:chOff x="0" y="0"/>
+          <a:chExt cx="0" cy="0"/>
+        </a:xfrm>
+      </p:grpSpPr>
+      <p:sp>
+        <p:nvSpPr>
+          <p:cNvPr id="2" name="Title 1"/>
+          <p:cNvSpPr>
+            <a:spLocks noGrp="1"/>
+          </p:cNvSpPr>
+          <p:nvPr>
+            <p:ph type="title"/>
+          </p:nvPr>
+        </p:nvSpPr>
+        <p:spPr/>
+        <p:txBody>
+          <a:bodyPr/>
+          <a:lstStyle/>
+          <a:p>
+            <a:r>
+              <a:rPr lang="en-US" dirty="0" smtClean="0"/>
               <a:t>Things to </a:t>
             </a:r>
             <a:r>
@@ -9802,13 +10425,13 @@
   <p:clrMapOvr>
     <a:masterClrMapping/>
   </p:clrMapOvr>
-  <mc:AlternateContent xmlns:mc="http://schemas.openxmlformats.org/markup-compatibility/2006">
-    <mc:Choice xmlns:p14="http://schemas.microsoft.com/office/powerpoint/2010/main" Requires="p14">
+  <mc:AlternateContent xmlns:mc="http://schemas.openxmlformats.org/markup-compatibility/2006" xmlns:p14="http://schemas.microsoft.com/office/powerpoint/2010/main">
+    <mc:Choice Requires="p14">
       <p:transition spd="med" p14:dur="700">
         <p:fade/>
       </p:transition>
     </mc:Choice>
-    <mc:Fallback>
+    <mc:Fallback xmlns="">
       <p:transition spd="med">
         <p:fade/>
       </p:transition>
@@ -10381,7 +11004,7 @@
 </p:sld>
 </file>
 
-<file path=ppt/slides/slide18.xml><?xml version="1.0" encoding="utf-8"?>
+<file path=ppt/slides/slide22.xml><?xml version="1.0" encoding="utf-8"?>
 <p:sld xmlns:a="http://schemas.openxmlformats.org/drawingml/2006/main" xmlns:r="http://schemas.openxmlformats.org/officeDocument/2006/relationships" xmlns:p="http://schemas.openxmlformats.org/presentationml/2006/main">
   <p:cSld>
     <p:spTree>
@@ -10469,13 +11092,13 @@
   <p:clrMapOvr>
     <a:masterClrMapping/>
   </p:clrMapOvr>
-  <mc:AlternateContent xmlns:mc="http://schemas.openxmlformats.org/markup-compatibility/2006">
-    <mc:Choice xmlns:p14="http://schemas.microsoft.com/office/powerpoint/2010/main" Requires="p14">
+  <mc:AlternateContent xmlns:mc="http://schemas.openxmlformats.org/markup-compatibility/2006" xmlns:p14="http://schemas.microsoft.com/office/powerpoint/2010/main">
+    <mc:Choice Requires="p14">
       <p:transition spd="med" p14:dur="700">
         <p:fade/>
       </p:transition>
     </mc:Choice>
-    <mc:Fallback>
+    <mc:Fallback xmlns="">
       <p:transition spd="med">
         <p:fade/>
       </p:transition>
@@ -10491,7 +11114,7 @@
 </p:sld>
 </file>
 
-<file path=ppt/slides/slide19.xml><?xml version="1.0" encoding="utf-8"?>
+<file path=ppt/slides/slide23.xml><?xml version="1.0" encoding="utf-8"?>
 <p:sld xmlns:a="http://schemas.openxmlformats.org/drawingml/2006/main" xmlns:r="http://schemas.openxmlformats.org/officeDocument/2006/relationships" xmlns:p="http://schemas.openxmlformats.org/presentationml/2006/main">
   <p:cSld>
     <p:spTree>
@@ -10640,13 +11263,13 @@
   <p:clrMapOvr>
     <a:masterClrMapping/>
   </p:clrMapOvr>
-  <mc:AlternateContent xmlns:mc="http://schemas.openxmlformats.org/markup-compatibility/2006">
-    <mc:Choice xmlns:p14="http://schemas.microsoft.com/office/powerpoint/2010/main" Requires="p14">
+  <mc:AlternateContent xmlns:mc="http://schemas.openxmlformats.org/markup-compatibility/2006" xmlns:p14="http://schemas.microsoft.com/office/powerpoint/2010/main">
+    <mc:Choice Requires="p14">
       <p:transition spd="med" p14:dur="700">
         <p:fade/>
       </p:transition>
     </mc:Choice>
-    <mc:Fallback>
+    <mc:Fallback xmlns="">
       <p:transition spd="med">
         <p:fade/>
       </p:transition>
@@ -10957,7 +11580,7 @@
 </p:sld>
 </file>
 
-<file path=ppt/slides/slide2.xml><?xml version="1.0" encoding="utf-8"?>
+<file path=ppt/slides/slide24.xml><?xml version="1.0" encoding="utf-8"?>
 <p:sld xmlns:a="http://schemas.openxmlformats.org/drawingml/2006/main" xmlns:r="http://schemas.openxmlformats.org/officeDocument/2006/relationships" xmlns:p="http://schemas.openxmlformats.org/presentationml/2006/main">
   <p:cSld>
     <p:spTree>
@@ -10991,7 +11614,7 @@
           <a:p>
             <a:r>
               <a:rPr lang="en-US" dirty="0" smtClean="0"/>
-              <a:t>The short version</a:t>
+              <a:t>Point: if things fail, design for failure</a:t>
             </a:r>
             <a:endParaRPr lang="en-US" dirty="0"/>
           </a:p>
@@ -11014,49 +11637,36 @@
           <a:p>
             <a:r>
               <a:rPr lang="en-US" dirty="0" smtClean="0"/>
-              <a:t>What a </a:t>
-            </a:r>
-            <a:r>
-              <a:rPr lang="en-US" dirty="0" err="1" smtClean="0"/>
-              <a:t>microservice</a:t>
-            </a:r>
-            <a:r>
-              <a:rPr lang="en-US" dirty="0" smtClean="0"/>
-              <a:t> architecture is</a:t>
-            </a:r>
-          </a:p>
-          <a:p>
-            <a:r>
-              <a:rPr lang="en-US" dirty="0" smtClean="0"/>
-              <a:t>Why now</a:t>
-            </a:r>
-          </a:p>
-          <a:p>
-            <a:r>
-              <a:rPr lang="en-US" dirty="0" smtClean="0"/>
-              <a:t>What you need to know</a:t>
-            </a:r>
-            <a:endParaRPr lang="en-US" dirty="0"/>
+              <a:t>Story: disks fail constantly. In a datacenter, disk are </a:t>
+            </a:r>
+            <a:r>
+              <a:rPr lang="en-US" i="1" dirty="0" smtClean="0"/>
+              <a:t>constantly failing</a:t>
+            </a:r>
+            <a:r>
+              <a:rPr lang="en-US" dirty="0" smtClean="0"/>
+              <a:t>. You should expect that each component of your application could hit that disk at any time. Your components should think that’s normal – it’ll happen to them.</a:t>
+            </a:r>
           </a:p>
         </p:txBody>
       </p:sp>
     </p:spTree>
     <p:extLst>
       <p:ext uri="{BB962C8B-B14F-4D97-AF65-F5344CB8AC3E}">
-        <p14:creationId xmlns:p14="http://schemas.microsoft.com/office/powerpoint/2010/main" val="184206870"/>
+        <p14:creationId xmlns:p14="http://schemas.microsoft.com/office/powerpoint/2010/main" val="2533685319"/>
       </p:ext>
     </p:extLst>
   </p:cSld>
   <p:clrMapOvr>
     <a:masterClrMapping/>
   </p:clrMapOvr>
-  <mc:AlternateContent xmlns:mc="http://schemas.openxmlformats.org/markup-compatibility/2006">
-    <mc:Choice xmlns:p14="http://schemas.microsoft.com/office/powerpoint/2010/main" Requires="p14">
+  <mc:AlternateContent xmlns:mc="http://schemas.openxmlformats.org/markup-compatibility/2006" xmlns:p14="http://schemas.microsoft.com/office/powerpoint/2010/main">
+    <mc:Choice Requires="p14">
       <p:transition spd="med" p14:dur="700">
         <p:fade/>
       </p:transition>
     </mc:Choice>
-    <mc:Fallback>
+    <mc:Fallback xmlns="">
       <p:transition spd="med">
         <p:fade/>
       </p:transition>
@@ -11072,7 +11682,7 @@
 </p:sld>
 </file>
 
-<file path=ppt/slides/slide20.xml><?xml version="1.0" encoding="utf-8"?>
+<file path=ppt/slides/slide25.xml><?xml version="1.0" encoding="utf-8"?>
 <p:sld xmlns:a="http://schemas.openxmlformats.org/drawingml/2006/main" xmlns:r="http://schemas.openxmlformats.org/officeDocument/2006/relationships" xmlns:p="http://schemas.openxmlformats.org/presentationml/2006/main">
   <p:cSld>
     <p:spTree>
@@ -11106,113 +11716,6 @@
           <a:p>
             <a:r>
               <a:rPr lang="en-US" dirty="0" smtClean="0"/>
-              <a:t>Point: if things fail, design for failure</a:t>
-            </a:r>
-            <a:endParaRPr lang="en-US" dirty="0"/>
-          </a:p>
-        </p:txBody>
-      </p:sp>
-      <p:sp>
-        <p:nvSpPr>
-          <p:cNvPr id="3" name="Content Placeholder 2"/>
-          <p:cNvSpPr>
-            <a:spLocks noGrp="1"/>
-          </p:cNvSpPr>
-          <p:nvPr>
-            <p:ph idx="1"/>
-          </p:nvPr>
-        </p:nvSpPr>
-        <p:spPr/>
-        <p:txBody>
-          <a:bodyPr/>
-          <a:lstStyle/>
-          <a:p>
-            <a:r>
-              <a:rPr lang="en-US" dirty="0" smtClean="0"/>
-              <a:t>Story: disks fail constantly. In a datacenter, disk are </a:t>
-            </a:r>
-            <a:r>
-              <a:rPr lang="en-US" i="1" dirty="0" smtClean="0"/>
-              <a:t>constantly failing</a:t>
-            </a:r>
-            <a:r>
-              <a:rPr lang="en-US" dirty="0" smtClean="0"/>
-              <a:t>. You should expect that each component of your application could hit that disk at any time. Your components should think that’s normal – it’ll happen to them</a:t>
-            </a:r>
-            <a:r>
-              <a:rPr lang="en-US" dirty="0" smtClean="0"/>
-              <a:t>.</a:t>
-            </a:r>
-            <a:endParaRPr lang="en-US" dirty="0" smtClean="0"/>
-          </a:p>
-        </p:txBody>
-      </p:sp>
-    </p:spTree>
-    <p:extLst>
-      <p:ext uri="{BB962C8B-B14F-4D97-AF65-F5344CB8AC3E}">
-        <p14:creationId xmlns:p14="http://schemas.microsoft.com/office/powerpoint/2010/main" val="2533685319"/>
-      </p:ext>
-    </p:extLst>
-  </p:cSld>
-  <p:clrMapOvr>
-    <a:masterClrMapping/>
-  </p:clrMapOvr>
-  <mc:AlternateContent xmlns:mc="http://schemas.openxmlformats.org/markup-compatibility/2006">
-    <mc:Choice xmlns:p14="http://schemas.microsoft.com/office/powerpoint/2010/main" Requires="p14">
-      <p:transition spd="med" p14:dur="700">
-        <p:fade/>
-      </p:transition>
-    </mc:Choice>
-    <mc:Fallback>
-      <p:transition spd="med">
-        <p:fade/>
-      </p:transition>
-    </mc:Fallback>
-  </mc:AlternateContent>
-  <p:timing>
-    <p:tnLst>
-      <p:par>
-        <p:cTn id="1" dur="indefinite" restart="never" nodeType="tmRoot"/>
-      </p:par>
-    </p:tnLst>
-  </p:timing>
-</p:sld>
-</file>
-
-<file path=ppt/slides/slide21.xml><?xml version="1.0" encoding="utf-8"?>
-<p:sld xmlns:a="http://schemas.openxmlformats.org/drawingml/2006/main" xmlns:r="http://schemas.openxmlformats.org/officeDocument/2006/relationships" xmlns:p="http://schemas.openxmlformats.org/presentationml/2006/main">
-  <p:cSld>
-    <p:spTree>
-      <p:nvGrpSpPr>
-        <p:cNvPr id="1" name=""/>
-        <p:cNvGrpSpPr/>
-        <p:nvPr/>
-      </p:nvGrpSpPr>
-      <p:grpSpPr>
-        <a:xfrm>
-          <a:off x="0" y="0"/>
-          <a:ext cx="0" cy="0"/>
-          <a:chOff x="0" y="0"/>
-          <a:chExt cx="0" cy="0"/>
-        </a:xfrm>
-      </p:grpSpPr>
-      <p:sp>
-        <p:nvSpPr>
-          <p:cNvPr id="2" name="Title 1"/>
-          <p:cNvSpPr>
-            <a:spLocks noGrp="1"/>
-          </p:cNvSpPr>
-          <p:nvPr>
-            <p:ph type="title"/>
-          </p:nvPr>
-        </p:nvSpPr>
-        <p:spPr/>
-        <p:txBody>
-          <a:bodyPr/>
-          <a:lstStyle/>
-          <a:p>
-            <a:r>
-              <a:rPr lang="en-US" dirty="0" smtClean="0"/>
               <a:t>Point: Do you wash your rental car? </a:t>
             </a:r>
             <a:endParaRPr lang="en-US" dirty="0"/>
@@ -11336,13 +11839,13 @@
   <p:clrMapOvr>
     <a:masterClrMapping/>
   </p:clrMapOvr>
-  <mc:AlternateContent xmlns:mc="http://schemas.openxmlformats.org/markup-compatibility/2006">
-    <mc:Choice xmlns:p14="http://schemas.microsoft.com/office/powerpoint/2010/main" Requires="p14">
+  <mc:AlternateContent xmlns:mc="http://schemas.openxmlformats.org/markup-compatibility/2006" xmlns:p14="http://schemas.microsoft.com/office/powerpoint/2010/main">
+    <mc:Choice Requires="p14">
       <p:transition spd="med" p14:dur="700">
         <p:fade/>
       </p:transition>
     </mc:Choice>
-    <mc:Fallback>
+    <mc:Fallback xmlns="">
       <p:transition spd="med">
         <p:fade/>
       </p:transition>
@@ -11782,7 +12285,7 @@
 </p:sld>
 </file>
 
-<file path=ppt/slides/slide22.xml><?xml version="1.0" encoding="utf-8"?>
+<file path=ppt/slides/slide26.xml><?xml version="1.0" encoding="utf-8"?>
 <p:sld xmlns:a="http://schemas.openxmlformats.org/drawingml/2006/main" xmlns:r="http://schemas.openxmlformats.org/officeDocument/2006/relationships" xmlns:p="http://schemas.openxmlformats.org/presentationml/2006/main">
   <p:cSld>
     <p:spTree>
@@ -11816,11 +12319,7 @@
           <a:p>
             <a:r>
               <a:rPr lang="en-US" dirty="0" smtClean="0"/>
-              <a:t>Point: Do </a:t>
-            </a:r>
-            <a:r>
-              <a:rPr lang="en-US" dirty="0" smtClean="0"/>
-              <a:t>worry that your rental car has a problem, or drop it and get a new one? </a:t>
+              <a:t>Point: Do worry that your rental car has a problem, or drop it and get a new one? </a:t>
             </a:r>
             <a:endParaRPr lang="en-US" dirty="0"/>
           </a:p>
@@ -11836,13 +12335,13 @@
   <p:clrMapOvr>
     <a:masterClrMapping/>
   </p:clrMapOvr>
-  <mc:AlternateContent xmlns:mc="http://schemas.openxmlformats.org/markup-compatibility/2006">
-    <mc:Choice xmlns:p14="http://schemas.microsoft.com/office/powerpoint/2010/main" Requires="p14">
+  <mc:AlternateContent xmlns:mc="http://schemas.openxmlformats.org/markup-compatibility/2006" xmlns:p14="http://schemas.microsoft.com/office/powerpoint/2010/main">
+    <mc:Choice Requires="p14">
       <p:transition spd="med" p14:dur="700">
         <p:fade/>
       </p:transition>
     </mc:Choice>
-    <mc:Fallback>
+    <mc:Fallback xmlns="">
       <p:transition spd="med">
         <p:fade/>
       </p:transition>
@@ -11858,7 +12357,7 @@
 </p:sld>
 </file>
 
-<file path=ppt/slides/slide23.xml><?xml version="1.0" encoding="utf-8"?>
+<file path=ppt/slides/slide27.xml><?xml version="1.0" encoding="utf-8"?>
 <p:sld xmlns:a="http://schemas.openxmlformats.org/drawingml/2006/main" xmlns:r="http://schemas.openxmlformats.org/officeDocument/2006/relationships" xmlns:p="http://schemas.openxmlformats.org/presentationml/2006/main">
   <p:cSld>
     <p:spTree>
@@ -11898,7 +12397,6 @@
               <a:rPr lang="en-US" dirty="0"/>
               <a:t>Do worry that your rental car has a problem, or drop it and get a new one? </a:t>
             </a:r>
-            <a:endParaRPr lang="en-US" dirty="0"/>
           </a:p>
         </p:txBody>
       </p:sp>
@@ -12180,13 +12678,13 @@
   <p:clrMapOvr>
     <a:masterClrMapping/>
   </p:clrMapOvr>
-  <mc:AlternateContent xmlns:mc="http://schemas.openxmlformats.org/markup-compatibility/2006">
-    <mc:Choice xmlns:p14="http://schemas.microsoft.com/office/powerpoint/2010/main" Requires="p14">
+  <mc:AlternateContent xmlns:mc="http://schemas.openxmlformats.org/markup-compatibility/2006" xmlns:p14="http://schemas.microsoft.com/office/powerpoint/2010/main">
+    <mc:Choice Requires="p14">
       <p:transition spd="med" p14:dur="700">
         <p:fade/>
       </p:transition>
     </mc:Choice>
-    <mc:Fallback>
+    <mc:Fallback xmlns="">
       <p:transition spd="med">
         <p:fade/>
       </p:transition>
@@ -12202,7 +12700,7 @@
 </p:sld>
 </file>
 
-<file path=ppt/slides/slide24.xml><?xml version="1.0" encoding="utf-8"?>
+<file path=ppt/slides/slide28.xml><?xml version="1.0" encoding="utf-8"?>
 <p:sld xmlns:a="http://schemas.openxmlformats.org/drawingml/2006/main" xmlns:r="http://schemas.openxmlformats.org/officeDocument/2006/relationships" xmlns:p="http://schemas.openxmlformats.org/presentationml/2006/main">
   <p:cSld>
     <p:spTree>
@@ -12316,11 +12814,11 @@
   <p:clrMapOvr>
     <a:masterClrMapping/>
   </p:clrMapOvr>
-  <mc:AlternateContent xmlns:mc="http://schemas.openxmlformats.org/markup-compatibility/2006">
-    <mc:Choice xmlns:p14="http://schemas.microsoft.com/office/powerpoint/2010/main" Requires="p14">
+  <mc:AlternateContent xmlns:mc="http://schemas.openxmlformats.org/markup-compatibility/2006" xmlns:p14="http://schemas.microsoft.com/office/powerpoint/2010/main">
+    <mc:Choice Requires="p14">
       <p:transition spd="slow" p14:dur="2000"/>
     </mc:Choice>
-    <mc:Fallback>
+    <mc:Fallback xmlns="">
       <p:transition spd="slow"/>
     </mc:Fallback>
   </mc:AlternateContent>
@@ -12334,7 +12832,7 @@
 </p:sld>
 </file>
 
-<file path=ppt/slides/slide25.xml><?xml version="1.0" encoding="utf-8"?>
+<file path=ppt/slides/slide29.xml><?xml version="1.0" encoding="utf-8"?>
 <p:sld xmlns:a="http://schemas.openxmlformats.org/drawingml/2006/main" xmlns:r="http://schemas.openxmlformats.org/officeDocument/2006/relationships" xmlns:p="http://schemas.openxmlformats.org/presentationml/2006/main">
   <p:cSld>
     <p:spTree>
@@ -12425,524 +12923,12 @@
   <p:clrMapOvr>
     <a:masterClrMapping/>
   </p:clrMapOvr>
-  <mc:AlternateContent xmlns:mc="http://schemas.openxmlformats.org/markup-compatibility/2006">
-    <mc:Choice xmlns:p14="http://schemas.microsoft.com/office/powerpoint/2010/main" Requires="p14">
+  <mc:AlternateContent xmlns:mc="http://schemas.openxmlformats.org/markup-compatibility/2006" xmlns:p14="http://schemas.microsoft.com/office/powerpoint/2010/main">
+    <mc:Choice Requires="p14">
       <p:transition spd="slow" p14:dur="2000"/>
     </mc:Choice>
-    <mc:Fallback>
+    <mc:Fallback xmlns="">
       <p:transition spd="slow"/>
-    </mc:Fallback>
-  </mc:AlternateContent>
-  <p:timing>
-    <p:tnLst>
-      <p:par>
-        <p:cTn id="1" dur="indefinite" restart="never" nodeType="tmRoot"/>
-      </p:par>
-    </p:tnLst>
-  </p:timing>
-</p:sld>
-</file>
-
-<file path=ppt/slides/slide26.xml><?xml version="1.0" encoding="utf-8"?>
-<p:sld xmlns:a="http://schemas.openxmlformats.org/drawingml/2006/main" xmlns:r="http://schemas.openxmlformats.org/officeDocument/2006/relationships" xmlns:p="http://schemas.openxmlformats.org/presentationml/2006/main">
-  <p:cSld>
-    <p:spTree>
-      <p:nvGrpSpPr>
-        <p:cNvPr id="1" name=""/>
-        <p:cNvGrpSpPr/>
-        <p:nvPr/>
-      </p:nvGrpSpPr>
-      <p:grpSpPr>
-        <a:xfrm>
-          <a:off x="0" y="0"/>
-          <a:ext cx="0" cy="0"/>
-          <a:chOff x="0" y="0"/>
-          <a:chExt cx="0" cy="0"/>
-        </a:xfrm>
-      </p:grpSpPr>
-      <p:sp>
-        <p:nvSpPr>
-          <p:cNvPr id="2" name="Title 1"/>
-          <p:cNvSpPr>
-            <a:spLocks noGrp="1"/>
-          </p:cNvSpPr>
-          <p:nvPr>
-            <p:ph type="title"/>
-          </p:nvPr>
-        </p:nvSpPr>
-        <p:spPr/>
-        <p:txBody>
-          <a:bodyPr/>
-          <a:lstStyle/>
-          <a:p>
-            <a:r>
-              <a:rPr lang="en-US" dirty="0" smtClean="0"/>
-              <a:t>Point: CAP theorem pushes us towards</a:t>
-            </a:r>
-            <a:endParaRPr lang="en-US" dirty="0"/>
-          </a:p>
-        </p:txBody>
-      </p:sp>
-      <p:sp>
-        <p:nvSpPr>
-          <p:cNvPr id="3" name="Content Placeholder 2"/>
-          <p:cNvSpPr>
-            <a:spLocks noGrp="1"/>
-          </p:cNvSpPr>
-          <p:nvPr>
-            <p:ph idx="1"/>
-          </p:nvPr>
-        </p:nvSpPr>
-        <p:spPr/>
-        <p:txBody>
-          <a:bodyPr/>
-          <a:lstStyle/>
-          <a:p>
-            <a:r>
-              <a:rPr lang="en-US" dirty="0" smtClean="0"/>
-              <a:t>We must choose between the three; </a:t>
-            </a:r>
-            <a:r>
-              <a:rPr lang="en-US" dirty="0" smtClean="0"/>
-              <a:t>entropy (and wide experience </a:t>
-            </a:r>
-            <a:r>
-              <a:rPr lang="en-US" dirty="0" smtClean="0"/>
-              <a:t>in distributed </a:t>
-            </a:r>
-            <a:r>
-              <a:rPr lang="en-US" dirty="0" smtClean="0"/>
-              <a:t>systems!) </a:t>
-            </a:r>
-            <a:r>
-              <a:rPr lang="en-US" dirty="0" smtClean="0"/>
-              <a:t>teaches us that C(</a:t>
-            </a:r>
-            <a:r>
-              <a:rPr lang="en-US" dirty="0" err="1" smtClean="0"/>
-              <a:t>onsistency</a:t>
-            </a:r>
-            <a:r>
-              <a:rPr lang="en-US" dirty="0" smtClean="0"/>
-              <a:t>) is not one of the top two</a:t>
-            </a:r>
-          </a:p>
-          <a:p>
-            <a:pPr lvl="1"/>
-            <a:r>
-              <a:rPr lang="en-US" dirty="0" smtClean="0"/>
-              <a:t>With one exception: When it is the point of the application. Only then.</a:t>
-            </a:r>
-            <a:endParaRPr lang="en-US" dirty="0"/>
-          </a:p>
-        </p:txBody>
-      </p:sp>
-      <p:pic>
-        <p:nvPicPr>
-          <p:cNvPr id="4" name="Picture 3"/>
-          <p:cNvPicPr>
-            <a:picLocks noChangeAspect="1"/>
-          </p:cNvPicPr>
-          <p:nvPr/>
-        </p:nvPicPr>
-        <p:blipFill>
-          <a:blip r:embed="rId2"/>
-          <a:stretch>
-            <a:fillRect/>
-          </a:stretch>
-        </p:blipFill>
-        <p:spPr>
-          <a:xfrm>
-            <a:off x="2843026" y="4150666"/>
-            <a:ext cx="5728921" cy="820886"/>
-          </a:xfrm>
-          <a:prstGeom prst="rect">
-            <a:avLst/>
-          </a:prstGeom>
-        </p:spPr>
-      </p:pic>
-      <p:sp>
-        <p:nvSpPr>
-          <p:cNvPr id="5" name="TextBox 4"/>
-          <p:cNvSpPr txBox="1"/>
-          <p:nvPr/>
-        </p:nvSpPr>
-        <p:spPr>
-          <a:xfrm>
-            <a:off x="2712509" y="5585483"/>
-            <a:ext cx="6351157" cy="343620"/>
-          </a:xfrm>
-          <a:prstGeom prst="rect">
-            <a:avLst/>
-          </a:prstGeom>
-          <a:noFill/>
-        </p:spPr>
-        <p:txBody>
-          <a:bodyPr wrap="square" rtlCol="0">
-            <a:spAutoFit/>
-          </a:bodyPr>
-          <a:lstStyle/>
-          <a:p>
-            <a:r>
-              <a:rPr lang="en-US" sz="1633" dirty="0"/>
-              <a:t>-- Adrian </a:t>
-            </a:r>
-            <a:r>
-              <a:rPr lang="en-US" sz="1633" dirty="0" err="1"/>
-              <a:t>Cockroft</a:t>
-            </a:r>
-            <a:endParaRPr lang="en-US" sz="1633" dirty="0"/>
-          </a:p>
-        </p:txBody>
-      </p:sp>
-    </p:spTree>
-    <p:extLst>
-      <p:ext uri="{BB962C8B-B14F-4D97-AF65-F5344CB8AC3E}">
-        <p14:creationId xmlns:p14="http://schemas.microsoft.com/office/powerpoint/2010/main" val="3120339046"/>
-      </p:ext>
-    </p:extLst>
-  </p:cSld>
-  <p:clrMapOvr>
-    <a:masterClrMapping/>
-  </p:clrMapOvr>
-  <p:timing>
-    <p:tnLst>
-      <p:par>
-        <p:cTn id="1" dur="indefinite" restart="never" nodeType="tmRoot"/>
-      </p:par>
-    </p:tnLst>
-  </p:timing>
-</p:sld>
-</file>
-
-<file path=ppt/slides/slide27.xml><?xml version="1.0" encoding="utf-8"?>
-<p:sld xmlns:a="http://schemas.openxmlformats.org/drawingml/2006/main" xmlns:r="http://schemas.openxmlformats.org/officeDocument/2006/relationships" xmlns:p="http://schemas.openxmlformats.org/presentationml/2006/main">
-  <p:cSld>
-    <p:spTree>
-      <p:nvGrpSpPr>
-        <p:cNvPr id="1" name=""/>
-        <p:cNvGrpSpPr/>
-        <p:nvPr/>
-      </p:nvGrpSpPr>
-      <p:grpSpPr>
-        <a:xfrm>
-          <a:off x="0" y="0"/>
-          <a:ext cx="0" cy="0"/>
-          <a:chOff x="0" y="0"/>
-          <a:chExt cx="0" cy="0"/>
-        </a:xfrm>
-      </p:grpSpPr>
-      <p:sp>
-        <p:nvSpPr>
-          <p:cNvPr id="2" name="Title 1"/>
-          <p:cNvSpPr>
-            <a:spLocks noGrp="1"/>
-          </p:cNvSpPr>
-          <p:nvPr>
-            <p:ph type="title"/>
-          </p:nvPr>
-        </p:nvSpPr>
-        <p:spPr/>
-        <p:txBody>
-          <a:bodyPr/>
-          <a:lstStyle/>
-          <a:p>
-            <a:r>
-              <a:rPr lang="en-US" dirty="0" smtClean="0"/>
-              <a:t>Point: Smallest possible partitioned resource</a:t>
-            </a:r>
-            <a:endParaRPr lang="en-US" dirty="0"/>
-          </a:p>
-        </p:txBody>
-      </p:sp>
-      <p:sp>
-        <p:nvSpPr>
-          <p:cNvPr id="3" name="Content Placeholder 2"/>
-          <p:cNvSpPr>
-            <a:spLocks noGrp="1"/>
-          </p:cNvSpPr>
-          <p:nvPr>
-            <p:ph idx="1"/>
-          </p:nvPr>
-        </p:nvSpPr>
-        <p:spPr/>
-        <p:txBody>
-          <a:bodyPr/>
-          <a:lstStyle/>
-          <a:p>
-            <a:r>
-              <a:rPr lang="en-US" dirty="0" smtClean="0"/>
-              <a:t>VMs should be smallest</a:t>
-            </a:r>
-          </a:p>
-          <a:p>
-            <a:r>
-              <a:rPr lang="en-US" dirty="0" smtClean="0"/>
-              <a:t>OS should be smallest </a:t>
-            </a:r>
-          </a:p>
-          <a:p>
-            <a:r>
-              <a:rPr lang="en-US" dirty="0" smtClean="0"/>
-              <a:t>Bunches of storages with partition and retry policies</a:t>
-            </a:r>
-          </a:p>
-          <a:p>
-            <a:endParaRPr lang="en-US" dirty="0"/>
-          </a:p>
-          <a:p>
-            <a:r>
-              <a:rPr lang="en-US" dirty="0" smtClean="0"/>
-              <a:t>Benefits:</a:t>
-            </a:r>
-          </a:p>
-          <a:p>
-            <a:pPr lvl="1"/>
-            <a:r>
-              <a:rPr lang="en-US" dirty="0" smtClean="0"/>
-              <a:t>Fine grained </a:t>
-            </a:r>
-            <a:r>
-              <a:rPr lang="en-US" dirty="0" smtClean="0"/>
-              <a:t>scale-out </a:t>
-            </a:r>
-            <a:r>
-              <a:rPr lang="en-US" dirty="0" smtClean="0"/>
-              <a:t>and </a:t>
-            </a:r>
-            <a:r>
-              <a:rPr lang="en-US" dirty="0" smtClean="0"/>
-              <a:t>scale-in</a:t>
-            </a:r>
-            <a:endParaRPr lang="en-US" dirty="0" smtClean="0"/>
-          </a:p>
-          <a:p>
-            <a:pPr lvl="1"/>
-            <a:r>
-              <a:rPr lang="en-US" dirty="0" smtClean="0"/>
-              <a:t>Each failure much smaller portion of entire load</a:t>
-            </a:r>
-          </a:p>
-          <a:p>
-            <a:pPr lvl="1"/>
-            <a:r>
-              <a:rPr lang="en-US" dirty="0" smtClean="0"/>
-              <a:t>Cost (Duh)</a:t>
-            </a:r>
-          </a:p>
-          <a:p>
-            <a:endParaRPr lang="en-US" dirty="0"/>
-          </a:p>
-        </p:txBody>
-      </p:sp>
-    </p:spTree>
-    <p:extLst>
-      <p:ext uri="{BB962C8B-B14F-4D97-AF65-F5344CB8AC3E}">
-        <p14:creationId xmlns:p14="http://schemas.microsoft.com/office/powerpoint/2010/main" val="1892561583"/>
-      </p:ext>
-    </p:extLst>
-  </p:cSld>
-  <p:clrMapOvr>
-    <a:masterClrMapping/>
-  </p:clrMapOvr>
-  <mc:AlternateContent xmlns:mc="http://schemas.openxmlformats.org/markup-compatibility/2006">
-    <mc:Choice xmlns:p14="http://schemas.microsoft.com/office/powerpoint/2010/main" Requires="p14">
-      <p:transition spd="med" p14:dur="700">
-        <p:fade/>
-      </p:transition>
-    </mc:Choice>
-    <mc:Fallback>
-      <p:transition spd="med">
-        <p:fade/>
-      </p:transition>
-    </mc:Fallback>
-  </mc:AlternateContent>
-  <p:timing>
-    <p:tnLst>
-      <p:par>
-        <p:cTn id="1" dur="indefinite" restart="never" nodeType="tmRoot"/>
-      </p:par>
-    </p:tnLst>
-  </p:timing>
-</p:sld>
-</file>
-
-<file path=ppt/slides/slide28.xml><?xml version="1.0" encoding="utf-8"?>
-<p:sld xmlns:a="http://schemas.openxmlformats.org/drawingml/2006/main" xmlns:r="http://schemas.openxmlformats.org/officeDocument/2006/relationships" xmlns:p="http://schemas.openxmlformats.org/presentationml/2006/main">
-  <p:cSld>
-    <p:spTree>
-      <p:nvGrpSpPr>
-        <p:cNvPr id="1" name=""/>
-        <p:cNvGrpSpPr/>
-        <p:nvPr/>
-      </p:nvGrpSpPr>
-      <p:grpSpPr>
-        <a:xfrm>
-          <a:off x="0" y="0"/>
-          <a:ext cx="0" cy="0"/>
-          <a:chOff x="0" y="0"/>
-          <a:chExt cx="0" cy="0"/>
-        </a:xfrm>
-      </p:grpSpPr>
-      <p:sp>
-        <p:nvSpPr>
-          <p:cNvPr id="2" name="Title 1"/>
-          <p:cNvSpPr>
-            <a:spLocks noGrp="1"/>
-          </p:cNvSpPr>
-          <p:nvPr>
-            <p:ph type="title"/>
-          </p:nvPr>
-        </p:nvSpPr>
-        <p:spPr/>
-        <p:txBody>
-          <a:bodyPr/>
-          <a:lstStyle/>
-          <a:p>
-            <a:r>
-              <a:rPr lang="en-US" dirty="0" smtClean="0"/>
-              <a:t>Implications for humans</a:t>
-            </a:r>
-            <a:endParaRPr lang="en-US" dirty="0"/>
-          </a:p>
-        </p:txBody>
-      </p:sp>
-      <p:sp>
-        <p:nvSpPr>
-          <p:cNvPr id="3" name="Content Placeholder 2"/>
-          <p:cNvSpPr>
-            <a:spLocks noGrp="1"/>
-          </p:cNvSpPr>
-          <p:nvPr>
-            <p:ph idx="1"/>
-          </p:nvPr>
-        </p:nvSpPr>
-        <p:spPr/>
-        <p:txBody>
-          <a:bodyPr/>
-          <a:lstStyle/>
-          <a:p>
-            <a:r>
-              <a:rPr lang="en-US" dirty="0" smtClean="0"/>
-              <a:t>Ah, execution. Tough stuff.</a:t>
-            </a:r>
-          </a:p>
-        </p:txBody>
-      </p:sp>
-    </p:spTree>
-    <p:extLst>
-      <p:ext uri="{BB962C8B-B14F-4D97-AF65-F5344CB8AC3E}">
-        <p14:creationId xmlns:p14="http://schemas.microsoft.com/office/powerpoint/2010/main" val="3061661963"/>
-      </p:ext>
-    </p:extLst>
-  </p:cSld>
-  <p:clrMapOvr>
-    <a:masterClrMapping/>
-  </p:clrMapOvr>
-  <mc:AlternateContent xmlns:mc="http://schemas.openxmlformats.org/markup-compatibility/2006">
-    <mc:Choice xmlns:p14="http://schemas.microsoft.com/office/powerpoint/2010/main" Requires="p14">
-      <p:transition spd="med" p14:dur="700">
-        <p:fade/>
-      </p:transition>
-    </mc:Choice>
-    <mc:Fallback>
-      <p:transition spd="med">
-        <p:fade/>
-      </p:transition>
-    </mc:Fallback>
-  </mc:AlternateContent>
-  <p:timing>
-    <p:tnLst>
-      <p:par>
-        <p:cTn id="1" dur="indefinite" restart="never" nodeType="tmRoot"/>
-      </p:par>
-    </p:tnLst>
-  </p:timing>
-</p:sld>
-</file>
-
-<file path=ppt/slides/slide29.xml><?xml version="1.0" encoding="utf-8"?>
-<p:sld xmlns:a="http://schemas.openxmlformats.org/drawingml/2006/main" xmlns:r="http://schemas.openxmlformats.org/officeDocument/2006/relationships" xmlns:p="http://schemas.openxmlformats.org/presentationml/2006/main">
-  <p:cSld>
-    <p:spTree>
-      <p:nvGrpSpPr>
-        <p:cNvPr id="1" name=""/>
-        <p:cNvGrpSpPr/>
-        <p:nvPr/>
-      </p:nvGrpSpPr>
-      <p:grpSpPr>
-        <a:xfrm>
-          <a:off x="0" y="0"/>
-          <a:ext cx="0" cy="0"/>
-          <a:chOff x="0" y="0"/>
-          <a:chExt cx="0" cy="0"/>
-        </a:xfrm>
-      </p:grpSpPr>
-      <p:sp>
-        <p:nvSpPr>
-          <p:cNvPr id="2" name="Title 1"/>
-          <p:cNvSpPr>
-            <a:spLocks noGrp="1"/>
-          </p:cNvSpPr>
-          <p:nvPr>
-            <p:ph type="title"/>
-          </p:nvPr>
-        </p:nvSpPr>
-        <p:spPr/>
-        <p:txBody>
-          <a:bodyPr/>
-          <a:lstStyle/>
-          <a:p>
-            <a:r>
-              <a:rPr lang="en-US" dirty="0" smtClean="0"/>
-              <a:t>Implications for humans</a:t>
-            </a:r>
-            <a:endParaRPr lang="en-US" dirty="0"/>
-          </a:p>
-        </p:txBody>
-      </p:sp>
-      <p:sp>
-        <p:nvSpPr>
-          <p:cNvPr id="3" name="Content Placeholder 2"/>
-          <p:cNvSpPr>
-            <a:spLocks noGrp="1"/>
-          </p:cNvSpPr>
-          <p:nvPr>
-            <p:ph idx="1"/>
-          </p:nvPr>
-        </p:nvSpPr>
-        <p:spPr/>
-        <p:txBody>
-          <a:bodyPr/>
-          <a:lstStyle/>
-          <a:p>
-            <a:r>
-              <a:rPr lang="en-US" dirty="0"/>
-              <a:t>Developers think they gain impact; they’re right. They also gain complete responsibility for failure.</a:t>
-            </a:r>
-          </a:p>
-        </p:txBody>
-      </p:sp>
-    </p:spTree>
-    <p:extLst>
-      <p:ext uri="{BB962C8B-B14F-4D97-AF65-F5344CB8AC3E}">
-        <p14:creationId xmlns:p14="http://schemas.microsoft.com/office/powerpoint/2010/main" val="4179829595"/>
-      </p:ext>
-    </p:extLst>
-  </p:cSld>
-  <p:clrMapOvr>
-    <a:masterClrMapping/>
-  </p:clrMapOvr>
-  <mc:AlternateContent xmlns:mc="http://schemas.openxmlformats.org/markup-compatibility/2006">
-    <mc:Choice xmlns:p14="http://schemas.microsoft.com/office/powerpoint/2010/main" Requires="p14">
-      <p:transition spd="med" p14:dur="700">
-        <p:fade/>
-      </p:transition>
-    </mc:Choice>
-    <mc:Fallback>
-      <p:transition spd="med">
-        <p:fade/>
-      </p:transition>
     </mc:Fallback>
   </mc:AlternateContent>
   <p:timing>
@@ -13190,13 +13176,13 @@
   <p:clrMapOvr>
     <a:masterClrMapping/>
   </p:clrMapOvr>
-  <mc:AlternateContent xmlns:mc="http://schemas.openxmlformats.org/markup-compatibility/2006">
-    <mc:Choice xmlns:p14="http://schemas.microsoft.com/office/powerpoint/2010/main" Requires="p14">
+  <mc:AlternateContent xmlns:mc="http://schemas.openxmlformats.org/markup-compatibility/2006" xmlns:p14="http://schemas.microsoft.com/office/powerpoint/2010/main">
+    <mc:Choice Requires="p14">
       <p:transition spd="med" p14:dur="700">
         <p:fade/>
       </p:transition>
     </mc:Choice>
-    <mc:Fallback>
+    <mc:Fallback xmlns="">
       <p:transition spd="med">
         <p:fade/>
       </p:transition>
@@ -13986,7 +13972,7 @@
           <a:p>
             <a:r>
               <a:rPr lang="en-US" dirty="0" smtClean="0"/>
-              <a:t>Implications for humans</a:t>
+              <a:t>Point: CAP theorem pushes us towards</a:t>
             </a:r>
             <a:endParaRPr lang="en-US" dirty="0"/>
           </a:p>
@@ -14009,40 +13995,95 @@
           <a:p>
             <a:r>
               <a:rPr lang="en-US" dirty="0" smtClean="0"/>
-              <a:t>Operations focused on hardware drops massively over the next five years.</a:t>
-            </a:r>
-          </a:p>
-          <a:p>
-            <a:r>
-              <a:rPr lang="en-US" dirty="0" smtClean="0"/>
-              <a:t>Operations focused on developing and managing software compute abstractions increases dramatically.</a:t>
+              <a:t>We must choose between the three; entropy (and wide experience in distributed systems!) teaches us that C(</a:t>
+            </a:r>
+            <a:r>
+              <a:rPr lang="en-US" dirty="0" err="1" smtClean="0"/>
+              <a:t>onsistency</a:t>
+            </a:r>
+            <a:r>
+              <a:rPr lang="en-US" dirty="0" smtClean="0"/>
+              <a:t>) is not one of the top two</a:t>
+            </a:r>
+          </a:p>
+          <a:p>
+            <a:pPr lvl="1"/>
+            <a:r>
+              <a:rPr lang="en-US" dirty="0" smtClean="0"/>
+              <a:t>With one exception: When it is the point of the application. Only then.</a:t>
             </a:r>
             <a:endParaRPr lang="en-US" dirty="0"/>
+          </a:p>
+        </p:txBody>
+      </p:sp>
+      <p:pic>
+        <p:nvPicPr>
+          <p:cNvPr id="4" name="Picture 3"/>
+          <p:cNvPicPr>
+            <a:picLocks noChangeAspect="1"/>
+          </p:cNvPicPr>
+          <p:nvPr/>
+        </p:nvPicPr>
+        <p:blipFill>
+          <a:blip r:embed="rId2"/>
+          <a:stretch>
+            <a:fillRect/>
+          </a:stretch>
+        </p:blipFill>
+        <p:spPr>
+          <a:xfrm>
+            <a:off x="2843026" y="4150666"/>
+            <a:ext cx="5728921" cy="820886"/>
+          </a:xfrm>
+          <a:prstGeom prst="rect">
+            <a:avLst/>
+          </a:prstGeom>
+        </p:spPr>
+      </p:pic>
+      <p:sp>
+        <p:nvSpPr>
+          <p:cNvPr id="5" name="TextBox 4"/>
+          <p:cNvSpPr txBox="1"/>
+          <p:nvPr/>
+        </p:nvSpPr>
+        <p:spPr>
+          <a:xfrm>
+            <a:off x="2712509" y="5585483"/>
+            <a:ext cx="6351157" cy="343620"/>
+          </a:xfrm>
+          <a:prstGeom prst="rect">
+            <a:avLst/>
+          </a:prstGeom>
+          <a:noFill/>
+        </p:spPr>
+        <p:txBody>
+          <a:bodyPr wrap="square" rtlCol="0">
+            <a:spAutoFit/>
+          </a:bodyPr>
+          <a:lstStyle/>
+          <a:p>
+            <a:r>
+              <a:rPr lang="en-US" sz="1633" dirty="0"/>
+              <a:t>-- Adrian </a:t>
+            </a:r>
+            <a:r>
+              <a:rPr lang="en-US" sz="1633" dirty="0" err="1"/>
+              <a:t>Cockroft</a:t>
+            </a:r>
+            <a:endParaRPr lang="en-US" sz="1633" dirty="0"/>
           </a:p>
         </p:txBody>
       </p:sp>
     </p:spTree>
     <p:extLst>
       <p:ext uri="{BB962C8B-B14F-4D97-AF65-F5344CB8AC3E}">
-        <p14:creationId xmlns:p14="http://schemas.microsoft.com/office/powerpoint/2010/main" val="1961395226"/>
+        <p14:creationId xmlns:p14="http://schemas.microsoft.com/office/powerpoint/2010/main" val="3120339046"/>
       </p:ext>
     </p:extLst>
   </p:cSld>
   <p:clrMapOvr>
     <a:masterClrMapping/>
   </p:clrMapOvr>
-  <mc:AlternateContent xmlns:mc="http://schemas.openxmlformats.org/markup-compatibility/2006">
-    <mc:Choice xmlns:p14="http://schemas.microsoft.com/office/powerpoint/2010/main" Requires="p14">
-      <p:transition spd="med" p14:dur="700">
-        <p:fade/>
-      </p:transition>
-    </mc:Choice>
-    <mc:Fallback>
-      <p:transition spd="med">
-        <p:fade/>
-      </p:transition>
-    </mc:Fallback>
-  </mc:AlternateContent>
   <p:timing>
     <p:tnLst>
       <p:par>
@@ -14087,7 +14128,7 @@
           <a:p>
             <a:r>
               <a:rPr lang="en-US" dirty="0" smtClean="0"/>
-              <a:t>Implications for humans</a:t>
+              <a:t>Point: Smallest possible partitioned resource</a:t>
             </a:r>
             <a:endParaRPr lang="en-US" dirty="0"/>
           </a:p>
@@ -14110,22 +14151,52 @@
           <a:p>
             <a:r>
               <a:rPr lang="en-US" dirty="0" smtClean="0"/>
-              <a:t>Architects focus on everything more and more. </a:t>
-            </a:r>
-          </a:p>
-          <a:p>
-            <a:r>
-              <a:rPr lang="en-US" dirty="0" smtClean="0"/>
-              <a:t>Datacenters are now </a:t>
-            </a:r>
-            <a:r>
-              <a:rPr lang="en-US" i="1" dirty="0" smtClean="0"/>
-              <a:t>programs</a:t>
-            </a:r>
-            <a:r>
-              <a:rPr lang="en-US" dirty="0" smtClean="0"/>
-              <a:t>. Programs in datacenters are programs running in programs.</a:t>
-            </a:r>
+              <a:t>VMs should be smallest</a:t>
+            </a:r>
+          </a:p>
+          <a:p>
+            <a:r>
+              <a:rPr lang="en-US" dirty="0" smtClean="0"/>
+              <a:t>OS should be smallest </a:t>
+            </a:r>
+          </a:p>
+          <a:p>
+            <a:r>
+              <a:rPr lang="en-US" dirty="0" smtClean="0"/>
+              <a:t>Bunches of storages with partition and retry policies</a:t>
+            </a:r>
+          </a:p>
+          <a:p>
+            <a:endParaRPr lang="en-US" dirty="0"/>
+          </a:p>
+          <a:p>
+            <a:r>
+              <a:rPr lang="en-US" dirty="0" smtClean="0"/>
+              <a:t>Benefits:</a:t>
+            </a:r>
+          </a:p>
+          <a:p>
+            <a:pPr lvl="1"/>
+            <a:r>
+              <a:rPr lang="en-US" dirty="0" smtClean="0"/>
+              <a:t>Fine grained scale-out and scale-in</a:t>
+            </a:r>
+          </a:p>
+          <a:p>
+            <a:pPr lvl="1"/>
+            <a:r>
+              <a:rPr lang="en-US" dirty="0" smtClean="0"/>
+              <a:t>Each failure much smaller portion of entire load</a:t>
+            </a:r>
+          </a:p>
+          <a:p>
+            <a:pPr lvl="1"/>
+            <a:r>
+              <a:rPr lang="en-US" dirty="0" smtClean="0"/>
+              <a:t>Cost (Duh)</a:t>
+            </a:r>
+          </a:p>
+          <a:p>
             <a:endParaRPr lang="en-US" dirty="0"/>
           </a:p>
         </p:txBody>
@@ -14133,20 +14204,20 @@
     </p:spTree>
     <p:extLst>
       <p:ext uri="{BB962C8B-B14F-4D97-AF65-F5344CB8AC3E}">
-        <p14:creationId xmlns:p14="http://schemas.microsoft.com/office/powerpoint/2010/main" val="201479358"/>
+        <p14:creationId xmlns:p14="http://schemas.microsoft.com/office/powerpoint/2010/main" val="1892561583"/>
       </p:ext>
     </p:extLst>
   </p:cSld>
   <p:clrMapOvr>
     <a:masterClrMapping/>
   </p:clrMapOvr>
-  <mc:AlternateContent xmlns:mc="http://schemas.openxmlformats.org/markup-compatibility/2006">
-    <mc:Choice xmlns:p14="http://schemas.microsoft.com/office/powerpoint/2010/main" Requires="p14">
+  <mc:AlternateContent xmlns:mc="http://schemas.openxmlformats.org/markup-compatibility/2006" xmlns:p14="http://schemas.microsoft.com/office/powerpoint/2010/main">
+    <mc:Choice Requires="p14">
       <p:transition spd="med" p14:dur="700">
         <p:fade/>
       </p:transition>
     </mc:Choice>
-    <mc:Fallback>
+    <mc:Fallback xmlns="">
       <p:transition spd="med">
         <p:fade/>
       </p:transition>
@@ -14212,6 +14283,404 @@
             <p:ph idx="1"/>
           </p:nvPr>
         </p:nvSpPr>
+        <p:spPr/>
+        <p:txBody>
+          <a:bodyPr/>
+          <a:lstStyle/>
+          <a:p>
+            <a:r>
+              <a:rPr lang="en-US" dirty="0" smtClean="0"/>
+              <a:t>Ah, execution. Tough stuff.</a:t>
+            </a:r>
+          </a:p>
+        </p:txBody>
+      </p:sp>
+    </p:spTree>
+    <p:extLst>
+      <p:ext uri="{BB962C8B-B14F-4D97-AF65-F5344CB8AC3E}">
+        <p14:creationId xmlns:p14="http://schemas.microsoft.com/office/powerpoint/2010/main" val="3061661963"/>
+      </p:ext>
+    </p:extLst>
+  </p:cSld>
+  <p:clrMapOvr>
+    <a:masterClrMapping/>
+  </p:clrMapOvr>
+  <mc:AlternateContent xmlns:mc="http://schemas.openxmlformats.org/markup-compatibility/2006" xmlns:p14="http://schemas.microsoft.com/office/powerpoint/2010/main">
+    <mc:Choice Requires="p14">
+      <p:transition spd="med" p14:dur="700">
+        <p:fade/>
+      </p:transition>
+    </mc:Choice>
+    <mc:Fallback xmlns="">
+      <p:transition spd="med">
+        <p:fade/>
+      </p:transition>
+    </mc:Fallback>
+  </mc:AlternateContent>
+  <p:timing>
+    <p:tnLst>
+      <p:par>
+        <p:cTn id="1" dur="indefinite" restart="never" nodeType="tmRoot"/>
+      </p:par>
+    </p:tnLst>
+  </p:timing>
+</p:sld>
+</file>
+
+<file path=ppt/slides/slide33.xml><?xml version="1.0" encoding="utf-8"?>
+<p:sld xmlns:a="http://schemas.openxmlformats.org/drawingml/2006/main" xmlns:r="http://schemas.openxmlformats.org/officeDocument/2006/relationships" xmlns:p="http://schemas.openxmlformats.org/presentationml/2006/main">
+  <p:cSld>
+    <p:spTree>
+      <p:nvGrpSpPr>
+        <p:cNvPr id="1" name=""/>
+        <p:cNvGrpSpPr/>
+        <p:nvPr/>
+      </p:nvGrpSpPr>
+      <p:grpSpPr>
+        <a:xfrm>
+          <a:off x="0" y="0"/>
+          <a:ext cx="0" cy="0"/>
+          <a:chOff x="0" y="0"/>
+          <a:chExt cx="0" cy="0"/>
+        </a:xfrm>
+      </p:grpSpPr>
+      <p:sp>
+        <p:nvSpPr>
+          <p:cNvPr id="2" name="Title 1"/>
+          <p:cNvSpPr>
+            <a:spLocks noGrp="1"/>
+          </p:cNvSpPr>
+          <p:nvPr>
+            <p:ph type="title"/>
+          </p:nvPr>
+        </p:nvSpPr>
+        <p:spPr/>
+        <p:txBody>
+          <a:bodyPr/>
+          <a:lstStyle/>
+          <a:p>
+            <a:r>
+              <a:rPr lang="en-US" dirty="0" smtClean="0"/>
+              <a:t>Implications for humans</a:t>
+            </a:r>
+            <a:endParaRPr lang="en-US" dirty="0"/>
+          </a:p>
+        </p:txBody>
+      </p:sp>
+      <p:sp>
+        <p:nvSpPr>
+          <p:cNvPr id="3" name="Content Placeholder 2"/>
+          <p:cNvSpPr>
+            <a:spLocks noGrp="1"/>
+          </p:cNvSpPr>
+          <p:nvPr>
+            <p:ph idx="1"/>
+          </p:nvPr>
+        </p:nvSpPr>
+        <p:spPr/>
+        <p:txBody>
+          <a:bodyPr/>
+          <a:lstStyle/>
+          <a:p>
+            <a:r>
+              <a:rPr lang="en-US" dirty="0"/>
+              <a:t>Developers think they gain impact; they’re right. They also gain complete responsibility for failure.</a:t>
+            </a:r>
+          </a:p>
+        </p:txBody>
+      </p:sp>
+    </p:spTree>
+    <p:extLst>
+      <p:ext uri="{BB962C8B-B14F-4D97-AF65-F5344CB8AC3E}">
+        <p14:creationId xmlns:p14="http://schemas.microsoft.com/office/powerpoint/2010/main" val="4179829595"/>
+      </p:ext>
+    </p:extLst>
+  </p:cSld>
+  <p:clrMapOvr>
+    <a:masterClrMapping/>
+  </p:clrMapOvr>
+  <mc:AlternateContent xmlns:mc="http://schemas.openxmlformats.org/markup-compatibility/2006" xmlns:p14="http://schemas.microsoft.com/office/powerpoint/2010/main">
+    <mc:Choice Requires="p14">
+      <p:transition spd="med" p14:dur="700">
+        <p:fade/>
+      </p:transition>
+    </mc:Choice>
+    <mc:Fallback xmlns="">
+      <p:transition spd="med">
+        <p:fade/>
+      </p:transition>
+    </mc:Fallback>
+  </mc:AlternateContent>
+  <p:timing>
+    <p:tnLst>
+      <p:par>
+        <p:cTn id="1" dur="indefinite" restart="never" nodeType="tmRoot"/>
+      </p:par>
+    </p:tnLst>
+  </p:timing>
+</p:sld>
+</file>
+
+<file path=ppt/slides/slide34.xml><?xml version="1.0" encoding="utf-8"?>
+<p:sld xmlns:a="http://schemas.openxmlformats.org/drawingml/2006/main" xmlns:r="http://schemas.openxmlformats.org/officeDocument/2006/relationships" xmlns:p="http://schemas.openxmlformats.org/presentationml/2006/main">
+  <p:cSld>
+    <p:spTree>
+      <p:nvGrpSpPr>
+        <p:cNvPr id="1" name=""/>
+        <p:cNvGrpSpPr/>
+        <p:nvPr/>
+      </p:nvGrpSpPr>
+      <p:grpSpPr>
+        <a:xfrm>
+          <a:off x="0" y="0"/>
+          <a:ext cx="0" cy="0"/>
+          <a:chOff x="0" y="0"/>
+          <a:chExt cx="0" cy="0"/>
+        </a:xfrm>
+      </p:grpSpPr>
+      <p:sp>
+        <p:nvSpPr>
+          <p:cNvPr id="2" name="Title 1"/>
+          <p:cNvSpPr>
+            <a:spLocks noGrp="1"/>
+          </p:cNvSpPr>
+          <p:nvPr>
+            <p:ph type="title"/>
+          </p:nvPr>
+        </p:nvSpPr>
+        <p:spPr/>
+        <p:txBody>
+          <a:bodyPr/>
+          <a:lstStyle/>
+          <a:p>
+            <a:r>
+              <a:rPr lang="en-US" dirty="0" smtClean="0"/>
+              <a:t>Implications for humans</a:t>
+            </a:r>
+            <a:endParaRPr lang="en-US" dirty="0"/>
+          </a:p>
+        </p:txBody>
+      </p:sp>
+      <p:sp>
+        <p:nvSpPr>
+          <p:cNvPr id="3" name="Content Placeholder 2"/>
+          <p:cNvSpPr>
+            <a:spLocks noGrp="1"/>
+          </p:cNvSpPr>
+          <p:nvPr>
+            <p:ph idx="1"/>
+          </p:nvPr>
+        </p:nvSpPr>
+        <p:spPr/>
+        <p:txBody>
+          <a:bodyPr/>
+          <a:lstStyle/>
+          <a:p>
+            <a:r>
+              <a:rPr lang="en-US" dirty="0" smtClean="0"/>
+              <a:t>Operations focused on hardware drops massively over the next five years.</a:t>
+            </a:r>
+          </a:p>
+          <a:p>
+            <a:r>
+              <a:rPr lang="en-US" dirty="0" smtClean="0"/>
+              <a:t>Operations focused on developing and managing software compute abstractions increases dramatically.</a:t>
+            </a:r>
+            <a:endParaRPr lang="en-US" dirty="0"/>
+          </a:p>
+        </p:txBody>
+      </p:sp>
+    </p:spTree>
+    <p:extLst>
+      <p:ext uri="{BB962C8B-B14F-4D97-AF65-F5344CB8AC3E}">
+        <p14:creationId xmlns:p14="http://schemas.microsoft.com/office/powerpoint/2010/main" val="1961395226"/>
+      </p:ext>
+    </p:extLst>
+  </p:cSld>
+  <p:clrMapOvr>
+    <a:masterClrMapping/>
+  </p:clrMapOvr>
+  <mc:AlternateContent xmlns:mc="http://schemas.openxmlformats.org/markup-compatibility/2006" xmlns:p14="http://schemas.microsoft.com/office/powerpoint/2010/main">
+    <mc:Choice Requires="p14">
+      <p:transition spd="med" p14:dur="700">
+        <p:fade/>
+      </p:transition>
+    </mc:Choice>
+    <mc:Fallback xmlns="">
+      <p:transition spd="med">
+        <p:fade/>
+      </p:transition>
+    </mc:Fallback>
+  </mc:AlternateContent>
+  <p:timing>
+    <p:tnLst>
+      <p:par>
+        <p:cTn id="1" dur="indefinite" restart="never" nodeType="tmRoot"/>
+      </p:par>
+    </p:tnLst>
+  </p:timing>
+</p:sld>
+</file>
+
+<file path=ppt/slides/slide35.xml><?xml version="1.0" encoding="utf-8"?>
+<p:sld xmlns:a="http://schemas.openxmlformats.org/drawingml/2006/main" xmlns:r="http://schemas.openxmlformats.org/officeDocument/2006/relationships" xmlns:p="http://schemas.openxmlformats.org/presentationml/2006/main">
+  <p:cSld>
+    <p:spTree>
+      <p:nvGrpSpPr>
+        <p:cNvPr id="1" name=""/>
+        <p:cNvGrpSpPr/>
+        <p:nvPr/>
+      </p:nvGrpSpPr>
+      <p:grpSpPr>
+        <a:xfrm>
+          <a:off x="0" y="0"/>
+          <a:ext cx="0" cy="0"/>
+          <a:chOff x="0" y="0"/>
+          <a:chExt cx="0" cy="0"/>
+        </a:xfrm>
+      </p:grpSpPr>
+      <p:sp>
+        <p:nvSpPr>
+          <p:cNvPr id="2" name="Title 1"/>
+          <p:cNvSpPr>
+            <a:spLocks noGrp="1"/>
+          </p:cNvSpPr>
+          <p:nvPr>
+            <p:ph type="title"/>
+          </p:nvPr>
+        </p:nvSpPr>
+        <p:spPr/>
+        <p:txBody>
+          <a:bodyPr/>
+          <a:lstStyle/>
+          <a:p>
+            <a:r>
+              <a:rPr lang="en-US" dirty="0" smtClean="0"/>
+              <a:t>Implications for humans</a:t>
+            </a:r>
+            <a:endParaRPr lang="en-US" dirty="0"/>
+          </a:p>
+        </p:txBody>
+      </p:sp>
+      <p:sp>
+        <p:nvSpPr>
+          <p:cNvPr id="3" name="Content Placeholder 2"/>
+          <p:cNvSpPr>
+            <a:spLocks noGrp="1"/>
+          </p:cNvSpPr>
+          <p:nvPr>
+            <p:ph idx="1"/>
+          </p:nvPr>
+        </p:nvSpPr>
+        <p:spPr/>
+        <p:txBody>
+          <a:bodyPr/>
+          <a:lstStyle/>
+          <a:p>
+            <a:r>
+              <a:rPr lang="en-US" dirty="0" smtClean="0"/>
+              <a:t>Architects focus on everything more and more. </a:t>
+            </a:r>
+          </a:p>
+          <a:p>
+            <a:r>
+              <a:rPr lang="en-US" dirty="0" smtClean="0"/>
+              <a:t>Datacenters are now </a:t>
+            </a:r>
+            <a:r>
+              <a:rPr lang="en-US" i="1" dirty="0" smtClean="0"/>
+              <a:t>programs</a:t>
+            </a:r>
+            <a:r>
+              <a:rPr lang="en-US" dirty="0" smtClean="0"/>
+              <a:t>. Programs in datacenters are programs running in programs.</a:t>
+            </a:r>
+            <a:endParaRPr lang="en-US" dirty="0"/>
+          </a:p>
+        </p:txBody>
+      </p:sp>
+    </p:spTree>
+    <p:extLst>
+      <p:ext uri="{BB962C8B-B14F-4D97-AF65-F5344CB8AC3E}">
+        <p14:creationId xmlns:p14="http://schemas.microsoft.com/office/powerpoint/2010/main" val="201479358"/>
+      </p:ext>
+    </p:extLst>
+  </p:cSld>
+  <p:clrMapOvr>
+    <a:masterClrMapping/>
+  </p:clrMapOvr>
+  <mc:AlternateContent xmlns:mc="http://schemas.openxmlformats.org/markup-compatibility/2006" xmlns:p14="http://schemas.microsoft.com/office/powerpoint/2010/main">
+    <mc:Choice Requires="p14">
+      <p:transition spd="med" p14:dur="700">
+        <p:fade/>
+      </p:transition>
+    </mc:Choice>
+    <mc:Fallback xmlns="">
+      <p:transition spd="med">
+        <p:fade/>
+      </p:transition>
+    </mc:Fallback>
+  </mc:AlternateContent>
+  <p:timing>
+    <p:tnLst>
+      <p:par>
+        <p:cTn id="1" dur="indefinite" restart="never" nodeType="tmRoot"/>
+      </p:par>
+    </p:tnLst>
+  </p:timing>
+</p:sld>
+</file>
+
+<file path=ppt/slides/slide36.xml><?xml version="1.0" encoding="utf-8"?>
+<p:sld xmlns:a="http://schemas.openxmlformats.org/drawingml/2006/main" xmlns:r="http://schemas.openxmlformats.org/officeDocument/2006/relationships" xmlns:p="http://schemas.openxmlformats.org/presentationml/2006/main">
+  <p:cSld>
+    <p:spTree>
+      <p:nvGrpSpPr>
+        <p:cNvPr id="1" name=""/>
+        <p:cNvGrpSpPr/>
+        <p:nvPr/>
+      </p:nvGrpSpPr>
+      <p:grpSpPr>
+        <a:xfrm>
+          <a:off x="0" y="0"/>
+          <a:ext cx="0" cy="0"/>
+          <a:chOff x="0" y="0"/>
+          <a:chExt cx="0" cy="0"/>
+        </a:xfrm>
+      </p:grpSpPr>
+      <p:sp>
+        <p:nvSpPr>
+          <p:cNvPr id="2" name="Title 1"/>
+          <p:cNvSpPr>
+            <a:spLocks noGrp="1"/>
+          </p:cNvSpPr>
+          <p:nvPr>
+            <p:ph type="title"/>
+          </p:nvPr>
+        </p:nvSpPr>
+        <p:spPr/>
+        <p:txBody>
+          <a:bodyPr/>
+          <a:lstStyle/>
+          <a:p>
+            <a:r>
+              <a:rPr lang="en-US" dirty="0" smtClean="0"/>
+              <a:t>Implications for humans</a:t>
+            </a:r>
+            <a:endParaRPr lang="en-US" dirty="0"/>
+          </a:p>
+        </p:txBody>
+      </p:sp>
+      <p:sp>
+        <p:nvSpPr>
+          <p:cNvPr id="3" name="Content Placeholder 2"/>
+          <p:cNvSpPr>
+            <a:spLocks noGrp="1"/>
+          </p:cNvSpPr>
+          <p:nvPr>
+            <p:ph idx="1"/>
+          </p:nvPr>
+        </p:nvSpPr>
         <p:spPr>
           <a:xfrm>
             <a:off x="1103312" y="2052918"/>
@@ -14270,13 +14739,13 @@
   <p:clrMapOvr>
     <a:masterClrMapping/>
   </p:clrMapOvr>
-  <mc:AlternateContent xmlns:mc="http://schemas.openxmlformats.org/markup-compatibility/2006">
-    <mc:Choice xmlns:p14="http://schemas.microsoft.com/office/powerpoint/2010/main" Requires="p14">
+  <mc:AlternateContent xmlns:mc="http://schemas.openxmlformats.org/markup-compatibility/2006" xmlns:p14="http://schemas.microsoft.com/office/powerpoint/2010/main">
+    <mc:Choice Requires="p14">
       <p:transition spd="med" p14:dur="700">
         <p:fade/>
       </p:transition>
     </mc:Choice>
-    <mc:Fallback>
+    <mc:Fallback xmlns="">
       <p:transition spd="med">
         <p:fade/>
       </p:transition>
@@ -14376,7 +14845,7 @@
 </p:sld>
 </file>
 
-<file path=ppt/slides/slide33.xml><?xml version="1.0" encoding="utf-8"?>
+<file path=ppt/slides/slide37.xml><?xml version="1.0" encoding="utf-8"?>
 <p:sld xmlns:a="http://schemas.openxmlformats.org/drawingml/2006/main" xmlns:r="http://schemas.openxmlformats.org/officeDocument/2006/relationships" xmlns:p="http://schemas.openxmlformats.org/presentationml/2006/main">
   <p:cSld>
     <p:spTree>
@@ -14517,13 +14986,13 @@
   <p:clrMapOvr>
     <a:masterClrMapping/>
   </p:clrMapOvr>
-  <mc:AlternateContent xmlns:mc="http://schemas.openxmlformats.org/markup-compatibility/2006">
-    <mc:Choice xmlns:p14="http://schemas.microsoft.com/office/powerpoint/2010/main" Requires="p14">
+  <mc:AlternateContent xmlns:mc="http://schemas.openxmlformats.org/markup-compatibility/2006" xmlns:p14="http://schemas.microsoft.com/office/powerpoint/2010/main">
+    <mc:Choice Requires="p14">
       <p:transition spd="med" p14:dur="700">
         <p:fade/>
       </p:transition>
     </mc:Choice>
-    <mc:Fallback>
+    <mc:Fallback xmlns="">
       <p:transition spd="med">
         <p:fade/>
       </p:transition>
@@ -14539,7 +15008,7 @@
 </p:sld>
 </file>
 
-<file path=ppt/slides/slide34.xml><?xml version="1.0" encoding="utf-8"?>
+<file path=ppt/slides/slide38.xml><?xml version="1.0" encoding="utf-8"?>
 <p:sld xmlns:a="http://schemas.openxmlformats.org/drawingml/2006/main" xmlns:r="http://schemas.openxmlformats.org/officeDocument/2006/relationships" xmlns:p="http://schemas.openxmlformats.org/presentationml/2006/main">
   <p:cSld>
     <p:spTree>
@@ -14613,13 +15082,13 @@
   <p:clrMapOvr>
     <a:masterClrMapping/>
   </p:clrMapOvr>
-  <mc:AlternateContent xmlns:mc="http://schemas.openxmlformats.org/markup-compatibility/2006">
-    <mc:Choice xmlns:p14="http://schemas.microsoft.com/office/powerpoint/2010/main" Requires="p14">
+  <mc:AlternateContent xmlns:mc="http://schemas.openxmlformats.org/markup-compatibility/2006" xmlns:p14="http://schemas.microsoft.com/office/powerpoint/2010/main">
+    <mc:Choice Requires="p14">
       <p:transition spd="med" p14:dur="700">
         <p:fade/>
       </p:transition>
     </mc:Choice>
-    <mc:Fallback>
+    <mc:Fallback xmlns="">
       <p:transition spd="med">
         <p:fade/>
       </p:transition>
@@ -14635,7 +15104,7 @@
 </p:sld>
 </file>
 
-<file path=ppt/slides/slide35.xml><?xml version="1.0" encoding="utf-8"?>
+<file path=ppt/slides/slide39.xml><?xml version="1.0" encoding="utf-8"?>
 <p:sld xmlns:a="http://schemas.openxmlformats.org/drawingml/2006/main" xmlns:r="http://schemas.openxmlformats.org/officeDocument/2006/relationships" xmlns:p="http://schemas.openxmlformats.org/presentationml/2006/main">
   <p:cSld>
     <p:spTree>
@@ -14709,433 +15178,13 @@
   <p:clrMapOvr>
     <a:masterClrMapping/>
   </p:clrMapOvr>
-  <mc:AlternateContent xmlns:mc="http://schemas.openxmlformats.org/markup-compatibility/2006">
-    <mc:Choice xmlns:p14="http://schemas.microsoft.com/office/powerpoint/2010/main" Requires="p14">
+  <mc:AlternateContent xmlns:mc="http://schemas.openxmlformats.org/markup-compatibility/2006" xmlns:p14="http://schemas.microsoft.com/office/powerpoint/2010/main">
+    <mc:Choice Requires="p14">
       <p:transition spd="med" p14:dur="700">
         <p:fade/>
       </p:transition>
     </mc:Choice>
-    <mc:Fallback>
-      <p:transition spd="med">
-        <p:fade/>
-      </p:transition>
-    </mc:Fallback>
-  </mc:AlternateContent>
-  <p:timing>
-    <p:tnLst>
-      <p:par>
-        <p:cTn id="1" dur="indefinite" restart="never" nodeType="tmRoot"/>
-      </p:par>
-    </p:tnLst>
-  </p:timing>
-</p:sld>
-</file>
-
-<file path=ppt/slides/slide36.xml><?xml version="1.0" encoding="utf-8"?>
-<p:sld xmlns:a="http://schemas.openxmlformats.org/drawingml/2006/main" xmlns:r="http://schemas.openxmlformats.org/officeDocument/2006/relationships" xmlns:p="http://schemas.openxmlformats.org/presentationml/2006/main">
-  <p:cSld>
-    <p:spTree>
-      <p:nvGrpSpPr>
-        <p:cNvPr id="1" name=""/>
-        <p:cNvGrpSpPr/>
-        <p:nvPr/>
-      </p:nvGrpSpPr>
-      <p:grpSpPr>
-        <a:xfrm>
-          <a:off x="0" y="0"/>
-          <a:ext cx="0" cy="0"/>
-          <a:chOff x="0" y="0"/>
-          <a:chExt cx="0" cy="0"/>
-        </a:xfrm>
-      </p:grpSpPr>
-      <p:sp>
-        <p:nvSpPr>
-          <p:cNvPr id="2" name="Title 1"/>
-          <p:cNvSpPr>
-            <a:spLocks noGrp="1"/>
-          </p:cNvSpPr>
-          <p:nvPr>
-            <p:ph type="title"/>
-          </p:nvPr>
-        </p:nvSpPr>
-        <p:spPr/>
-        <p:txBody>
-          <a:bodyPr/>
-          <a:lstStyle/>
-          <a:p>
-            <a:r>
-              <a:rPr lang="en-US" dirty="0" smtClean="0"/>
-              <a:t>Thing to </a:t>
-            </a:r>
-            <a:r>
-              <a:rPr lang="en-US" dirty="0" err="1" smtClean="0"/>
-              <a:t>grok</a:t>
-            </a:r>
-            <a:r>
-              <a:rPr lang="en-US" dirty="0" smtClean="0"/>
-              <a:t>: any blocking call should be destroyed</a:t>
-            </a:r>
-            <a:endParaRPr lang="en-US" dirty="0"/>
-          </a:p>
-        </p:txBody>
-      </p:sp>
-      <p:sp>
-        <p:nvSpPr>
-          <p:cNvPr id="3" name="Content Placeholder 2"/>
-          <p:cNvSpPr>
-            <a:spLocks noGrp="1"/>
-          </p:cNvSpPr>
-          <p:nvPr>
-            <p:ph idx="1"/>
-          </p:nvPr>
-        </p:nvSpPr>
-        <p:spPr/>
-        <p:txBody>
-          <a:bodyPr/>
-          <a:lstStyle/>
-          <a:p>
-            <a:r>
-              <a:rPr lang="en-US" dirty="0" smtClean="0"/>
-              <a:t>Duh. Event driven.</a:t>
-            </a:r>
-            <a:endParaRPr lang="en-US" dirty="0"/>
-          </a:p>
-        </p:txBody>
-      </p:sp>
-    </p:spTree>
-    <p:extLst>
-      <p:ext uri="{BB962C8B-B14F-4D97-AF65-F5344CB8AC3E}">
-        <p14:creationId xmlns:p14="http://schemas.microsoft.com/office/powerpoint/2010/main" val="1752963072"/>
-      </p:ext>
-    </p:extLst>
-  </p:cSld>
-  <p:clrMapOvr>
-    <a:masterClrMapping/>
-  </p:clrMapOvr>
-  <mc:AlternateContent xmlns:mc="http://schemas.openxmlformats.org/markup-compatibility/2006">
-    <mc:Choice xmlns:p14="http://schemas.microsoft.com/office/powerpoint/2010/main" Requires="p14">
-      <p:transition spd="med" p14:dur="700">
-        <p:fade/>
-      </p:transition>
-    </mc:Choice>
-    <mc:Fallback>
-      <p:transition spd="med">
-        <p:fade/>
-      </p:transition>
-    </mc:Fallback>
-  </mc:AlternateContent>
-  <p:timing>
-    <p:tnLst>
-      <p:par>
-        <p:cTn id="1" dur="indefinite" restart="never" nodeType="tmRoot"/>
-      </p:par>
-    </p:tnLst>
-  </p:timing>
-</p:sld>
-</file>
-
-<file path=ppt/slides/slide37.xml><?xml version="1.0" encoding="utf-8"?>
-<p:sld xmlns:a="http://schemas.openxmlformats.org/drawingml/2006/main" xmlns:r="http://schemas.openxmlformats.org/officeDocument/2006/relationships" xmlns:p="http://schemas.openxmlformats.org/presentationml/2006/main">
-  <p:cSld>
-    <p:spTree>
-      <p:nvGrpSpPr>
-        <p:cNvPr id="1" name=""/>
-        <p:cNvGrpSpPr/>
-        <p:nvPr/>
-      </p:nvGrpSpPr>
-      <p:grpSpPr>
-        <a:xfrm>
-          <a:off x="0" y="0"/>
-          <a:ext cx="0" cy="0"/>
-          <a:chOff x="0" y="0"/>
-          <a:chExt cx="0" cy="0"/>
-        </a:xfrm>
-      </p:grpSpPr>
-      <p:sp>
-        <p:nvSpPr>
-          <p:cNvPr id="2" name="Title 1"/>
-          <p:cNvSpPr>
-            <a:spLocks noGrp="1"/>
-          </p:cNvSpPr>
-          <p:nvPr>
-            <p:ph type="title"/>
-          </p:nvPr>
-        </p:nvSpPr>
-        <p:spPr/>
-        <p:txBody>
-          <a:bodyPr/>
-          <a:lstStyle/>
-          <a:p>
-            <a:r>
-              <a:rPr lang="en-US" dirty="0" smtClean="0"/>
-              <a:t>Point: Scale-up works if…	</a:t>
-            </a:r>
-            <a:endParaRPr lang="en-US" dirty="0"/>
-          </a:p>
-        </p:txBody>
-      </p:sp>
-      <p:sp>
-        <p:nvSpPr>
-          <p:cNvPr id="3" name="Content Placeholder 2"/>
-          <p:cNvSpPr>
-            <a:spLocks noGrp="1"/>
-          </p:cNvSpPr>
-          <p:nvPr>
-            <p:ph idx="1"/>
-          </p:nvPr>
-        </p:nvSpPr>
-        <p:spPr>
-          <a:xfrm>
-            <a:off x="646111" y="1694023"/>
-            <a:ext cx="4638461" cy="4395151"/>
-          </a:xfrm>
-        </p:spPr>
-        <p:txBody>
-          <a:bodyPr>
-            <a:normAutofit/>
-          </a:bodyPr>
-          <a:lstStyle/>
-          <a:p>
-            <a:r>
-              <a:rPr lang="en-US" dirty="0" smtClean="0">
-                <a:hlinkClick r:id="rId2"/>
-              </a:rPr>
-              <a:t>Stackoverflow.com</a:t>
-            </a:r>
-            <a:endParaRPr lang="en-US" dirty="0" smtClean="0"/>
-          </a:p>
-          <a:p>
-            <a:pPr lvl="1"/>
-            <a:r>
-              <a:rPr lang="en-US" dirty="0" smtClean="0"/>
-              <a:t>The </a:t>
-            </a:r>
-            <a:r>
-              <a:rPr lang="en-US" dirty="0" smtClean="0"/>
-              <a:t>exception that </a:t>
-            </a:r>
-            <a:r>
-              <a:rPr lang="en-US" dirty="0" smtClean="0"/>
-              <a:t>proves the rule</a:t>
-            </a:r>
-            <a:r>
-              <a:rPr lang="en-US" dirty="0" smtClean="0"/>
-              <a:t>.</a:t>
-            </a:r>
-          </a:p>
-          <a:p>
-            <a:pPr lvl="1"/>
-            <a:r>
-              <a:rPr lang="en-US" dirty="0" smtClean="0"/>
-              <a:t>All with SQL Server!</a:t>
-            </a:r>
-          </a:p>
-          <a:p>
-            <a:pPr marL="0" indent="0">
-              <a:buNone/>
-            </a:pPr>
-            <a:r>
-              <a:rPr lang="en-US" sz="1200" dirty="0" smtClean="0"/>
-              <a:t>“</a:t>
-            </a:r>
-            <a:r>
-              <a:rPr lang="en-US" sz="1200" dirty="0"/>
-              <a:t>Stack Overflow still uses Microsoft products. Microsoft infrastructure works and is cheap enough, so there’s no compelling reason to change. Yet SO is pragmatic. They use Linux where it makes sense. There’s no purity push to make everything Linux or keep everything Microsoft. That wouldn’t be efficient. </a:t>
-            </a:r>
-          </a:p>
-          <a:p>
-            <a:pPr marL="0" indent="0">
-              <a:buNone/>
-            </a:pPr>
-            <a:r>
-              <a:rPr lang="en-US" sz="1200" dirty="0"/>
-              <a:t>Stack Overflow still uses a scale-up strategy. No clouds in site. </a:t>
-            </a:r>
-            <a:r>
-              <a:rPr lang="en-US" sz="1200" b="1" u="sng" dirty="0"/>
-              <a:t>With their SQL Servers loaded with 384 GB of RAM and 2TB of SSD, AWS would cost a fortune. </a:t>
-            </a:r>
-            <a:r>
-              <a:rPr lang="en-US" sz="1200" dirty="0"/>
-              <a:t>The cloud would also slow them down, making it harder to optimize and troubleshoot system issues. Plus, SO doesn’t need a horizontal scaling strategy. Large peak loads, where scaling out makes sense, hasn’t  been a problem because they’ve been quite successful at sizing their system correctly</a:t>
-            </a:r>
-            <a:r>
-              <a:rPr lang="en-US" sz="1200" dirty="0" smtClean="0"/>
-              <a:t>.”</a:t>
-            </a:r>
-            <a:endParaRPr lang="en-US" sz="1200" dirty="0"/>
-          </a:p>
-        </p:txBody>
-      </p:sp>
-      <p:pic>
-        <p:nvPicPr>
-          <p:cNvPr id="4" name="Picture 3"/>
-          <p:cNvPicPr>
-            <a:picLocks noChangeAspect="1"/>
-          </p:cNvPicPr>
-          <p:nvPr/>
-        </p:nvPicPr>
-        <p:blipFill>
-          <a:blip r:embed="rId3"/>
-          <a:stretch>
-            <a:fillRect/>
-          </a:stretch>
-        </p:blipFill>
-        <p:spPr>
-          <a:xfrm>
-            <a:off x="5815399" y="1853248"/>
-            <a:ext cx="5981700" cy="4076700"/>
-          </a:xfrm>
-          <a:prstGeom prst="rect">
-            <a:avLst/>
-          </a:prstGeom>
-        </p:spPr>
-      </p:pic>
-    </p:spTree>
-    <p:extLst>
-      <p:ext uri="{BB962C8B-B14F-4D97-AF65-F5344CB8AC3E}">
-        <p14:creationId xmlns:p14="http://schemas.microsoft.com/office/powerpoint/2010/main" val="365261967"/>
-      </p:ext>
-    </p:extLst>
-  </p:cSld>
-  <p:clrMapOvr>
-    <a:masterClrMapping/>
-  </p:clrMapOvr>
-  <p:timing>
-    <p:tnLst>
-      <p:par>
-        <p:cTn id="1" dur="indefinite" restart="never" nodeType="tmRoot"/>
-      </p:par>
-    </p:tnLst>
-  </p:timing>
-</p:sld>
-</file>
-
-<file path=ppt/slides/slide38.xml><?xml version="1.0" encoding="utf-8"?>
-<p:sld xmlns:a="http://schemas.openxmlformats.org/drawingml/2006/main" xmlns:r="http://schemas.openxmlformats.org/officeDocument/2006/relationships" xmlns:p="http://schemas.openxmlformats.org/presentationml/2006/main">
-  <p:cSld>
-    <p:spTree>
-      <p:nvGrpSpPr>
-        <p:cNvPr id="1" name=""/>
-        <p:cNvGrpSpPr/>
-        <p:nvPr/>
-      </p:nvGrpSpPr>
-      <p:grpSpPr>
-        <a:xfrm>
-          <a:off x="0" y="0"/>
-          <a:ext cx="0" cy="0"/>
-          <a:chOff x="0" y="0"/>
-          <a:chExt cx="0" cy="0"/>
-        </a:xfrm>
-      </p:grpSpPr>
-      <p:sp>
-        <p:nvSpPr>
-          <p:cNvPr id="2" name="Title 1"/>
-          <p:cNvSpPr>
-            <a:spLocks noGrp="1"/>
-          </p:cNvSpPr>
-          <p:nvPr>
-            <p:ph type="title"/>
-          </p:nvPr>
-        </p:nvSpPr>
-        <p:spPr/>
-        <p:txBody>
-          <a:bodyPr/>
-          <a:lstStyle/>
-          <a:p>
-            <a:r>
-              <a:rPr lang="en-US" dirty="0" smtClean="0"/>
-              <a:t>Things to </a:t>
-            </a:r>
-            <a:r>
-              <a:rPr lang="en-US" dirty="0" err="1" smtClean="0"/>
-              <a:t>grok</a:t>
-            </a:r>
-            <a:r>
-              <a:rPr lang="en-US" dirty="0" smtClean="0"/>
-              <a:t>: The app is everything at once</a:t>
-            </a:r>
-            <a:endParaRPr lang="en-US" dirty="0"/>
-          </a:p>
-        </p:txBody>
-      </p:sp>
-      <p:sp>
-        <p:nvSpPr>
-          <p:cNvPr id="3" name="Content Placeholder 2"/>
-          <p:cNvSpPr>
-            <a:spLocks noGrp="1"/>
-          </p:cNvSpPr>
-          <p:nvPr>
-            <p:ph idx="1"/>
-          </p:nvPr>
-        </p:nvSpPr>
-        <p:spPr/>
-        <p:txBody>
-          <a:bodyPr/>
-          <a:lstStyle/>
-          <a:p>
-            <a:r>
-              <a:rPr lang="en-US" dirty="0" smtClean="0"/>
-              <a:t>Two or more levels of architecture: </a:t>
-            </a:r>
-          </a:p>
-          <a:p>
-            <a:pPr lvl="1"/>
-            <a:r>
-              <a:rPr lang="en-US" dirty="0" err="1" smtClean="0"/>
-              <a:t>Microservices</a:t>
-            </a:r>
-            <a:r>
-              <a:rPr lang="en-US" dirty="0" smtClean="0"/>
-              <a:t> themselves</a:t>
-            </a:r>
-          </a:p>
-          <a:p>
-            <a:pPr lvl="1"/>
-            <a:r>
-              <a:rPr lang="en-US" dirty="0" smtClean="0"/>
-              <a:t>How all the </a:t>
-            </a:r>
-            <a:r>
-              <a:rPr lang="en-US" dirty="0" err="1" smtClean="0"/>
-              <a:t>microservices</a:t>
-            </a:r>
-            <a:r>
-              <a:rPr lang="en-US" dirty="0" smtClean="0"/>
-              <a:t> work together</a:t>
-            </a:r>
-          </a:p>
-          <a:p>
-            <a:pPr lvl="1"/>
-            <a:r>
-              <a:rPr lang="en-US" dirty="0" smtClean="0"/>
-              <a:t>The infrastructure that makes them happen – that’s </a:t>
-            </a:r>
-            <a:r>
-              <a:rPr lang="en-US" smtClean="0"/>
-              <a:t>all software now</a:t>
-            </a:r>
-            <a:endParaRPr lang="en-US" dirty="0"/>
-          </a:p>
-        </p:txBody>
-      </p:sp>
-    </p:spTree>
-    <p:extLst>
-      <p:ext uri="{BB962C8B-B14F-4D97-AF65-F5344CB8AC3E}">
-        <p14:creationId xmlns:p14="http://schemas.microsoft.com/office/powerpoint/2010/main" val="2659673164"/>
-      </p:ext>
-    </p:extLst>
-  </p:cSld>
-  <p:clrMapOvr>
-    <a:masterClrMapping/>
-  </p:clrMapOvr>
-  <mc:AlternateContent xmlns:mc="http://schemas.openxmlformats.org/markup-compatibility/2006">
-    <mc:Choice xmlns:p14="http://schemas.microsoft.com/office/powerpoint/2010/main" Requires="p14">
-      <p:transition spd="med" p14:dur="700">
-        <p:fade/>
-      </p:transition>
-    </mc:Choice>
-    <mc:Fallback>
+    <mc:Fallback xmlns="">
       <p:transition spd="med">
         <p:fade/>
       </p:transition>
@@ -15348,13 +15397,13 @@
   <p:clrMapOvr>
     <a:masterClrMapping/>
   </p:clrMapOvr>
-  <mc:AlternateContent xmlns:mc="http://schemas.openxmlformats.org/markup-compatibility/2006">
-    <mc:Choice xmlns:p14="http://schemas.microsoft.com/office/powerpoint/2010/main" Requires="p14">
+  <mc:AlternateContent xmlns:mc="http://schemas.openxmlformats.org/markup-compatibility/2006" xmlns:p14="http://schemas.microsoft.com/office/powerpoint/2010/main">
+    <mc:Choice Requires="p14">
       <p:transition spd="med" p14:dur="700">
         <p:fade/>
       </p:transition>
     </mc:Choice>
-    <mc:Fallback>
+    <mc:Fallback xmlns="">
       <p:transition spd="med">
         <p:fade/>
       </p:transition>
@@ -16031,6 +16080,414 @@
 </p:sld>
 </file>
 
+<file path=ppt/slides/slide40.xml><?xml version="1.0" encoding="utf-8"?>
+<p:sld xmlns:a="http://schemas.openxmlformats.org/drawingml/2006/main" xmlns:r="http://schemas.openxmlformats.org/officeDocument/2006/relationships" xmlns:p="http://schemas.openxmlformats.org/presentationml/2006/main">
+  <p:cSld>
+    <p:spTree>
+      <p:nvGrpSpPr>
+        <p:cNvPr id="1" name=""/>
+        <p:cNvGrpSpPr/>
+        <p:nvPr/>
+      </p:nvGrpSpPr>
+      <p:grpSpPr>
+        <a:xfrm>
+          <a:off x="0" y="0"/>
+          <a:ext cx="0" cy="0"/>
+          <a:chOff x="0" y="0"/>
+          <a:chExt cx="0" cy="0"/>
+        </a:xfrm>
+      </p:grpSpPr>
+      <p:sp>
+        <p:nvSpPr>
+          <p:cNvPr id="2" name="Title 1"/>
+          <p:cNvSpPr>
+            <a:spLocks noGrp="1"/>
+          </p:cNvSpPr>
+          <p:nvPr>
+            <p:ph type="title"/>
+          </p:nvPr>
+        </p:nvSpPr>
+        <p:spPr/>
+        <p:txBody>
+          <a:bodyPr/>
+          <a:lstStyle/>
+          <a:p>
+            <a:r>
+              <a:rPr lang="en-US" dirty="0" smtClean="0"/>
+              <a:t>Thing to </a:t>
+            </a:r>
+            <a:r>
+              <a:rPr lang="en-US" dirty="0" err="1" smtClean="0"/>
+              <a:t>grok</a:t>
+            </a:r>
+            <a:r>
+              <a:rPr lang="en-US" dirty="0" smtClean="0"/>
+              <a:t>: any blocking call should be destroyed</a:t>
+            </a:r>
+            <a:endParaRPr lang="en-US" dirty="0"/>
+          </a:p>
+        </p:txBody>
+      </p:sp>
+      <p:sp>
+        <p:nvSpPr>
+          <p:cNvPr id="3" name="Content Placeholder 2"/>
+          <p:cNvSpPr>
+            <a:spLocks noGrp="1"/>
+          </p:cNvSpPr>
+          <p:nvPr>
+            <p:ph idx="1"/>
+          </p:nvPr>
+        </p:nvSpPr>
+        <p:spPr/>
+        <p:txBody>
+          <a:bodyPr/>
+          <a:lstStyle/>
+          <a:p>
+            <a:r>
+              <a:rPr lang="en-US" dirty="0" smtClean="0"/>
+              <a:t>Duh. Event driven.</a:t>
+            </a:r>
+            <a:endParaRPr lang="en-US" dirty="0"/>
+          </a:p>
+        </p:txBody>
+      </p:sp>
+    </p:spTree>
+    <p:extLst>
+      <p:ext uri="{BB962C8B-B14F-4D97-AF65-F5344CB8AC3E}">
+        <p14:creationId xmlns:p14="http://schemas.microsoft.com/office/powerpoint/2010/main" val="1752963072"/>
+      </p:ext>
+    </p:extLst>
+  </p:cSld>
+  <p:clrMapOvr>
+    <a:masterClrMapping/>
+  </p:clrMapOvr>
+  <mc:AlternateContent xmlns:mc="http://schemas.openxmlformats.org/markup-compatibility/2006" xmlns:p14="http://schemas.microsoft.com/office/powerpoint/2010/main">
+    <mc:Choice Requires="p14">
+      <p:transition spd="med" p14:dur="700">
+        <p:fade/>
+      </p:transition>
+    </mc:Choice>
+    <mc:Fallback xmlns="">
+      <p:transition spd="med">
+        <p:fade/>
+      </p:transition>
+    </mc:Fallback>
+  </mc:AlternateContent>
+  <p:timing>
+    <p:tnLst>
+      <p:par>
+        <p:cTn id="1" dur="indefinite" restart="never" nodeType="tmRoot"/>
+      </p:par>
+    </p:tnLst>
+  </p:timing>
+</p:sld>
+</file>
+
+<file path=ppt/slides/slide41.xml><?xml version="1.0" encoding="utf-8"?>
+<p:sld xmlns:a="http://schemas.openxmlformats.org/drawingml/2006/main" xmlns:r="http://schemas.openxmlformats.org/officeDocument/2006/relationships" xmlns:p="http://schemas.openxmlformats.org/presentationml/2006/main">
+  <p:cSld>
+    <p:spTree>
+      <p:nvGrpSpPr>
+        <p:cNvPr id="1" name=""/>
+        <p:cNvGrpSpPr/>
+        <p:nvPr/>
+      </p:nvGrpSpPr>
+      <p:grpSpPr>
+        <a:xfrm>
+          <a:off x="0" y="0"/>
+          <a:ext cx="0" cy="0"/>
+          <a:chOff x="0" y="0"/>
+          <a:chExt cx="0" cy="0"/>
+        </a:xfrm>
+      </p:grpSpPr>
+      <p:sp>
+        <p:nvSpPr>
+          <p:cNvPr id="2" name="Title 1"/>
+          <p:cNvSpPr>
+            <a:spLocks noGrp="1"/>
+          </p:cNvSpPr>
+          <p:nvPr>
+            <p:ph type="title"/>
+          </p:nvPr>
+        </p:nvSpPr>
+        <p:spPr/>
+        <p:txBody>
+          <a:bodyPr/>
+          <a:lstStyle/>
+          <a:p>
+            <a:r>
+              <a:rPr lang="en-US" dirty="0" smtClean="0"/>
+              <a:t>Point: Scale-up works if…	</a:t>
+            </a:r>
+            <a:endParaRPr lang="en-US" dirty="0"/>
+          </a:p>
+        </p:txBody>
+      </p:sp>
+      <p:sp>
+        <p:nvSpPr>
+          <p:cNvPr id="3" name="Content Placeholder 2"/>
+          <p:cNvSpPr>
+            <a:spLocks noGrp="1"/>
+          </p:cNvSpPr>
+          <p:nvPr>
+            <p:ph idx="1"/>
+          </p:nvPr>
+        </p:nvSpPr>
+        <p:spPr>
+          <a:xfrm>
+            <a:off x="646111" y="1694023"/>
+            <a:ext cx="4638461" cy="4395151"/>
+          </a:xfrm>
+        </p:spPr>
+        <p:txBody>
+          <a:bodyPr>
+            <a:normAutofit/>
+          </a:bodyPr>
+          <a:lstStyle/>
+          <a:p>
+            <a:r>
+              <a:rPr lang="en-US" dirty="0" smtClean="0">
+                <a:hlinkClick r:id="rId2"/>
+              </a:rPr>
+              <a:t>Stackoverflow.com</a:t>
+            </a:r>
+            <a:endParaRPr lang="en-US" dirty="0" smtClean="0"/>
+          </a:p>
+          <a:p>
+            <a:pPr lvl="1"/>
+            <a:r>
+              <a:rPr lang="en-US" dirty="0" smtClean="0"/>
+              <a:t>The exception that proves the rule.</a:t>
+            </a:r>
+          </a:p>
+          <a:p>
+            <a:pPr lvl="1"/>
+            <a:r>
+              <a:rPr lang="en-US" dirty="0" smtClean="0"/>
+              <a:t>All with SQL Server!</a:t>
+            </a:r>
+          </a:p>
+          <a:p>
+            <a:pPr marL="0" indent="0">
+              <a:buNone/>
+            </a:pPr>
+            <a:r>
+              <a:rPr lang="en-US" sz="1200" dirty="0" smtClean="0"/>
+              <a:t>“</a:t>
+            </a:r>
+            <a:r>
+              <a:rPr lang="en-US" sz="1200" dirty="0"/>
+              <a:t>Stack Overflow still uses Microsoft products. Microsoft infrastructure works and is cheap enough, so there’s no compelling reason to change. Yet SO is pragmatic. They use Linux where it makes sense. There’s no purity push to make everything Linux or keep everything Microsoft. That wouldn’t be efficient. </a:t>
+            </a:r>
+          </a:p>
+          <a:p>
+            <a:pPr marL="0" indent="0">
+              <a:buNone/>
+            </a:pPr>
+            <a:r>
+              <a:rPr lang="en-US" sz="1200" dirty="0"/>
+              <a:t>Stack Overflow still uses a scale-up strategy. No clouds in site. </a:t>
+            </a:r>
+            <a:r>
+              <a:rPr lang="en-US" sz="1200" b="1" u="sng" dirty="0"/>
+              <a:t>With their SQL Servers loaded with 384 GB of RAM and 2TB of SSD, AWS would cost a fortune. </a:t>
+            </a:r>
+            <a:r>
+              <a:rPr lang="en-US" sz="1200" dirty="0"/>
+              <a:t>The cloud would also slow them down, making it harder to optimize and troubleshoot system issues. Plus, SO doesn’t need a horizontal scaling strategy. Large peak loads, where scaling out makes sense, hasn’t  been a problem because they’ve been quite successful at sizing their system correctly</a:t>
+            </a:r>
+            <a:r>
+              <a:rPr lang="en-US" sz="1200" dirty="0" smtClean="0"/>
+              <a:t>.”</a:t>
+            </a:r>
+            <a:endParaRPr lang="en-US" sz="1200" dirty="0"/>
+          </a:p>
+        </p:txBody>
+      </p:sp>
+      <p:pic>
+        <p:nvPicPr>
+          <p:cNvPr id="4" name="Picture 3"/>
+          <p:cNvPicPr>
+            <a:picLocks noChangeAspect="1"/>
+          </p:cNvPicPr>
+          <p:nvPr/>
+        </p:nvPicPr>
+        <p:blipFill>
+          <a:blip r:embed="rId3"/>
+          <a:stretch>
+            <a:fillRect/>
+          </a:stretch>
+        </p:blipFill>
+        <p:spPr>
+          <a:xfrm>
+            <a:off x="5815399" y="1853248"/>
+            <a:ext cx="5981700" cy="4076700"/>
+          </a:xfrm>
+          <a:prstGeom prst="rect">
+            <a:avLst/>
+          </a:prstGeom>
+        </p:spPr>
+      </p:pic>
+    </p:spTree>
+    <p:extLst>
+      <p:ext uri="{BB962C8B-B14F-4D97-AF65-F5344CB8AC3E}">
+        <p14:creationId xmlns:p14="http://schemas.microsoft.com/office/powerpoint/2010/main" val="365261967"/>
+      </p:ext>
+    </p:extLst>
+  </p:cSld>
+  <p:clrMapOvr>
+    <a:masterClrMapping/>
+  </p:clrMapOvr>
+  <p:timing>
+    <p:tnLst>
+      <p:par>
+        <p:cTn id="1" dur="indefinite" restart="never" nodeType="tmRoot"/>
+      </p:par>
+    </p:tnLst>
+  </p:timing>
+</p:sld>
+</file>
+
+<file path=ppt/slides/slide42.xml><?xml version="1.0" encoding="utf-8"?>
+<p:sld xmlns:a="http://schemas.openxmlformats.org/drawingml/2006/main" xmlns:r="http://schemas.openxmlformats.org/officeDocument/2006/relationships" xmlns:p="http://schemas.openxmlformats.org/presentationml/2006/main">
+  <p:cSld>
+    <p:spTree>
+      <p:nvGrpSpPr>
+        <p:cNvPr id="1" name=""/>
+        <p:cNvGrpSpPr/>
+        <p:nvPr/>
+      </p:nvGrpSpPr>
+      <p:grpSpPr>
+        <a:xfrm>
+          <a:off x="0" y="0"/>
+          <a:ext cx="0" cy="0"/>
+          <a:chOff x="0" y="0"/>
+          <a:chExt cx="0" cy="0"/>
+        </a:xfrm>
+      </p:grpSpPr>
+      <p:sp>
+        <p:nvSpPr>
+          <p:cNvPr id="2" name="Title 1"/>
+          <p:cNvSpPr>
+            <a:spLocks noGrp="1"/>
+          </p:cNvSpPr>
+          <p:nvPr>
+            <p:ph type="title"/>
+          </p:nvPr>
+        </p:nvSpPr>
+        <p:spPr/>
+        <p:txBody>
+          <a:bodyPr/>
+          <a:lstStyle/>
+          <a:p>
+            <a:r>
+              <a:rPr lang="en-US" dirty="0" smtClean="0"/>
+              <a:t>Things to </a:t>
+            </a:r>
+            <a:r>
+              <a:rPr lang="en-US" dirty="0" err="1" smtClean="0"/>
+              <a:t>grok</a:t>
+            </a:r>
+            <a:r>
+              <a:rPr lang="en-US" dirty="0" smtClean="0"/>
+              <a:t>: The app is everything at once</a:t>
+            </a:r>
+            <a:endParaRPr lang="en-US" dirty="0"/>
+          </a:p>
+        </p:txBody>
+      </p:sp>
+      <p:sp>
+        <p:nvSpPr>
+          <p:cNvPr id="3" name="Content Placeholder 2"/>
+          <p:cNvSpPr>
+            <a:spLocks noGrp="1"/>
+          </p:cNvSpPr>
+          <p:nvPr>
+            <p:ph idx="1"/>
+          </p:nvPr>
+        </p:nvSpPr>
+        <p:spPr/>
+        <p:txBody>
+          <a:bodyPr/>
+          <a:lstStyle/>
+          <a:p>
+            <a:r>
+              <a:rPr lang="en-US" dirty="0" smtClean="0"/>
+              <a:t>Two or more levels of architecture: </a:t>
+            </a:r>
+          </a:p>
+          <a:p>
+            <a:pPr lvl="1"/>
+            <a:r>
+              <a:rPr lang="en-US" dirty="0" err="1" smtClean="0"/>
+              <a:t>Microservices</a:t>
+            </a:r>
+            <a:r>
+              <a:rPr lang="en-US" dirty="0" smtClean="0"/>
+              <a:t> themselves</a:t>
+            </a:r>
+          </a:p>
+          <a:p>
+            <a:pPr lvl="1"/>
+            <a:r>
+              <a:rPr lang="en-US" dirty="0" smtClean="0"/>
+              <a:t>How all the </a:t>
+            </a:r>
+            <a:r>
+              <a:rPr lang="en-US" dirty="0" err="1" smtClean="0"/>
+              <a:t>microservices</a:t>
+            </a:r>
+            <a:r>
+              <a:rPr lang="en-US" dirty="0" smtClean="0"/>
+              <a:t> work together</a:t>
+            </a:r>
+          </a:p>
+          <a:p>
+            <a:pPr lvl="1"/>
+            <a:r>
+              <a:rPr lang="en-US" dirty="0" smtClean="0"/>
+              <a:t>The infrastructure that makes them happen – that’s </a:t>
+            </a:r>
+            <a:r>
+              <a:rPr lang="en-US" smtClean="0"/>
+              <a:t>all software now</a:t>
+            </a:r>
+            <a:endParaRPr lang="en-US" dirty="0"/>
+          </a:p>
+        </p:txBody>
+      </p:sp>
+    </p:spTree>
+    <p:extLst>
+      <p:ext uri="{BB962C8B-B14F-4D97-AF65-F5344CB8AC3E}">
+        <p14:creationId xmlns:p14="http://schemas.microsoft.com/office/powerpoint/2010/main" val="2659673164"/>
+      </p:ext>
+    </p:extLst>
+  </p:cSld>
+  <p:clrMapOvr>
+    <a:masterClrMapping/>
+  </p:clrMapOvr>
+  <mc:AlternateContent xmlns:mc="http://schemas.openxmlformats.org/markup-compatibility/2006" xmlns:p14="http://schemas.microsoft.com/office/powerpoint/2010/main">
+    <mc:Choice Requires="p14">
+      <p:transition spd="med" p14:dur="700">
+        <p:fade/>
+      </p:transition>
+    </mc:Choice>
+    <mc:Fallback xmlns="">
+      <p:transition spd="med">
+        <p:fade/>
+      </p:transition>
+    </mc:Fallback>
+  </mc:AlternateContent>
+  <p:timing>
+    <p:tnLst>
+      <p:par>
+        <p:cTn id="1" dur="indefinite" restart="never" nodeType="tmRoot"/>
+      </p:par>
+    </p:tnLst>
+  </p:timing>
+</p:sld>
+</file>
+
 <file path=ppt/slides/slide5.xml><?xml version="1.0" encoding="utf-8"?>
 <p:sld xmlns:a="http://schemas.openxmlformats.org/drawingml/2006/main" xmlns:r="http://schemas.openxmlformats.org/officeDocument/2006/relationships" xmlns:p="http://schemas.openxmlformats.org/presentationml/2006/main">
   <p:cSld>
@@ -16149,13 +16606,13 @@
   <p:clrMapOvr>
     <a:masterClrMapping/>
   </p:clrMapOvr>
-  <mc:AlternateContent xmlns:mc="http://schemas.openxmlformats.org/markup-compatibility/2006">
-    <mc:Choice xmlns:p14="http://schemas.microsoft.com/office/powerpoint/2010/main" Requires="p14">
+  <mc:AlternateContent xmlns:mc="http://schemas.openxmlformats.org/markup-compatibility/2006" xmlns:p14="http://schemas.microsoft.com/office/powerpoint/2010/main">
+    <mc:Choice Requires="p14">
       <p:transition spd="med" p14:dur="700">
         <p:fade/>
       </p:transition>
     </mc:Choice>
-    <mc:Fallback>
+    <mc:Fallback xmlns="">
       <p:transition spd="med">
         <p:fade/>
       </p:transition>
@@ -16601,13 +17058,13 @@
   <p:clrMapOvr>
     <a:masterClrMapping/>
   </p:clrMapOvr>
-  <mc:AlternateContent xmlns:mc="http://schemas.openxmlformats.org/markup-compatibility/2006">
-    <mc:Choice xmlns:p14="http://schemas.microsoft.com/office/powerpoint/2010/main" Requires="p14">
+  <mc:AlternateContent xmlns:mc="http://schemas.openxmlformats.org/markup-compatibility/2006" xmlns:p14="http://schemas.microsoft.com/office/powerpoint/2010/main">
+    <mc:Choice Requires="p14">
       <p:transition spd="med" p14:dur="700">
         <p:fade/>
       </p:transition>
     </mc:Choice>
-    <mc:Fallback>
+    <mc:Fallback xmlns="">
       <p:transition spd="med">
         <p:fade/>
       </p:transition>
@@ -16799,13 +17256,13 @@
   <p:clrMapOvr>
     <a:masterClrMapping/>
   </p:clrMapOvr>
-  <mc:AlternateContent xmlns:mc="http://schemas.openxmlformats.org/markup-compatibility/2006">
-    <mc:Choice xmlns:p14="http://schemas.microsoft.com/office/powerpoint/2010/main" Requires="p14">
+  <mc:AlternateContent xmlns:mc="http://schemas.openxmlformats.org/markup-compatibility/2006" xmlns:p14="http://schemas.microsoft.com/office/powerpoint/2010/main">
+    <mc:Choice Requires="p14">
       <p:transition spd="med" p14:dur="700">
         <p:fade/>
       </p:transition>
     </mc:Choice>
-    <mc:Fallback>
+    <mc:Fallback xmlns="">
       <p:transition spd="med">
         <p:fade/>
       </p:transition>
@@ -18083,13 +18540,13 @@
   <p:clrMapOvr>
     <a:masterClrMapping/>
   </p:clrMapOvr>
-  <mc:AlternateContent xmlns:mc="http://schemas.openxmlformats.org/markup-compatibility/2006">
-    <mc:Choice xmlns:p14="http://schemas.microsoft.com/office/powerpoint/2010/main" Requires="p14">
+  <mc:AlternateContent xmlns:mc="http://schemas.openxmlformats.org/markup-compatibility/2006" xmlns:p14="http://schemas.microsoft.com/office/powerpoint/2010/main">
+    <mc:Choice Requires="p14">
       <p:transition spd="med" p14:dur="700">
         <p:fade/>
       </p:transition>
     </mc:Choice>
-    <mc:Fallback>
+    <mc:Fallback xmlns="">
       <p:transition spd="med">
         <p:fade/>
       </p:transition>
@@ -18865,13 +19322,13 @@
   <p:clrMapOvr>
     <a:masterClrMapping/>
   </p:clrMapOvr>
-  <mc:AlternateContent xmlns:mc="http://schemas.openxmlformats.org/markup-compatibility/2006">
-    <mc:Choice xmlns:p14="http://schemas.microsoft.com/office/powerpoint/2010/main" Requires="p14">
+  <mc:AlternateContent xmlns:mc="http://schemas.openxmlformats.org/markup-compatibility/2006" xmlns:p14="http://schemas.microsoft.com/office/powerpoint/2010/main">
+    <mc:Choice Requires="p14">
       <p:transition spd="med" p14:dur="700">
         <p:fade/>
       </p:transition>
     </mc:Choice>
-    <mc:Fallback>
+    <mc:Fallback xmlns="">
       <p:transition spd="med">
         <p:fade/>
       </p:transition>

</xml_diff>

<commit_message>
finishing up the microservices
</commit_message>
<xml_diff>
--- a/Microservices Overview.pptx
+++ b/Microservices Overview.pptx
@@ -17,36 +17,37 @@
     <p:sldId id="279" r:id="rId11"/>
     <p:sldId id="280" r:id="rId12"/>
     <p:sldId id="295" r:id="rId13"/>
-    <p:sldId id="296" r:id="rId14"/>
-    <p:sldId id="267" r:id="rId15"/>
-    <p:sldId id="292" r:id="rId16"/>
-    <p:sldId id="284" r:id="rId17"/>
-    <p:sldId id="299" r:id="rId18"/>
-    <p:sldId id="300" r:id="rId19"/>
-    <p:sldId id="301" r:id="rId20"/>
-    <p:sldId id="302" r:id="rId21"/>
-    <p:sldId id="268" r:id="rId22"/>
-    <p:sldId id="285" r:id="rId23"/>
-    <p:sldId id="269" r:id="rId24"/>
-    <p:sldId id="287" r:id="rId25"/>
-    <p:sldId id="288" r:id="rId26"/>
-    <p:sldId id="290" r:id="rId27"/>
-    <p:sldId id="291" r:id="rId28"/>
-    <p:sldId id="293" r:id="rId29"/>
-    <p:sldId id="294" r:id="rId30"/>
-    <p:sldId id="297" r:id="rId31"/>
-    <p:sldId id="289" r:id="rId32"/>
-    <p:sldId id="270" r:id="rId33"/>
-    <p:sldId id="271" r:id="rId34"/>
-    <p:sldId id="272" r:id="rId35"/>
-    <p:sldId id="273" r:id="rId36"/>
-    <p:sldId id="274" r:id="rId37"/>
-    <p:sldId id="281" r:id="rId38"/>
-    <p:sldId id="282" r:id="rId39"/>
-    <p:sldId id="283" r:id="rId40"/>
-    <p:sldId id="262" r:id="rId41"/>
-    <p:sldId id="298" r:id="rId42"/>
-    <p:sldId id="261" r:id="rId43"/>
+    <p:sldId id="304" r:id="rId14"/>
+    <p:sldId id="296" r:id="rId15"/>
+    <p:sldId id="267" r:id="rId16"/>
+    <p:sldId id="292" r:id="rId17"/>
+    <p:sldId id="284" r:id="rId18"/>
+    <p:sldId id="299" r:id="rId19"/>
+    <p:sldId id="300" r:id="rId20"/>
+    <p:sldId id="301" r:id="rId21"/>
+    <p:sldId id="302" r:id="rId22"/>
+    <p:sldId id="268" r:id="rId23"/>
+    <p:sldId id="285" r:id="rId24"/>
+    <p:sldId id="269" r:id="rId25"/>
+    <p:sldId id="287" r:id="rId26"/>
+    <p:sldId id="288" r:id="rId27"/>
+    <p:sldId id="290" r:id="rId28"/>
+    <p:sldId id="291" r:id="rId29"/>
+    <p:sldId id="293" r:id="rId30"/>
+    <p:sldId id="294" r:id="rId31"/>
+    <p:sldId id="297" r:id="rId32"/>
+    <p:sldId id="289" r:id="rId33"/>
+    <p:sldId id="270" r:id="rId34"/>
+    <p:sldId id="271" r:id="rId35"/>
+    <p:sldId id="272" r:id="rId36"/>
+    <p:sldId id="273" r:id="rId37"/>
+    <p:sldId id="274" r:id="rId38"/>
+    <p:sldId id="281" r:id="rId39"/>
+    <p:sldId id="282" r:id="rId40"/>
+    <p:sldId id="283" r:id="rId41"/>
+    <p:sldId id="262" r:id="rId42"/>
+    <p:sldId id="298" r:id="rId43"/>
+    <p:sldId id="261" r:id="rId44"/>
   </p:sldIdLst>
   <p:sldSz cx="12192000" cy="6858000"/>
   <p:notesSz cx="6858000" cy="9144000"/>
@@ -166,6 +167,7 @@
             <p14:sldId id="279"/>
             <p14:sldId id="280"/>
             <p14:sldId id="295"/>
+            <p14:sldId id="304"/>
             <p14:sldId id="296"/>
             <p14:sldId id="267"/>
             <p14:sldId id="292"/>
@@ -8665,18 +8667,23 @@
               </a:r>
               <a:r>
                 <a:rPr lang="en-US" dirty="0"/>
-                <a:t> (</a:t>
+                <a:t> </a:t>
               </a:r>
               <a:r>
-                <a:rPr lang="en-US" sz="800" dirty="0">
+                <a:rPr lang="en-US" dirty="0" smtClean="0"/>
+                <a:t>(</a:t>
+              </a:r>
+              <a:r>
+                <a:rPr lang="en-US" sz="800" dirty="0" smtClean="0">
                   <a:hlinkClick r:id="rId3"/>
                 </a:rPr>
-                <a:t>https://github.com/squillace/leap2015/raw/master/gotoberlinpdf-141115183643-conversion-gate02.pdf</a:t>
+                <a:t>https://github.com/squillace/leap2015/raw/master/AdrianCockroftNetflixMicroservicesOverview.pdf</a:t>
               </a:r>
               <a:r>
-                <a:rPr lang="en-US" dirty="0"/>
+                <a:rPr lang="en-US" dirty="0" smtClean="0"/>
                 <a:t>)</a:t>
               </a:r>
+              <a:endParaRPr lang="en-US" dirty="0"/>
             </a:p>
           </p:txBody>
         </p:sp>
@@ -8816,6 +8823,106 @@
             <p:ph type="title"/>
           </p:nvPr>
         </p:nvSpPr>
+        <p:spPr/>
+        <p:txBody>
+          <a:bodyPr/>
+          <a:lstStyle/>
+          <a:p>
+            <a:endParaRPr lang="en-US"/>
+          </a:p>
+        </p:txBody>
+      </p:sp>
+      <p:pic>
+        <p:nvPicPr>
+          <p:cNvPr id="1026" name="Picture 2" descr="http://1.bp.blogspot.com/-Ome_r5TZSGo/VOTRbXoFX0I/AAAAAAAAAZQ/BJ49vy3prD8/s1600/slalom_full.png"/>
+          <p:cNvPicPr>
+            <a:picLocks noChangeAspect="1" noChangeArrowheads="1"/>
+          </p:cNvPicPr>
+          <p:nvPr/>
+        </p:nvPicPr>
+        <p:blipFill>
+          <a:blip r:embed="rId2">
+            <a:extLst>
+              <a:ext uri="{28A0092B-C50C-407E-A947-70E740481C1C}">
+                <a14:useLocalDpi xmlns:a14="http://schemas.microsoft.com/office/drawing/2010/main" val="0"/>
+              </a:ext>
+            </a:extLst>
+          </a:blip>
+          <a:srcRect/>
+          <a:stretch>
+            <a:fillRect/>
+          </a:stretch>
+        </p:blipFill>
+        <p:spPr bwMode="auto">
+          <a:xfrm>
+            <a:off x="842962" y="166006"/>
+            <a:ext cx="10506075" cy="6496051"/>
+          </a:xfrm>
+          <a:prstGeom prst="rect">
+            <a:avLst/>
+          </a:prstGeom>
+          <a:noFill/>
+          <a:extLst>
+            <a:ext uri="{909E8E84-426E-40DD-AFC4-6F175D3DCCD1}">
+              <a14:hiddenFill xmlns:a14="http://schemas.microsoft.com/office/drawing/2010/main">
+                <a:solidFill>
+                  <a:srgbClr val="FFFFFF"/>
+                </a:solidFill>
+              </a14:hiddenFill>
+            </a:ext>
+          </a:extLst>
+        </p:spPr>
+      </p:pic>
+    </p:spTree>
+    <p:extLst>
+      <p:ext uri="{BB962C8B-B14F-4D97-AF65-F5344CB8AC3E}">
+        <p14:creationId xmlns:p14="http://schemas.microsoft.com/office/powerpoint/2010/main" val="1441284435"/>
+      </p:ext>
+    </p:extLst>
+  </p:cSld>
+  <p:clrMapOvr>
+    <a:masterClrMapping/>
+  </p:clrMapOvr>
+  <p:transition>
+    <p:fade/>
+  </p:transition>
+  <p:timing>
+    <p:tnLst>
+      <p:par>
+        <p:cTn id="1" dur="indefinite" restart="never" nodeType="tmRoot"/>
+      </p:par>
+    </p:tnLst>
+  </p:timing>
+</p:sld>
+</file>
+
+<file path=ppt/slides/slide14.xml><?xml version="1.0" encoding="utf-8"?>
+<p:sld xmlns:a="http://schemas.openxmlformats.org/drawingml/2006/main" xmlns:r="http://schemas.openxmlformats.org/officeDocument/2006/relationships" xmlns:p="http://schemas.openxmlformats.org/presentationml/2006/main">
+  <p:cSld>
+    <p:spTree>
+      <p:nvGrpSpPr>
+        <p:cNvPr id="1" name=""/>
+        <p:cNvGrpSpPr/>
+        <p:nvPr/>
+      </p:nvGrpSpPr>
+      <p:grpSpPr>
+        <a:xfrm>
+          <a:off x="0" y="0"/>
+          <a:ext cx="0" cy="0"/>
+          <a:chOff x="0" y="0"/>
+          <a:chExt cx="0" cy="0"/>
+        </a:xfrm>
+      </p:grpSpPr>
+      <p:sp>
+        <p:nvSpPr>
+          <p:cNvPr id="2" name="Title 1"/>
+          <p:cNvSpPr>
+            <a:spLocks noGrp="1"/>
+          </p:cNvSpPr>
+          <p:nvPr>
+            <p:ph type="title"/>
+          </p:nvPr>
+        </p:nvSpPr>
         <p:spPr>
           <a:xfrm>
             <a:off x="654918" y="296562"/>
@@ -8956,7 +9063,7 @@
 </p:sld>
 </file>
 
-<file path=ppt/slides/slide14.xml><?xml version="1.0" encoding="utf-8"?>
+<file path=ppt/slides/slide15.xml><?xml version="1.0" encoding="utf-8"?>
 <p:sld xmlns:a="http://schemas.openxmlformats.org/drawingml/2006/main" xmlns:r="http://schemas.openxmlformats.org/officeDocument/2006/relationships" xmlns:p="http://schemas.openxmlformats.org/presentationml/2006/main">
   <p:cSld>
     <p:spTree>
@@ -9089,7 +9196,7 @@
 </p:sld>
 </file>
 
-<file path=ppt/slides/slide15.xml><?xml version="1.0" encoding="utf-8"?>
+<file path=ppt/slides/slide16.xml><?xml version="1.0" encoding="utf-8"?>
 <p:sld xmlns:a="http://schemas.openxmlformats.org/drawingml/2006/main" xmlns:r="http://schemas.openxmlformats.org/officeDocument/2006/relationships" xmlns:p="http://schemas.openxmlformats.org/presentationml/2006/main">
   <p:cSld>
     <p:spTree>
@@ -9496,97 +9603,6 @@
 </p:sld>
 </file>
 
-<file path=ppt/slides/slide16.xml><?xml version="1.0" encoding="utf-8"?>
-<p:sld xmlns:a="http://schemas.openxmlformats.org/drawingml/2006/main" xmlns:r="http://schemas.openxmlformats.org/officeDocument/2006/relationships" xmlns:p="http://schemas.openxmlformats.org/presentationml/2006/main">
-  <p:cSld>
-    <p:spTree>
-      <p:nvGrpSpPr>
-        <p:cNvPr id="1" name=""/>
-        <p:cNvGrpSpPr/>
-        <p:nvPr/>
-      </p:nvGrpSpPr>
-      <p:grpSpPr>
-        <a:xfrm>
-          <a:off x="0" y="0"/>
-          <a:ext cx="0" cy="0"/>
-          <a:chOff x="0" y="0"/>
-          <a:chExt cx="0" cy="0"/>
-        </a:xfrm>
-      </p:grpSpPr>
-      <p:sp>
-        <p:nvSpPr>
-          <p:cNvPr id="2" name="Title 1"/>
-          <p:cNvSpPr>
-            <a:spLocks noGrp="1"/>
-          </p:cNvSpPr>
-          <p:nvPr>
-            <p:ph type="title"/>
-          </p:nvPr>
-        </p:nvSpPr>
-        <p:spPr/>
-        <p:txBody>
-          <a:bodyPr/>
-          <a:lstStyle/>
-          <a:p>
-            <a:r>
-              <a:rPr lang="en-US" dirty="0" smtClean="0"/>
-              <a:t>Digression: Domain-driven design: DDD	</a:t>
-            </a:r>
-            <a:endParaRPr lang="en-US" dirty="0"/>
-          </a:p>
-        </p:txBody>
-      </p:sp>
-      <p:sp>
-        <p:nvSpPr>
-          <p:cNvPr id="3" name="Content Placeholder 2"/>
-          <p:cNvSpPr>
-            <a:spLocks noGrp="1"/>
-          </p:cNvSpPr>
-          <p:nvPr>
-            <p:ph idx="1"/>
-          </p:nvPr>
-        </p:nvSpPr>
-        <p:spPr/>
-        <p:txBody>
-          <a:bodyPr/>
-          <a:lstStyle/>
-          <a:p>
-            <a:endParaRPr lang="en-US"/>
-          </a:p>
-        </p:txBody>
-      </p:sp>
-    </p:spTree>
-    <p:extLst>
-      <p:ext uri="{BB962C8B-B14F-4D97-AF65-F5344CB8AC3E}">
-        <p14:creationId xmlns:p14="http://schemas.microsoft.com/office/powerpoint/2010/main" val="1597913619"/>
-      </p:ext>
-    </p:extLst>
-  </p:cSld>
-  <p:clrMapOvr>
-    <a:masterClrMapping/>
-  </p:clrMapOvr>
-  <mc:AlternateContent xmlns:mc="http://schemas.openxmlformats.org/markup-compatibility/2006" xmlns:p14="http://schemas.microsoft.com/office/powerpoint/2010/main">
-    <mc:Choice Requires="p14">
-      <p:transition spd="med" p14:dur="700">
-        <p:fade/>
-      </p:transition>
-    </mc:Choice>
-    <mc:Fallback xmlns="">
-      <p:transition spd="med">
-        <p:fade/>
-      </p:transition>
-    </mc:Fallback>
-  </mc:AlternateContent>
-  <p:timing>
-    <p:tnLst>
-      <p:par>
-        <p:cTn id="1" dur="indefinite" restart="never" nodeType="tmRoot"/>
-      </p:par>
-    </p:tnLst>
-  </p:timing>
-</p:sld>
-</file>
-
 <file path=ppt/slides/slide17.xml><?xml version="1.0" encoding="utf-8"?>
 <p:sld xmlns:a="http://schemas.openxmlformats.org/drawingml/2006/main" xmlns:r="http://schemas.openxmlformats.org/officeDocument/2006/relationships" xmlns:p="http://schemas.openxmlformats.org/presentationml/2006/main">
   <p:cSld>
@@ -9621,21 +9637,7 @@
           <a:p>
             <a:r>
               <a:rPr lang="en-US" dirty="0" smtClean="0"/>
-              <a:t>Book: Eric Evans, </a:t>
-            </a:r>
-            <a:r>
-              <a:rPr lang="en-US" i="1" dirty="0" smtClean="0">
-                <a:hlinkClick r:id="rId2"/>
-              </a:rPr>
-              <a:t>Domain-driven Design</a:t>
-            </a:r>
-            <a:r>
-              <a:rPr lang="en-US" i="1" dirty="0" smtClean="0"/>
-              <a:t> </a:t>
-            </a:r>
-            <a:r>
-              <a:rPr lang="en-US" dirty="0" smtClean="0"/>
-              <a:t>(2003)</a:t>
+              <a:t>Digression: Domain-driven design: DDD	</a:t>
             </a:r>
             <a:endParaRPr lang="en-US" dirty="0"/>
           </a:p>
@@ -9656,44 +9658,14 @@
           <a:bodyPr/>
           <a:lstStyle/>
           <a:p>
-            <a:r>
-              <a:rPr lang="en-US" dirty="0" smtClean="0"/>
-              <a:t>At a high level, much of the approach is already part of common knowledge: </a:t>
-            </a:r>
-          </a:p>
-          <a:p>
-            <a:pPr lvl="1"/>
-            <a:r>
-              <a:rPr lang="en-US" dirty="0" smtClean="0"/>
-              <a:t>Primary focus is on core domain and domain logic</a:t>
-            </a:r>
-          </a:p>
-          <a:p>
-            <a:pPr lvl="1"/>
-            <a:r>
-              <a:rPr lang="en-US" dirty="0" smtClean="0"/>
-              <a:t>Designs are based on evolving model of that domain</a:t>
-            </a:r>
-          </a:p>
-          <a:p>
-            <a:r>
-              <a:rPr lang="en-US" dirty="0" smtClean="0"/>
-              <a:t>Core Concept to keep in mind</a:t>
-            </a:r>
-          </a:p>
-          <a:p>
-            <a:pPr lvl="1"/>
-            <a:r>
-              <a:rPr lang="en-US" i="1" dirty="0" smtClean="0"/>
-              <a:t>Bounded Context</a:t>
-            </a:r>
+            <a:endParaRPr lang="en-US"/>
           </a:p>
         </p:txBody>
       </p:sp>
     </p:spTree>
     <p:extLst>
       <p:ext uri="{BB962C8B-B14F-4D97-AF65-F5344CB8AC3E}">
-        <p14:creationId xmlns:p14="http://schemas.microsoft.com/office/powerpoint/2010/main" val="824817531"/>
+        <p14:creationId xmlns:p14="http://schemas.microsoft.com/office/powerpoint/2010/main" val="1597913619"/>
       </p:ext>
     </p:extLst>
   </p:cSld>
@@ -9756,7 +9728,21 @@
           <a:p>
             <a:r>
               <a:rPr lang="en-US" dirty="0" smtClean="0"/>
-              <a:t>My take on DDD – uh, yeah.</a:t>
+              <a:t>Book: Eric Evans, </a:t>
+            </a:r>
+            <a:r>
+              <a:rPr lang="en-US" i="1" dirty="0" smtClean="0">
+                <a:hlinkClick r:id="rId2"/>
+              </a:rPr>
+              <a:t>Domain-driven Design</a:t>
+            </a:r>
+            <a:r>
+              <a:rPr lang="en-US" i="1" dirty="0" smtClean="0"/>
+              <a:t> </a:t>
+            </a:r>
+            <a:r>
+              <a:rPr lang="en-US" dirty="0" smtClean="0"/>
+              <a:t>(2003)</a:t>
             </a:r>
             <a:endParaRPr lang="en-US" dirty="0"/>
           </a:p>
@@ -9779,83 +9765,42 @@
           <a:p>
             <a:r>
               <a:rPr lang="en-US" dirty="0" smtClean="0"/>
-              <a:t>Understand, model precisely, communicate, and iterate over the model of a specific </a:t>
-            </a:r>
-            <a:r>
-              <a:rPr lang="en-US" i="1" dirty="0" smtClean="0">
-                <a:hlinkClick r:id="rId2"/>
-              </a:rPr>
-              <a:t>bounded context</a:t>
-            </a:r>
-            <a:r>
-              <a:rPr lang="en-US" dirty="0" smtClean="0"/>
-              <a:t>. </a:t>
-            </a:r>
-          </a:p>
-          <a:p>
-            <a:r>
-              <a:rPr lang="en-US" dirty="0" smtClean="0"/>
-              <a:t>Models abound; </a:t>
-            </a:r>
+              <a:t>At a high level, much of the approach is already part of common knowledge: </a:t>
+            </a:r>
+          </a:p>
+          <a:p>
+            <a:pPr lvl="1"/>
+            <a:r>
+              <a:rPr lang="en-US" dirty="0" smtClean="0"/>
+              <a:t>Primary focus is on core domain and domain logic</a:t>
+            </a:r>
+          </a:p>
+          <a:p>
+            <a:pPr lvl="1"/>
+            <a:r>
+              <a:rPr lang="en-US" dirty="0" smtClean="0"/>
+              <a:t>Designs are based on evolving model of that domain</a:t>
+            </a:r>
+          </a:p>
+          <a:p>
+            <a:r>
+              <a:rPr lang="en-US" dirty="0" smtClean="0"/>
+              <a:t>Core Concept to keep in mind</a:t>
+            </a:r>
+          </a:p>
+          <a:p>
+            <a:pPr lvl="1"/>
             <a:r>
               <a:rPr lang="en-US" i="1" dirty="0" smtClean="0"/>
-              <a:t>this</a:t>
-            </a:r>
-            <a:r>
-              <a:rPr lang="en-US" dirty="0" smtClean="0"/>
-              <a:t> model only makes sense in a </a:t>
-            </a:r>
-            <a:r>
-              <a:rPr lang="en-US" i="1" dirty="0" smtClean="0"/>
-              <a:t>specific context</a:t>
-            </a:r>
-            <a:r>
-              <a:rPr lang="en-US" dirty="0" smtClean="0"/>
-              <a:t>. </a:t>
-            </a:r>
-          </a:p>
-          <a:p>
-            <a:r>
-              <a:rPr lang="en-US" dirty="0" smtClean="0"/>
-              <a:t>You avoid huge problems if you try to stretch models beyond their context. </a:t>
-            </a:r>
-          </a:p>
-          <a:p>
-            <a:pPr lvl="1"/>
-            <a:r>
-              <a:rPr lang="en-US" dirty="0" smtClean="0"/>
-              <a:t>Example: An address object might have “commonality” but it might </a:t>
-            </a:r>
-            <a:r>
-              <a:rPr lang="en-US" i="1" dirty="0" smtClean="0"/>
-              <a:t>not, </a:t>
-            </a:r>
-            <a:r>
-              <a:rPr lang="en-US" dirty="0" smtClean="0"/>
-              <a:t>also. But it </a:t>
-            </a:r>
-            <a:r>
-              <a:rPr lang="en-US" i="1" dirty="0" smtClean="0"/>
-              <a:t>does inside our </a:t>
-            </a:r>
-            <a:r>
-              <a:rPr lang="en-US" i="1" dirty="0" err="1" smtClean="0"/>
-              <a:t>microservice</a:t>
-            </a:r>
-            <a:r>
-              <a:rPr lang="en-US" dirty="0" smtClean="0"/>
-              <a:t>.</a:t>
-            </a:r>
-          </a:p>
-          <a:p>
-            <a:endParaRPr lang="en-US" dirty="0"/>
+              <a:t>Bounded Context</a:t>
+            </a:r>
           </a:p>
         </p:txBody>
       </p:sp>
     </p:spTree>
     <p:extLst>
       <p:ext uri="{BB962C8B-B14F-4D97-AF65-F5344CB8AC3E}">
-        <p14:creationId xmlns:p14="http://schemas.microsoft.com/office/powerpoint/2010/main" val="3256017868"/>
+        <p14:creationId xmlns:p14="http://schemas.microsoft.com/office/powerpoint/2010/main" val="824817531"/>
       </p:ext>
     </p:extLst>
   </p:cSld>
@@ -9918,7 +9863,7 @@
           <a:p>
             <a:r>
               <a:rPr lang="en-US" dirty="0" smtClean="0"/>
-              <a:t>My take on DDD, Part Two</a:t>
+              <a:t>My take on DDD – uh, yeah.</a:t>
             </a:r>
             <a:endParaRPr lang="en-US" dirty="0"/>
           </a:p>
@@ -9934,113 +9879,90 @@
             <p:ph idx="1"/>
           </p:nvPr>
         </p:nvSpPr>
-        <p:spPr>
-          <a:xfrm>
-            <a:off x="1103312" y="1359244"/>
-            <a:ext cx="8946541" cy="4889156"/>
-          </a:xfrm>
-        </p:spPr>
+        <p:spPr/>
         <p:txBody>
-          <a:bodyPr>
-            <a:normAutofit/>
-          </a:bodyPr>
+          <a:bodyPr/>
           <a:lstStyle/>
           <a:p>
             <a:r>
               <a:rPr lang="en-US" dirty="0" smtClean="0"/>
-              <a:t>There are funny things about the original works and up to and including work on it in 2010.</a:t>
-            </a:r>
-          </a:p>
-          <a:p>
-            <a:r>
-              <a:rPr lang="en-US" dirty="0" smtClean="0"/>
-              <a:t>Was focused on work done in object-oriented systems, which were hard to scale out. Largest thrust was on scoping down and focusing on controlling inputs and outputs of components (not called “services” originally). </a:t>
-            </a:r>
-          </a:p>
-          <a:p>
-            <a:r>
-              <a:rPr lang="en-US" dirty="0" smtClean="0"/>
-              <a:t>“services” were mentioned: operations that do not conceptually belong to objects. </a:t>
-            </a:r>
-            <a:r>
-              <a:rPr lang="en-US" dirty="0" smtClean="0">
-                <a:sym typeface="Wingdings" panose="05000000000000000000" pitchFamily="2" charset="2"/>
-              </a:rPr>
-              <a:t></a:t>
-            </a:r>
-          </a:p>
-          <a:p>
-            <a:r>
-              <a:rPr lang="en-US" dirty="0" smtClean="0">
-                <a:sym typeface="Wingdings" panose="05000000000000000000" pitchFamily="2" charset="2"/>
-              </a:rPr>
-              <a:t>Microsoft’s take in </a:t>
-            </a:r>
-            <a:r>
-              <a:rPr lang="en-US" dirty="0" smtClean="0">
-                <a:sym typeface="Wingdings" panose="05000000000000000000" pitchFamily="2" charset="2"/>
+              <a:t>Understand, model precisely, communicate, and iterate over the model of a specific </a:t>
+            </a:r>
+            <a:r>
+              <a:rPr lang="en-US" i="1" dirty="0" smtClean="0">
                 <a:hlinkClick r:id="rId2"/>
               </a:rPr>
-              <a:t>2009 guidance</a:t>
-            </a:r>
-            <a:r>
-              <a:rPr lang="en-US" dirty="0" smtClean="0">
-                <a:sym typeface="Wingdings" panose="05000000000000000000" pitchFamily="2" charset="2"/>
-              </a:rPr>
-              <a:t>:</a:t>
-            </a:r>
-            <a:br>
-              <a:rPr lang="en-US" dirty="0" smtClean="0">
-                <a:sym typeface="Wingdings" panose="05000000000000000000" pitchFamily="2" charset="2"/>
-              </a:rPr>
-            </a:br>
-            <a:r>
-              <a:rPr lang="en-US" sz="1300" dirty="0" smtClean="0">
-                <a:sym typeface="Wingdings" panose="05000000000000000000" pitchFamily="2" charset="2"/>
-              </a:rPr>
-              <a:t>“</a:t>
-            </a:r>
-            <a:r>
-              <a:rPr lang="en-US" sz="1300" dirty="0"/>
-              <a:t>In order to help maintain the model as a pure and helpful language construct, you must typically implement a great deal of isolation and encapsulation within the domain model. Consequently, a system based on Domain Driven Design can come at a relatively high cost. While Domain Driven Design provides many technical benefits, such as maintainability</a:t>
-            </a:r>
-            <a:r>
-              <a:rPr lang="en-US" sz="1300" b="1" dirty="0">
-                <a:solidFill>
-                  <a:srgbClr val="FFFF00"/>
-                </a:solidFill>
-              </a:rPr>
-              <a:t>, it should be applied only to complex domains where the model and the linguistic processes provide clear benefits in the communication of complex information</a:t>
-            </a:r>
-            <a:r>
-              <a:rPr lang="en-US" sz="1300" dirty="0"/>
-              <a:t>, and in the formulation of a </a:t>
-            </a:r>
-            <a:r>
-              <a:rPr lang="en-US" sz="1300" dirty="0" smtClean="0"/>
-              <a:t>common </a:t>
-            </a:r>
-            <a:r>
-              <a:rPr lang="en-US" sz="1300" dirty="0"/>
-              <a:t>understanding of the domain</a:t>
-            </a:r>
-            <a:r>
-              <a:rPr lang="en-US" sz="1300" dirty="0" smtClean="0"/>
+              <a:t>bounded context</a:t>
+            </a:r>
+            <a:r>
+              <a:rPr lang="en-US" dirty="0" smtClean="0"/>
+              <a:t>. </a:t>
+            </a:r>
+          </a:p>
+          <a:p>
+            <a:r>
+              <a:rPr lang="en-US" dirty="0" smtClean="0"/>
+              <a:t>Models abound; </a:t>
+            </a:r>
+            <a:r>
+              <a:rPr lang="en-US" i="1" dirty="0" smtClean="0"/>
+              <a:t>this</a:t>
+            </a:r>
+            <a:r>
+              <a:rPr lang="en-US" dirty="0" smtClean="0"/>
+              <a:t> model only makes sense in a </a:t>
+            </a:r>
+            <a:r>
+              <a:rPr lang="en-US" i="1" dirty="0" smtClean="0"/>
+              <a:t>specific context</a:t>
+            </a:r>
+            <a:r>
+              <a:rPr lang="en-US" dirty="0" smtClean="0"/>
+              <a:t>. </a:t>
+            </a:r>
+          </a:p>
+          <a:p>
+            <a:r>
+              <a:rPr lang="en-US" dirty="0" smtClean="0"/>
+              <a:t>You avoid huge problems if you try to stretch models beyond their context. </a:t>
+            </a:r>
+          </a:p>
+          <a:p>
+            <a:pPr lvl="1"/>
+            <a:r>
+              <a:rPr lang="en-US" dirty="0" smtClean="0"/>
+              <a:t>Example: An address object might have “commonality” but it might </a:t>
+            </a:r>
+            <a:r>
+              <a:rPr lang="en-US" i="1" dirty="0" smtClean="0"/>
+              <a:t>not, </a:t>
+            </a:r>
+            <a:r>
+              <a:rPr lang="en-US" dirty="0" smtClean="0"/>
+              <a:t>also. But it </a:t>
+            </a:r>
+            <a:r>
+              <a:rPr lang="en-US" i="1" dirty="0" smtClean="0"/>
+              <a:t>does inside our </a:t>
+            </a:r>
+            <a:r>
+              <a:rPr lang="en-US" i="1" dirty="0" err="1" smtClean="0"/>
+              <a:t>microservice</a:t>
+            </a:r>
+            <a:r>
+              <a:rPr lang="en-US" dirty="0" smtClean="0"/>
               <a:t>.</a:t>
             </a:r>
-            <a:r>
-              <a:rPr lang="en-US" sz="1300" dirty="0" smtClean="0">
-                <a:sym typeface="Wingdings" panose="05000000000000000000" pitchFamily="2" charset="2"/>
-              </a:rPr>
-              <a:t>”</a:t>
-            </a:r>
+          </a:p>
+          <a:p>
+            <a:endParaRPr lang="en-US" dirty="0"/>
           </a:p>
         </p:txBody>
       </p:sp>
     </p:spTree>
     <p:extLst>
       <p:ext uri="{BB962C8B-B14F-4D97-AF65-F5344CB8AC3E}">
-        <p14:creationId xmlns:p14="http://schemas.microsoft.com/office/powerpoint/2010/main" val="46852448"/>
+        <p14:creationId xmlns:p14="http://schemas.microsoft.com/office/powerpoint/2010/main" val="3256017868"/>
       </p:ext>
     </p:extLst>
   </p:cSld>
@@ -10218,6 +10140,191 @@
           <a:p>
             <a:r>
               <a:rPr lang="en-US" dirty="0" smtClean="0"/>
+              <a:t>My take on DDD, Part Two</a:t>
+            </a:r>
+            <a:endParaRPr lang="en-US" dirty="0"/>
+          </a:p>
+        </p:txBody>
+      </p:sp>
+      <p:sp>
+        <p:nvSpPr>
+          <p:cNvPr id="3" name="Content Placeholder 2"/>
+          <p:cNvSpPr>
+            <a:spLocks noGrp="1"/>
+          </p:cNvSpPr>
+          <p:nvPr>
+            <p:ph idx="1"/>
+          </p:nvPr>
+        </p:nvSpPr>
+        <p:spPr>
+          <a:xfrm>
+            <a:off x="1103312" y="1359244"/>
+            <a:ext cx="8946541" cy="4889156"/>
+          </a:xfrm>
+        </p:spPr>
+        <p:txBody>
+          <a:bodyPr>
+            <a:normAutofit/>
+          </a:bodyPr>
+          <a:lstStyle/>
+          <a:p>
+            <a:r>
+              <a:rPr lang="en-US" dirty="0" smtClean="0"/>
+              <a:t>There are funny things about the original works and up to and including work on it in 2010.</a:t>
+            </a:r>
+          </a:p>
+          <a:p>
+            <a:r>
+              <a:rPr lang="en-US" dirty="0" smtClean="0"/>
+              <a:t>Was focused on work done in object-oriented systems, which were hard to scale out. Largest thrust was on scoping down and focusing on controlling inputs and outputs of components (not called “services” originally). </a:t>
+            </a:r>
+          </a:p>
+          <a:p>
+            <a:r>
+              <a:rPr lang="en-US" dirty="0" smtClean="0"/>
+              <a:t>“services” were mentioned: operations that do not conceptually belong to objects. </a:t>
+            </a:r>
+            <a:r>
+              <a:rPr lang="en-US" dirty="0" smtClean="0">
+                <a:sym typeface="Wingdings" panose="05000000000000000000" pitchFamily="2" charset="2"/>
+              </a:rPr>
+              <a:t></a:t>
+            </a:r>
+          </a:p>
+          <a:p>
+            <a:r>
+              <a:rPr lang="en-US" dirty="0" smtClean="0">
+                <a:sym typeface="Wingdings" panose="05000000000000000000" pitchFamily="2" charset="2"/>
+              </a:rPr>
+              <a:t>Microsoft’s take in </a:t>
+            </a:r>
+            <a:r>
+              <a:rPr lang="en-US" dirty="0" smtClean="0">
+                <a:sym typeface="Wingdings" panose="05000000000000000000" pitchFamily="2" charset="2"/>
+                <a:hlinkClick r:id="rId2"/>
+              </a:rPr>
+              <a:t>2009 guidance</a:t>
+            </a:r>
+            <a:r>
+              <a:rPr lang="en-US" dirty="0" smtClean="0">
+                <a:sym typeface="Wingdings" panose="05000000000000000000" pitchFamily="2" charset="2"/>
+              </a:rPr>
+              <a:t>:</a:t>
+            </a:r>
+            <a:br>
+              <a:rPr lang="en-US" dirty="0" smtClean="0">
+                <a:sym typeface="Wingdings" panose="05000000000000000000" pitchFamily="2" charset="2"/>
+              </a:rPr>
+            </a:br>
+            <a:r>
+              <a:rPr lang="en-US" sz="1300" dirty="0" smtClean="0">
+                <a:sym typeface="Wingdings" panose="05000000000000000000" pitchFamily="2" charset="2"/>
+              </a:rPr>
+              <a:t>“</a:t>
+            </a:r>
+            <a:r>
+              <a:rPr lang="en-US" sz="1300" dirty="0"/>
+              <a:t>In order to help maintain the model as a pure and helpful language construct, you must typically implement a great deal of isolation and encapsulation within the domain model. Consequently, a system based on Domain Driven Design can come at a relatively high cost. While Domain Driven Design provides many technical benefits, such as maintainability</a:t>
+            </a:r>
+            <a:r>
+              <a:rPr lang="en-US" sz="1300" b="1" dirty="0">
+                <a:solidFill>
+                  <a:srgbClr val="FFFF00"/>
+                </a:solidFill>
+              </a:rPr>
+              <a:t>, it should be applied only to complex domains where the model and the linguistic processes provide clear benefits in the communication of complex information</a:t>
+            </a:r>
+            <a:r>
+              <a:rPr lang="en-US" sz="1300" dirty="0"/>
+              <a:t>, and in the formulation of a </a:t>
+            </a:r>
+            <a:r>
+              <a:rPr lang="en-US" sz="1300" dirty="0" smtClean="0"/>
+              <a:t>common </a:t>
+            </a:r>
+            <a:r>
+              <a:rPr lang="en-US" sz="1300" dirty="0"/>
+              <a:t>understanding of the domain</a:t>
+            </a:r>
+            <a:r>
+              <a:rPr lang="en-US" sz="1300" dirty="0" smtClean="0"/>
+              <a:t>.</a:t>
+            </a:r>
+            <a:r>
+              <a:rPr lang="en-US" sz="1300" dirty="0" smtClean="0">
+                <a:sym typeface="Wingdings" panose="05000000000000000000" pitchFamily="2" charset="2"/>
+              </a:rPr>
+              <a:t>”</a:t>
+            </a:r>
+          </a:p>
+        </p:txBody>
+      </p:sp>
+    </p:spTree>
+    <p:extLst>
+      <p:ext uri="{BB962C8B-B14F-4D97-AF65-F5344CB8AC3E}">
+        <p14:creationId xmlns:p14="http://schemas.microsoft.com/office/powerpoint/2010/main" val="46852448"/>
+      </p:ext>
+    </p:extLst>
+  </p:cSld>
+  <p:clrMapOvr>
+    <a:masterClrMapping/>
+  </p:clrMapOvr>
+  <mc:AlternateContent xmlns:mc="http://schemas.openxmlformats.org/markup-compatibility/2006" xmlns:p14="http://schemas.microsoft.com/office/powerpoint/2010/main">
+    <mc:Choice Requires="p14">
+      <p:transition spd="med" p14:dur="700">
+        <p:fade/>
+      </p:transition>
+    </mc:Choice>
+    <mc:Fallback xmlns="">
+      <p:transition spd="med">
+        <p:fade/>
+      </p:transition>
+    </mc:Fallback>
+  </mc:AlternateContent>
+  <p:timing>
+    <p:tnLst>
+      <p:par>
+        <p:cTn id="1" dur="indefinite" restart="never" nodeType="tmRoot"/>
+      </p:par>
+    </p:tnLst>
+  </p:timing>
+</p:sld>
+</file>
+
+<file path=ppt/slides/slide21.xml><?xml version="1.0" encoding="utf-8"?>
+<p:sld xmlns:a="http://schemas.openxmlformats.org/drawingml/2006/main" xmlns:r="http://schemas.openxmlformats.org/officeDocument/2006/relationships" xmlns:p="http://schemas.openxmlformats.org/presentationml/2006/main">
+  <p:cSld>
+    <p:spTree>
+      <p:nvGrpSpPr>
+        <p:cNvPr id="1" name=""/>
+        <p:cNvGrpSpPr/>
+        <p:nvPr/>
+      </p:nvGrpSpPr>
+      <p:grpSpPr>
+        <a:xfrm>
+          <a:off x="0" y="0"/>
+          <a:ext cx="0" cy="0"/>
+          <a:chOff x="0" y="0"/>
+          <a:chExt cx="0" cy="0"/>
+        </a:xfrm>
+      </p:grpSpPr>
+      <p:sp>
+        <p:nvSpPr>
+          <p:cNvPr id="2" name="Title 1"/>
+          <p:cNvSpPr>
+            <a:spLocks noGrp="1"/>
+          </p:cNvSpPr>
+          <p:nvPr>
+            <p:ph type="title"/>
+          </p:nvPr>
+        </p:nvSpPr>
+        <p:spPr/>
+        <p:txBody>
+          <a:bodyPr/>
+          <a:lstStyle/>
+          <a:p>
+            <a:r>
+              <a:rPr lang="en-US" dirty="0" smtClean="0"/>
               <a:t>My take on DDD, Part Three</a:t>
             </a:r>
             <a:endParaRPr lang="en-US" dirty="0"/>
@@ -10338,7 +10445,7 @@
 </p:sld>
 </file>
 
-<file path=ppt/slides/slide21.xml><?xml version="1.0" encoding="utf-8"?>
+<file path=ppt/slides/slide22.xml><?xml version="1.0" encoding="utf-8"?>
 <p:sld xmlns:a="http://schemas.openxmlformats.org/drawingml/2006/main" xmlns:r="http://schemas.openxmlformats.org/officeDocument/2006/relationships" xmlns:p="http://schemas.openxmlformats.org/presentationml/2006/main">
   <p:cSld>
     <p:spTree>
@@ -11072,7 +11179,7 @@
 </p:sld>
 </file>
 
-<file path=ppt/slides/slide22.xml><?xml version="1.0" encoding="utf-8"?>
+<file path=ppt/slides/slide23.xml><?xml version="1.0" encoding="utf-8"?>
 <p:sld xmlns:a="http://schemas.openxmlformats.org/drawingml/2006/main" xmlns:r="http://schemas.openxmlformats.org/officeDocument/2006/relationships" xmlns:p="http://schemas.openxmlformats.org/presentationml/2006/main">
   <p:cSld>
     <p:spTree>
@@ -11182,7 +11289,7 @@
 </p:sld>
 </file>
 
-<file path=ppt/slides/slide23.xml><?xml version="1.0" encoding="utf-8"?>
+<file path=ppt/slides/slide24.xml><?xml version="1.0" encoding="utf-8"?>
 <p:sld xmlns:a="http://schemas.openxmlformats.org/drawingml/2006/main" xmlns:r="http://schemas.openxmlformats.org/officeDocument/2006/relationships" xmlns:p="http://schemas.openxmlformats.org/presentationml/2006/main">
   <p:cSld>
     <p:spTree>
@@ -11244,7 +11351,9 @@
           </a:xfrm>
         </p:spPr>
         <p:txBody>
-          <a:bodyPr/>
+          <a:bodyPr>
+            <a:normAutofit fontScale="92500"/>
+          </a:bodyPr>
           <a:lstStyle/>
           <a:p>
             <a:r>
@@ -11265,8 +11374,38 @@
             </a:r>
             <a:r>
               <a:rPr lang="en-US" dirty="0" smtClean="0"/>
-              <a:t>. </a:t>
-            </a:r>
+              <a:t>.</a:t>
+            </a:r>
+          </a:p>
+          <a:p>
+            <a:pPr lvl="1"/>
+            <a:r>
+              <a:rPr lang="en-US" dirty="0" smtClean="0">
+                <a:hlinkClick r:id="rId2"/>
+              </a:rPr>
+              <a:t>Information: A History</a:t>
+            </a:r>
+            <a:endParaRPr lang="en-US" dirty="0" smtClean="0"/>
+          </a:p>
+          <a:p>
+            <a:pPr lvl="1"/>
+            <a:r>
+              <a:rPr lang="en-US" dirty="0" err="1" smtClean="0">
+                <a:hlinkClick r:id="rId3"/>
+              </a:rPr>
+              <a:t>Antifragile</a:t>
+            </a:r>
+            <a:r>
+              <a:rPr lang="en-US" dirty="0" smtClean="0">
+                <a:hlinkClick r:id="rId3"/>
+              </a:rPr>
+              <a:t>: Things that Gain From Disorder</a:t>
+            </a:r>
+            <a:r>
+              <a:rPr lang="en-US" dirty="0" smtClean="0"/>
+              <a:t> </a:t>
+            </a:r>
+            <a:endParaRPr lang="en-US" dirty="0" smtClean="0"/>
           </a:p>
           <a:p>
             <a:r>
@@ -11286,8 +11425,80 @@
             </a:r>
             <a:r>
               <a:rPr lang="en-US" dirty="0" smtClean="0"/>
-              <a:t> services! (Does everyone know Bic? Most famous French company in the United States that no one knows it’s French.)</a:t>
-            </a:r>
+              <a:t> services! (Does everyone know </a:t>
+            </a:r>
+            <a:r>
+              <a:rPr lang="en-US" i="1" dirty="0" err="1">
+                <a:hlinkClick r:id="rId4" tooltip="Société Bic"/>
+              </a:rPr>
+              <a:t>Société</a:t>
+            </a:r>
+            <a:r>
+              <a:rPr lang="en-US" i="1" dirty="0">
+                <a:hlinkClick r:id="rId4" tooltip="Société Bic"/>
+              </a:rPr>
+              <a:t> Bic</a:t>
+            </a:r>
+            <a:r>
+              <a:rPr lang="en-US" dirty="0" smtClean="0"/>
+              <a:t>? </a:t>
+            </a:r>
+            <a:r>
+              <a:rPr lang="en-US" dirty="0" smtClean="0"/>
+              <a:t>Most famous French company in the United States that no one knows it’s French</a:t>
+            </a:r>
+            <a:r>
+              <a:rPr lang="en-US" dirty="0" smtClean="0"/>
+              <a:t>.)</a:t>
+            </a:r>
+          </a:p>
+          <a:p>
+            <a:pPr lvl="2"/>
+            <a:r>
+              <a:rPr lang="en-US" dirty="0"/>
+              <a:t>Digression: “Between 1949 and 1950 the Bic Cristal was designed by the </a:t>
+            </a:r>
+            <a:r>
+              <a:rPr lang="en-US" i="1" dirty="0"/>
+              <a:t>Décolletage </a:t>
+            </a:r>
+            <a:r>
+              <a:rPr lang="en-US" i="1" dirty="0" err="1"/>
+              <a:t>Plastique</a:t>
+            </a:r>
+            <a:r>
+              <a:rPr lang="en-US" dirty="0"/>
+              <a:t> design team at </a:t>
+            </a:r>
+            <a:r>
+              <a:rPr lang="en-US" i="1" dirty="0" err="1"/>
+              <a:t>Société</a:t>
+            </a:r>
+            <a:r>
+              <a:rPr lang="en-US" i="1" dirty="0"/>
+              <a:t> PPA</a:t>
+            </a:r>
+            <a:r>
+              <a:rPr lang="en-US" dirty="0"/>
+              <a:t> (later </a:t>
+            </a:r>
+            <a:r>
+              <a:rPr lang="en-US" i="1" dirty="0" err="1">
+                <a:hlinkClick r:id="rId4" tooltip="Société Bic"/>
+              </a:rPr>
+              <a:t>Société</a:t>
+            </a:r>
+            <a:r>
+              <a:rPr lang="en-US" i="1" dirty="0">
+                <a:hlinkClick r:id="rId4" tooltip="Société Bic"/>
+              </a:rPr>
+              <a:t> Bic</a:t>
+            </a:r>
+            <a:r>
+              <a:rPr lang="en-US" dirty="0"/>
+              <a:t>).”</a:t>
+            </a:r>
+            <a:endParaRPr lang="en-US" dirty="0" smtClean="0"/>
           </a:p>
           <a:p>
             <a:r>
@@ -11406,33 +11617,15 @@
                                   </p:childTnLst>
                                 </p:cTn>
                               </p:par>
-                            </p:childTnLst>
-                          </p:cTn>
-                        </p:par>
-                      </p:childTnLst>
-                    </p:cTn>
-                  </p:par>
-                  <p:par>
-                    <p:cTn id="8" fill="hold">
-                      <p:stCondLst>
-                        <p:cond delay="indefinite"/>
-                      </p:stCondLst>
-                      <p:childTnLst>
-                        <p:par>
-                          <p:cTn id="9" fill="hold">
-                            <p:stCondLst>
-                              <p:cond delay="0"/>
-                            </p:stCondLst>
-                            <p:childTnLst>
                               <p:par>
-                                <p:cTn id="10" presetID="10" presetClass="entr" presetSubtype="0" fill="hold" grpId="0" nodeType="clickEffect">
+                                <p:cTn id="8" presetID="10" presetClass="entr" presetSubtype="0" fill="hold" grpId="0" nodeType="withEffect">
                                   <p:stCondLst>
                                     <p:cond delay="0"/>
                                   </p:stCondLst>
                                   <p:childTnLst>
                                     <p:set>
                                       <p:cBhvr>
-                                        <p:cTn id="11" dur="1" fill="hold">
+                                        <p:cTn id="9" dur="1" fill="hold">
                                           <p:stCondLst>
                                             <p:cond delay="0"/>
                                           </p:stCondLst>
@@ -11454,7 +11647,7 @@
                                     </p:set>
                                     <p:animEffect transition="in" filter="fade">
                                       <p:cBhvr>
-                                        <p:cTn id="12" dur="500"/>
+                                        <p:cTn id="10" dur="500"/>
                                         <p:tgtEl>
                                           <p:spTgt spid="3">
                                             <p:txEl>
@@ -11468,14 +11661,14 @@
                                 </p:cTn>
                               </p:par>
                               <p:par>
-                                <p:cTn id="13" presetID="10" presetClass="entr" presetSubtype="0" fill="hold" grpId="0" nodeType="withEffect">
+                                <p:cTn id="11" presetID="10" presetClass="entr" presetSubtype="0" fill="hold" grpId="0" nodeType="withEffect">
                                   <p:stCondLst>
                                     <p:cond delay="0"/>
                                   </p:stCondLst>
                                   <p:childTnLst>
                                     <p:set>
                                       <p:cBhvr>
-                                        <p:cTn id="14" dur="1" fill="hold">
+                                        <p:cTn id="12" dur="1" fill="hold">
                                           <p:stCondLst>
                                             <p:cond delay="0"/>
                                           </p:stCondLst>
@@ -11497,7 +11690,7 @@
                                     </p:set>
                                     <p:animEffect transition="in" filter="fade">
                                       <p:cBhvr>
-                                        <p:cTn id="15" dur="500"/>
+                                        <p:cTn id="13" dur="500"/>
                                         <p:tgtEl>
                                           <p:spTgt spid="3">
                                             <p:txEl>
@@ -11517,26 +11710,26 @@
                     </p:cTn>
                   </p:par>
                   <p:par>
-                    <p:cTn id="16" fill="hold">
+                    <p:cTn id="14" fill="hold">
                       <p:stCondLst>
                         <p:cond delay="indefinite"/>
                       </p:stCondLst>
                       <p:childTnLst>
                         <p:par>
-                          <p:cTn id="17" fill="hold">
+                          <p:cTn id="15" fill="hold">
                             <p:stCondLst>
                               <p:cond delay="0"/>
                             </p:stCondLst>
                             <p:childTnLst>
                               <p:par>
-                                <p:cTn id="18" presetID="10" presetClass="entr" presetSubtype="0" fill="hold" grpId="0" nodeType="clickEffect">
+                                <p:cTn id="16" presetID="10" presetClass="entr" presetSubtype="0" fill="hold" grpId="0" nodeType="clickEffect">
                                   <p:stCondLst>
                                     <p:cond delay="0"/>
                                   </p:stCondLst>
                                   <p:childTnLst>
                                     <p:set>
                                       <p:cBhvr>
-                                        <p:cTn id="19" dur="1" fill="hold">
+                                        <p:cTn id="17" dur="1" fill="hold">
                                           <p:stCondLst>
                                             <p:cond delay="0"/>
                                           </p:stCondLst>
@@ -11558,7 +11751,7 @@
                                     </p:set>
                                     <p:animEffect transition="in" filter="fade">
                                       <p:cBhvr>
-                                        <p:cTn id="20" dur="500"/>
+                                        <p:cTn id="18" dur="500"/>
                                         <p:tgtEl>
                                           <p:spTgt spid="3">
                                             <p:txEl>
@@ -11572,14 +11765,14 @@
                                 </p:cTn>
                               </p:par>
                               <p:par>
-                                <p:cTn id="21" presetID="10" presetClass="entr" presetSubtype="0" fill="hold" grpId="0" nodeType="withEffect">
+                                <p:cTn id="19" presetID="10" presetClass="entr" presetSubtype="0" fill="hold" grpId="0" nodeType="withEffect">
                                   <p:stCondLst>
                                     <p:cond delay="0"/>
                                   </p:stCondLst>
                                   <p:childTnLst>
                                     <p:set>
                                       <p:cBhvr>
-                                        <p:cTn id="22" dur="1" fill="hold">
+                                        <p:cTn id="20" dur="1" fill="hold">
                                           <p:stCondLst>
                                             <p:cond delay="0"/>
                                           </p:stCondLst>
@@ -11601,11 +11794,158 @@
                                     </p:set>
                                     <p:animEffect transition="in" filter="fade">
                                       <p:cBhvr>
-                                        <p:cTn id="23" dur="500"/>
+                                        <p:cTn id="21" dur="500"/>
                                         <p:tgtEl>
                                           <p:spTgt spid="3">
                                             <p:txEl>
                                               <p:pRg st="4" end="4"/>
+                                            </p:txEl>
+                                          </p:spTgt>
+                                        </p:tgtEl>
+                                      </p:cBhvr>
+                                    </p:animEffect>
+                                  </p:childTnLst>
+                                </p:cTn>
+                              </p:par>
+                              <p:par>
+                                <p:cTn id="22" presetID="10" presetClass="entr" presetSubtype="0" fill="hold" grpId="0" nodeType="withEffect">
+                                  <p:stCondLst>
+                                    <p:cond delay="0"/>
+                                  </p:stCondLst>
+                                  <p:childTnLst>
+                                    <p:set>
+                                      <p:cBhvr>
+                                        <p:cTn id="23" dur="1" fill="hold">
+                                          <p:stCondLst>
+                                            <p:cond delay="0"/>
+                                          </p:stCondLst>
+                                        </p:cTn>
+                                        <p:tgtEl>
+                                          <p:spTgt spid="3">
+                                            <p:txEl>
+                                              <p:pRg st="5" end="5"/>
+                                            </p:txEl>
+                                          </p:spTgt>
+                                        </p:tgtEl>
+                                        <p:attrNameLst>
+                                          <p:attrName>style.visibility</p:attrName>
+                                        </p:attrNameLst>
+                                      </p:cBhvr>
+                                      <p:to>
+                                        <p:strVal val="visible"/>
+                                      </p:to>
+                                    </p:set>
+                                    <p:animEffect transition="in" filter="fade">
+                                      <p:cBhvr>
+                                        <p:cTn id="24" dur="500"/>
+                                        <p:tgtEl>
+                                          <p:spTgt spid="3">
+                                            <p:txEl>
+                                              <p:pRg st="5" end="5"/>
+                                            </p:txEl>
+                                          </p:spTgt>
+                                        </p:tgtEl>
+                                      </p:cBhvr>
+                                    </p:animEffect>
+                                  </p:childTnLst>
+                                </p:cTn>
+                              </p:par>
+                            </p:childTnLst>
+                          </p:cTn>
+                        </p:par>
+                      </p:childTnLst>
+                    </p:cTn>
+                  </p:par>
+                  <p:par>
+                    <p:cTn id="25" fill="hold">
+                      <p:stCondLst>
+                        <p:cond delay="indefinite"/>
+                      </p:stCondLst>
+                      <p:childTnLst>
+                        <p:par>
+                          <p:cTn id="26" fill="hold">
+                            <p:stCondLst>
+                              <p:cond delay="0"/>
+                            </p:stCondLst>
+                            <p:childTnLst>
+                              <p:par>
+                                <p:cTn id="27" presetID="10" presetClass="entr" presetSubtype="0" fill="hold" grpId="0" nodeType="clickEffect">
+                                  <p:stCondLst>
+                                    <p:cond delay="0"/>
+                                  </p:stCondLst>
+                                  <p:childTnLst>
+                                    <p:set>
+                                      <p:cBhvr>
+                                        <p:cTn id="28" dur="1" fill="hold">
+                                          <p:stCondLst>
+                                            <p:cond delay="0"/>
+                                          </p:stCondLst>
+                                        </p:cTn>
+                                        <p:tgtEl>
+                                          <p:spTgt spid="3">
+                                            <p:txEl>
+                                              <p:pRg st="6" end="6"/>
+                                            </p:txEl>
+                                          </p:spTgt>
+                                        </p:tgtEl>
+                                        <p:attrNameLst>
+                                          <p:attrName>style.visibility</p:attrName>
+                                        </p:attrNameLst>
+                                      </p:cBhvr>
+                                      <p:to>
+                                        <p:strVal val="visible"/>
+                                      </p:to>
+                                    </p:set>
+                                    <p:animEffect transition="in" filter="fade">
+                                      <p:cBhvr>
+                                        <p:cTn id="29" dur="500"/>
+                                        <p:tgtEl>
+                                          <p:spTgt spid="3">
+                                            <p:txEl>
+                                              <p:pRg st="6" end="6"/>
+                                            </p:txEl>
+                                          </p:spTgt>
+                                        </p:tgtEl>
+                                      </p:cBhvr>
+                                    </p:animEffect>
+                                  </p:childTnLst>
+                                </p:cTn>
+                              </p:par>
+                              <p:par>
+                                <p:cTn id="30" presetID="10" presetClass="entr" presetSubtype="0" fill="hold" grpId="0" nodeType="withEffect">
+                                  <p:stCondLst>
+                                    <p:cond delay="0"/>
+                                  </p:stCondLst>
+                                  <p:childTnLst>
+                                    <p:set>
+                                      <p:cBhvr>
+                                        <p:cTn id="31" dur="1" fill="hold">
+                                          <p:stCondLst>
+                                            <p:cond delay="0"/>
+                                          </p:stCondLst>
+                                        </p:cTn>
+                                        <p:tgtEl>
+                                          <p:spTgt spid="3">
+                                            <p:txEl>
+                                              <p:pRg st="7" end="7"/>
+                                            </p:txEl>
+                                          </p:spTgt>
+                                        </p:tgtEl>
+                                        <p:attrNameLst>
+                                          <p:attrName>style.visibility</p:attrName>
+                                        </p:attrNameLst>
+                                      </p:cBhvr>
+                                      <p:to>
+                                        <p:strVal val="visible"/>
+                                      </p:to>
+                                    </p:set>
+                                    <p:animEffect transition="in" filter="fade">
+                                      <p:cBhvr>
+                                        <p:cTn id="32" dur="500"/>
+                                        <p:tgtEl>
+                                          <p:spTgt spid="3">
+                                            <p:txEl>
+                                              <p:pRg st="7" end="7"/>
                                             </p:txEl>
                                           </p:spTgt>
                                         </p:tgtEl>
@@ -11648,7 +11988,7 @@
 </p:sld>
 </file>
 
-<file path=ppt/slides/slide24.xml><?xml version="1.0" encoding="utf-8"?>
+<file path=ppt/slides/slide25.xml><?xml version="1.0" encoding="utf-8"?>
 <p:sld xmlns:a="http://schemas.openxmlformats.org/drawingml/2006/main" xmlns:r="http://schemas.openxmlformats.org/officeDocument/2006/relationships" xmlns:p="http://schemas.openxmlformats.org/presentationml/2006/main">
   <p:cSld>
     <p:spTree>
@@ -11750,7 +12090,7 @@
 </p:sld>
 </file>
 
-<file path=ppt/slides/slide25.xml><?xml version="1.0" encoding="utf-8"?>
+<file path=ppt/slides/slide26.xml><?xml version="1.0" encoding="utf-8"?>
 <p:sld xmlns:a="http://schemas.openxmlformats.org/drawingml/2006/main" xmlns:r="http://schemas.openxmlformats.org/officeDocument/2006/relationships" xmlns:p="http://schemas.openxmlformats.org/presentationml/2006/main">
   <p:cSld>
     <p:spTree>
@@ -12353,7 +12693,7 @@
 </p:sld>
 </file>
 
-<file path=ppt/slides/slide26.xml><?xml version="1.0" encoding="utf-8"?>
+<file path=ppt/slides/slide27.xml><?xml version="1.0" encoding="utf-8"?>
 <p:sld xmlns:a="http://schemas.openxmlformats.org/drawingml/2006/main" xmlns:r="http://schemas.openxmlformats.org/officeDocument/2006/relationships" xmlns:p="http://schemas.openxmlformats.org/presentationml/2006/main">
   <p:cSld>
     <p:spTree>
@@ -12425,7 +12765,7 @@
 </p:sld>
 </file>
 
-<file path=ppt/slides/slide27.xml><?xml version="1.0" encoding="utf-8"?>
+<file path=ppt/slides/slide28.xml><?xml version="1.0" encoding="utf-8"?>
 <p:sld xmlns:a="http://schemas.openxmlformats.org/drawingml/2006/main" xmlns:r="http://schemas.openxmlformats.org/officeDocument/2006/relationships" xmlns:p="http://schemas.openxmlformats.org/presentationml/2006/main">
   <p:cSld>
     <p:spTree>
@@ -12768,7 +13108,7 @@
 </p:sld>
 </file>
 
-<file path=ppt/slides/slide28.xml><?xml version="1.0" encoding="utf-8"?>
+<file path=ppt/slides/slide29.xml><?xml version="1.0" encoding="utf-8"?>
 <p:sld xmlns:a="http://schemas.openxmlformats.org/drawingml/2006/main" xmlns:r="http://schemas.openxmlformats.org/officeDocument/2006/relationships" xmlns:p="http://schemas.openxmlformats.org/presentationml/2006/main">
   <p:cSld>
     <p:spTree>
@@ -12876,119 +13216,6 @@
     <p:extLst>
       <p:ext uri="{BB962C8B-B14F-4D97-AF65-F5344CB8AC3E}">
         <p14:creationId xmlns:p14="http://schemas.microsoft.com/office/powerpoint/2010/main" val="3749947609"/>
-      </p:ext>
-    </p:extLst>
-  </p:cSld>
-  <p:clrMapOvr>
-    <a:masterClrMapping/>
-  </p:clrMapOvr>
-  <mc:AlternateContent xmlns:mc="http://schemas.openxmlformats.org/markup-compatibility/2006" xmlns:p14="http://schemas.microsoft.com/office/powerpoint/2010/main">
-    <mc:Choice Requires="p14">
-      <p:transition spd="med" p14:dur="700">
-        <p:fade/>
-      </p:transition>
-    </mc:Choice>
-    <mc:Fallback xmlns="">
-      <p:transition spd="med">
-        <p:fade/>
-      </p:transition>
-    </mc:Fallback>
-  </mc:AlternateContent>
-  <p:timing>
-    <p:tnLst>
-      <p:par>
-        <p:cTn id="1" dur="indefinite" restart="never" nodeType="tmRoot"/>
-      </p:par>
-    </p:tnLst>
-  </p:timing>
-</p:sld>
-</file>
-
-<file path=ppt/slides/slide29.xml><?xml version="1.0" encoding="utf-8"?>
-<p:sld xmlns:a="http://schemas.openxmlformats.org/drawingml/2006/main" xmlns:r="http://schemas.openxmlformats.org/officeDocument/2006/relationships" xmlns:p="http://schemas.openxmlformats.org/presentationml/2006/main">
-  <p:cSld>
-    <p:spTree>
-      <p:nvGrpSpPr>
-        <p:cNvPr id="1" name=""/>
-        <p:cNvGrpSpPr/>
-        <p:nvPr/>
-      </p:nvGrpSpPr>
-      <p:grpSpPr>
-        <a:xfrm>
-          <a:off x="0" y="0"/>
-          <a:ext cx="0" cy="0"/>
-          <a:chOff x="0" y="0"/>
-          <a:chExt cx="0" cy="0"/>
-        </a:xfrm>
-      </p:grpSpPr>
-      <p:pic>
-        <p:nvPicPr>
-          <p:cNvPr id="1026" name="Picture 2"/>
-          <p:cNvPicPr>
-            <a:picLocks noChangeAspect="1" noChangeArrowheads="1"/>
-          </p:cNvPicPr>
-          <p:nvPr/>
-        </p:nvPicPr>
-        <p:blipFill>
-          <a:blip r:embed="rId2">
-            <a:extLst>
-              <a:ext uri="{28A0092B-C50C-407E-A947-70E740481C1C}">
-                <a14:useLocalDpi xmlns:a14="http://schemas.microsoft.com/office/drawing/2010/main" val="0"/>
-              </a:ext>
-            </a:extLst>
-          </a:blip>
-          <a:srcRect/>
-          <a:stretch>
-            <a:fillRect/>
-          </a:stretch>
-        </p:blipFill>
-        <p:spPr bwMode="auto">
-          <a:xfrm>
-            <a:off x="1652589" y="442914"/>
-            <a:ext cx="8886825" cy="5972175"/>
-          </a:xfrm>
-          <a:prstGeom prst="rect">
-            <a:avLst/>
-          </a:prstGeom>
-          <a:noFill/>
-          <a:ln>
-            <a:noFill/>
-          </a:ln>
-          <a:effectLst/>
-          <a:extLst>
-            <a:ext uri="{909E8E84-426E-40DD-AFC4-6F175D3DCCD1}">
-              <a14:hiddenFill xmlns:a14="http://schemas.microsoft.com/office/drawing/2010/main">
-                <a:solidFill>
-                  <a:schemeClr val="accent1"/>
-                </a:solidFill>
-              </a14:hiddenFill>
-            </a:ext>
-            <a:ext uri="{91240B29-F687-4F45-9708-019B960494DF}">
-              <a14:hiddenLine xmlns:a14="http://schemas.microsoft.com/office/drawing/2010/main" w="9525">
-                <a:solidFill>
-                  <a:schemeClr val="tx1"/>
-                </a:solidFill>
-                <a:miter lim="800000"/>
-                <a:headEnd/>
-                <a:tailEnd/>
-              </a14:hiddenLine>
-            </a:ext>
-            <a:ext uri="{AF507438-7753-43E0-B8FC-AC1667EBCBE1}">
-              <a14:hiddenEffects xmlns:a14="http://schemas.microsoft.com/office/drawing/2010/main">
-                <a:effectLst>
-                  <a:outerShdw dist="35921" dir="2700000" algn="ctr" rotWithShape="0">
-                    <a:schemeClr val="bg2"/>
-                  </a:outerShdw>
-                </a:effectLst>
-              </a14:hiddenEffects>
-            </a:ext>
-          </a:extLst>
-        </p:spPr>
-      </p:pic>
-    </p:spTree>
-    <p:extLst>
-      <p:ext uri="{BB962C8B-B14F-4D97-AF65-F5344CB8AC3E}">
-        <p14:creationId xmlns:p14="http://schemas.microsoft.com/office/powerpoint/2010/main" val="1606358278"/>
       </p:ext>
     </p:extLst>
   </p:cSld>
@@ -14031,129 +14258,74 @@
           <a:chExt cx="0" cy="0"/>
         </a:xfrm>
       </p:grpSpPr>
-      <p:sp>
-        <p:nvSpPr>
-          <p:cNvPr id="2" name="Title 1"/>
-          <p:cNvSpPr>
-            <a:spLocks noGrp="1"/>
-          </p:cNvSpPr>
-          <p:nvPr>
-            <p:ph type="title"/>
-          </p:nvPr>
-        </p:nvSpPr>
-        <p:spPr/>
-        <p:txBody>
-          <a:bodyPr/>
-          <a:lstStyle/>
-          <a:p>
-            <a:r>
-              <a:rPr lang="en-US" dirty="0" smtClean="0"/>
-              <a:t>Point: CAP theorem pushes us towards</a:t>
-            </a:r>
-            <a:endParaRPr lang="en-US" dirty="0"/>
-          </a:p>
-        </p:txBody>
-      </p:sp>
-      <p:sp>
-        <p:nvSpPr>
-          <p:cNvPr id="3" name="Content Placeholder 2"/>
-          <p:cNvSpPr>
-            <a:spLocks noGrp="1"/>
-          </p:cNvSpPr>
-          <p:nvPr>
-            <p:ph idx="1"/>
-          </p:nvPr>
-        </p:nvSpPr>
-        <p:spPr/>
-        <p:txBody>
-          <a:bodyPr/>
-          <a:lstStyle/>
-          <a:p>
-            <a:r>
-              <a:rPr lang="en-US" dirty="0" smtClean="0"/>
-              <a:t>We must choose between the three; entropy (and wide experience in distributed systems!) teaches us that C(</a:t>
-            </a:r>
-            <a:r>
-              <a:rPr lang="en-US" dirty="0" err="1" smtClean="0"/>
-              <a:t>onsistency</a:t>
-            </a:r>
-            <a:r>
-              <a:rPr lang="en-US" dirty="0" smtClean="0"/>
-              <a:t>) is not one of the top two</a:t>
-            </a:r>
-          </a:p>
-          <a:p>
-            <a:pPr lvl="1"/>
-            <a:r>
-              <a:rPr lang="en-US" dirty="0" smtClean="0"/>
-              <a:t>With one exception: When it is the point of the application. Only then.</a:t>
-            </a:r>
-            <a:endParaRPr lang="en-US" dirty="0"/>
-          </a:p>
-        </p:txBody>
-      </p:sp>
       <p:pic>
         <p:nvPicPr>
-          <p:cNvPr id="4" name="Picture 3"/>
+          <p:cNvPr id="1026" name="Picture 2"/>
           <p:cNvPicPr>
-            <a:picLocks noChangeAspect="1"/>
+            <a:picLocks noChangeAspect="1" noChangeArrowheads="1"/>
           </p:cNvPicPr>
           <p:nvPr/>
         </p:nvPicPr>
         <p:blipFill>
-          <a:blip r:embed="rId2"/>
+          <a:blip r:embed="rId2">
+            <a:extLst>
+              <a:ext uri="{28A0092B-C50C-407E-A947-70E740481C1C}">
+                <a14:useLocalDpi xmlns:a14="http://schemas.microsoft.com/office/drawing/2010/main" val="0"/>
+              </a:ext>
+            </a:extLst>
+          </a:blip>
+          <a:srcRect/>
           <a:stretch>
             <a:fillRect/>
           </a:stretch>
         </p:blipFill>
-        <p:spPr>
+        <p:spPr bwMode="auto">
           <a:xfrm>
-            <a:off x="2843026" y="4150666"/>
-            <a:ext cx="5728921" cy="820886"/>
-          </a:xfrm>
-          <a:prstGeom prst="rect">
-            <a:avLst/>
-          </a:prstGeom>
-        </p:spPr>
-      </p:pic>
-      <p:sp>
-        <p:nvSpPr>
-          <p:cNvPr id="5" name="TextBox 4"/>
-          <p:cNvSpPr txBox="1"/>
-          <p:nvPr/>
-        </p:nvSpPr>
-        <p:spPr>
-          <a:xfrm>
-            <a:off x="2712509" y="5585483"/>
-            <a:ext cx="6351157" cy="343620"/>
+            <a:off x="1652589" y="442914"/>
+            <a:ext cx="8886825" cy="5972175"/>
           </a:xfrm>
           <a:prstGeom prst="rect">
             <a:avLst/>
           </a:prstGeom>
           <a:noFill/>
+          <a:ln>
+            <a:noFill/>
+          </a:ln>
+          <a:effectLst/>
+          <a:extLst>
+            <a:ext uri="{909E8E84-426E-40DD-AFC4-6F175D3DCCD1}">
+              <a14:hiddenFill xmlns:a14="http://schemas.microsoft.com/office/drawing/2010/main">
+                <a:solidFill>
+                  <a:schemeClr val="accent1"/>
+                </a:solidFill>
+              </a14:hiddenFill>
+            </a:ext>
+            <a:ext uri="{91240B29-F687-4F45-9708-019B960494DF}">
+              <a14:hiddenLine xmlns:a14="http://schemas.microsoft.com/office/drawing/2010/main" w="9525">
+                <a:solidFill>
+                  <a:schemeClr val="tx1"/>
+                </a:solidFill>
+                <a:miter lim="800000"/>
+                <a:headEnd/>
+                <a:tailEnd/>
+              </a14:hiddenLine>
+            </a:ext>
+            <a:ext uri="{AF507438-7753-43E0-B8FC-AC1667EBCBE1}">
+              <a14:hiddenEffects xmlns:a14="http://schemas.microsoft.com/office/drawing/2010/main">
+                <a:effectLst>
+                  <a:outerShdw dist="35921" dir="2700000" algn="ctr" rotWithShape="0">
+                    <a:schemeClr val="bg2"/>
+                  </a:outerShdw>
+                </a:effectLst>
+              </a14:hiddenEffects>
+            </a:ext>
+          </a:extLst>
         </p:spPr>
-        <p:txBody>
-          <a:bodyPr wrap="square" rtlCol="0">
-            <a:spAutoFit/>
-          </a:bodyPr>
-          <a:lstStyle/>
-          <a:p>
-            <a:r>
-              <a:rPr lang="en-US" sz="1633" dirty="0"/>
-              <a:t>-- Adrian </a:t>
-            </a:r>
-            <a:r>
-              <a:rPr lang="en-US" sz="1633" dirty="0" err="1"/>
-              <a:t>Cockroft</a:t>
-            </a:r>
-            <a:endParaRPr lang="en-US" sz="1633" dirty="0"/>
-          </a:p>
-        </p:txBody>
-      </p:sp>
+      </p:pic>
     </p:spTree>
     <p:extLst>
       <p:ext uri="{BB962C8B-B14F-4D97-AF65-F5344CB8AC3E}">
-        <p14:creationId xmlns:p14="http://schemas.microsoft.com/office/powerpoint/2010/main" val="3120339046"/>
+        <p14:creationId xmlns:p14="http://schemas.microsoft.com/office/powerpoint/2010/main" val="1606358278"/>
       </p:ext>
     </p:extLst>
   </p:cSld>
@@ -14216,7 +14388,11 @@
           <a:p>
             <a:r>
               <a:rPr lang="en-US" dirty="0" smtClean="0"/>
-              <a:t>Point: Smallest possible partitioned resource</a:t>
+              <a:t>Point: CAP theorem pushes us </a:t>
+            </a:r>
+            <a:r>
+              <a:rPr lang="en-US" dirty="0" smtClean="0"/>
+              <a:t>towards A and P</a:t>
             </a:r>
             <a:endParaRPr lang="en-US" dirty="0"/>
           </a:p>
@@ -14239,60 +14415,89 @@
           <a:p>
             <a:r>
               <a:rPr lang="en-US" dirty="0" smtClean="0"/>
-              <a:t>VMs should be smallest</a:t>
-            </a:r>
-          </a:p>
-          <a:p>
-            <a:r>
-              <a:rPr lang="en-US" dirty="0" smtClean="0"/>
-              <a:t>OS should be smallest </a:t>
-            </a:r>
-          </a:p>
-          <a:p>
-            <a:r>
-              <a:rPr lang="en-US" dirty="0" smtClean="0"/>
-              <a:t>Bunches of storages with partition and retry policies</a:t>
-            </a:r>
-          </a:p>
-          <a:p>
+              <a:t>We must choose between the three; entropy (and wide experience in distributed systems!) teaches us that C(</a:t>
+            </a:r>
+            <a:r>
+              <a:rPr lang="en-US" dirty="0" err="1" smtClean="0"/>
+              <a:t>onsistency</a:t>
+            </a:r>
+            <a:r>
+              <a:rPr lang="en-US" dirty="0" smtClean="0"/>
+              <a:t>) is not one of the top two</a:t>
+            </a:r>
+          </a:p>
+          <a:p>
+            <a:pPr lvl="1"/>
+            <a:r>
+              <a:rPr lang="en-US" dirty="0" smtClean="0"/>
+              <a:t>With one exception: When it is the point of the application. Only then.</a:t>
+            </a:r>
             <a:endParaRPr lang="en-US" dirty="0"/>
           </a:p>
-          <a:p>
-            <a:r>
-              <a:rPr lang="en-US" dirty="0" smtClean="0"/>
-              <a:t>Benefits:</a:t>
-            </a:r>
-          </a:p>
-          <a:p>
-            <a:pPr lvl="1"/>
-            <a:r>
-              <a:rPr lang="en-US" dirty="0" smtClean="0"/>
-              <a:t>Fine grained scale-out and scale-in</a:t>
-            </a:r>
-          </a:p>
-          <a:p>
-            <a:pPr lvl="1"/>
-            <a:r>
-              <a:rPr lang="en-US" dirty="0" smtClean="0"/>
-              <a:t>Each failure much smaller portion of entire load</a:t>
-            </a:r>
-          </a:p>
-          <a:p>
-            <a:pPr lvl="1"/>
-            <a:r>
-              <a:rPr lang="en-US" dirty="0" smtClean="0"/>
-              <a:t>Cost (Duh)</a:t>
-            </a:r>
-          </a:p>
-          <a:p>
-            <a:endParaRPr lang="en-US" dirty="0"/>
+        </p:txBody>
+      </p:sp>
+      <p:pic>
+        <p:nvPicPr>
+          <p:cNvPr id="4" name="Picture 3"/>
+          <p:cNvPicPr>
+            <a:picLocks noChangeAspect="1"/>
+          </p:cNvPicPr>
+          <p:nvPr/>
+        </p:nvPicPr>
+        <p:blipFill>
+          <a:blip r:embed="rId2"/>
+          <a:stretch>
+            <a:fillRect/>
+          </a:stretch>
+        </p:blipFill>
+        <p:spPr>
+          <a:xfrm>
+            <a:off x="2843026" y="4150666"/>
+            <a:ext cx="5728921" cy="820886"/>
+          </a:xfrm>
+          <a:prstGeom prst="rect">
+            <a:avLst/>
+          </a:prstGeom>
+        </p:spPr>
+      </p:pic>
+      <p:sp>
+        <p:nvSpPr>
+          <p:cNvPr id="5" name="TextBox 4"/>
+          <p:cNvSpPr txBox="1"/>
+          <p:nvPr/>
+        </p:nvSpPr>
+        <p:spPr>
+          <a:xfrm>
+            <a:off x="2712509" y="5585483"/>
+            <a:ext cx="6351157" cy="343620"/>
+          </a:xfrm>
+          <a:prstGeom prst="rect">
+            <a:avLst/>
+          </a:prstGeom>
+          <a:noFill/>
+        </p:spPr>
+        <p:txBody>
+          <a:bodyPr wrap="square" rtlCol="0">
+            <a:spAutoFit/>
+          </a:bodyPr>
+          <a:lstStyle/>
+          <a:p>
+            <a:r>
+              <a:rPr lang="en-US" sz="1633" dirty="0"/>
+              <a:t>-- Adrian </a:t>
+            </a:r>
+            <a:r>
+              <a:rPr lang="en-US" sz="1633" dirty="0" err="1"/>
+              <a:t>Cockroft</a:t>
+            </a:r>
+            <a:endParaRPr lang="en-US" sz="1633" dirty="0"/>
           </a:p>
         </p:txBody>
       </p:sp>
     </p:spTree>
     <p:extLst>
       <p:ext uri="{BB962C8B-B14F-4D97-AF65-F5344CB8AC3E}">
-        <p14:creationId xmlns:p14="http://schemas.microsoft.com/office/powerpoint/2010/main" val="1892561583"/>
+        <p14:creationId xmlns:p14="http://schemas.microsoft.com/office/powerpoint/2010/main" val="3120339046"/>
       </p:ext>
     </p:extLst>
   </p:cSld>
@@ -14355,7 +14560,7 @@
           <a:p>
             <a:r>
               <a:rPr lang="en-US" dirty="0" smtClean="0"/>
-              <a:t>Implications for humans</a:t>
+              <a:t>Point: Smallest possible partitioned resource</a:t>
             </a:r>
             <a:endParaRPr lang="en-US" dirty="0"/>
           </a:p>
@@ -14378,15 +14583,60 @@
           <a:p>
             <a:r>
               <a:rPr lang="en-US" dirty="0" smtClean="0"/>
-              <a:t>Ah, execution. Tough stuff.</a:t>
-            </a:r>
+              <a:t>VMs should be smallest</a:t>
+            </a:r>
+          </a:p>
+          <a:p>
+            <a:r>
+              <a:rPr lang="en-US" dirty="0" smtClean="0"/>
+              <a:t>OS should be smallest </a:t>
+            </a:r>
+          </a:p>
+          <a:p>
+            <a:r>
+              <a:rPr lang="en-US" dirty="0" smtClean="0"/>
+              <a:t>Bunches of storages with partition and retry policies</a:t>
+            </a:r>
+          </a:p>
+          <a:p>
+            <a:endParaRPr lang="en-US" dirty="0"/>
+          </a:p>
+          <a:p>
+            <a:r>
+              <a:rPr lang="en-US" dirty="0" smtClean="0"/>
+              <a:t>Benefits:</a:t>
+            </a:r>
+          </a:p>
+          <a:p>
+            <a:pPr lvl="1"/>
+            <a:r>
+              <a:rPr lang="en-US" dirty="0" smtClean="0"/>
+              <a:t>Fine grained scale-out and scale-in</a:t>
+            </a:r>
+          </a:p>
+          <a:p>
+            <a:pPr lvl="1"/>
+            <a:r>
+              <a:rPr lang="en-US" dirty="0" smtClean="0"/>
+              <a:t>Each failure much smaller portion of entire load</a:t>
+            </a:r>
+          </a:p>
+          <a:p>
+            <a:pPr lvl="1"/>
+            <a:r>
+              <a:rPr lang="en-US" dirty="0" smtClean="0"/>
+              <a:t>Cost (Duh)</a:t>
+            </a:r>
+          </a:p>
+          <a:p>
+            <a:endParaRPr lang="en-US" dirty="0"/>
           </a:p>
         </p:txBody>
       </p:sp>
     </p:spTree>
     <p:extLst>
       <p:ext uri="{BB962C8B-B14F-4D97-AF65-F5344CB8AC3E}">
-        <p14:creationId xmlns:p14="http://schemas.microsoft.com/office/powerpoint/2010/main" val="3061661963"/>
+        <p14:creationId xmlns:p14="http://schemas.microsoft.com/office/powerpoint/2010/main" val="1892561583"/>
       </p:ext>
     </p:extLst>
   </p:cSld>
@@ -14471,8 +14721,8 @@
           <a:lstStyle/>
           <a:p>
             <a:r>
-              <a:rPr lang="en-US" dirty="0"/>
-              <a:t>Developers think they gain impact; they’re right. They also gain complete responsibility for failure.</a:t>
+              <a:rPr lang="en-US" dirty="0" smtClean="0"/>
+              <a:t>Ah, execution. Tough stuff.</a:t>
             </a:r>
           </a:p>
         </p:txBody>
@@ -14480,7 +14730,7 @@
     </p:spTree>
     <p:extLst>
       <p:ext uri="{BB962C8B-B14F-4D97-AF65-F5344CB8AC3E}">
-        <p14:creationId xmlns:p14="http://schemas.microsoft.com/office/powerpoint/2010/main" val="4179829595"/>
+        <p14:creationId xmlns:p14="http://schemas.microsoft.com/office/powerpoint/2010/main" val="3061661963"/>
       </p:ext>
     </p:extLst>
   </p:cSld>
@@ -14565,23 +14815,16 @@
           <a:lstStyle/>
           <a:p>
             <a:r>
-              <a:rPr lang="en-US" dirty="0" smtClean="0"/>
-              <a:t>Operations focused on hardware drops massively over the next five years.</a:t>
-            </a:r>
-          </a:p>
-          <a:p>
-            <a:r>
-              <a:rPr lang="en-US" dirty="0" smtClean="0"/>
-              <a:t>Operations focused on developing and managing software compute abstractions increases dramatically.</a:t>
-            </a:r>
-            <a:endParaRPr lang="en-US" dirty="0"/>
+              <a:rPr lang="en-US" dirty="0"/>
+              <a:t>Developers think they gain impact; they’re right. They also gain complete responsibility for failure.</a:t>
+            </a:r>
           </a:p>
         </p:txBody>
       </p:sp>
     </p:spTree>
     <p:extLst>
       <p:ext uri="{BB962C8B-B14F-4D97-AF65-F5344CB8AC3E}">
-        <p14:creationId xmlns:p14="http://schemas.microsoft.com/office/powerpoint/2010/main" val="1961395226"/>
+        <p14:creationId xmlns:p14="http://schemas.microsoft.com/office/powerpoint/2010/main" val="4179829595"/>
       </p:ext>
     </p:extLst>
   </p:cSld>
@@ -14667,6 +14910,107 @@
           <a:p>
             <a:r>
               <a:rPr lang="en-US" dirty="0" smtClean="0"/>
+              <a:t>Operations focused on hardware drops massively over the next five years.</a:t>
+            </a:r>
+          </a:p>
+          <a:p>
+            <a:r>
+              <a:rPr lang="en-US" dirty="0" smtClean="0"/>
+              <a:t>Operations focused on developing and managing software compute abstractions increases dramatically.</a:t>
+            </a:r>
+            <a:endParaRPr lang="en-US" dirty="0"/>
+          </a:p>
+        </p:txBody>
+      </p:sp>
+    </p:spTree>
+    <p:extLst>
+      <p:ext uri="{BB962C8B-B14F-4D97-AF65-F5344CB8AC3E}">
+        <p14:creationId xmlns:p14="http://schemas.microsoft.com/office/powerpoint/2010/main" val="1961395226"/>
+      </p:ext>
+    </p:extLst>
+  </p:cSld>
+  <p:clrMapOvr>
+    <a:masterClrMapping/>
+  </p:clrMapOvr>
+  <mc:AlternateContent xmlns:mc="http://schemas.openxmlformats.org/markup-compatibility/2006" xmlns:p14="http://schemas.microsoft.com/office/powerpoint/2010/main">
+    <mc:Choice Requires="p14">
+      <p:transition spd="med" p14:dur="700">
+        <p:fade/>
+      </p:transition>
+    </mc:Choice>
+    <mc:Fallback xmlns="">
+      <p:transition spd="med">
+        <p:fade/>
+      </p:transition>
+    </mc:Fallback>
+  </mc:AlternateContent>
+  <p:timing>
+    <p:tnLst>
+      <p:par>
+        <p:cTn id="1" dur="indefinite" restart="never" nodeType="tmRoot"/>
+      </p:par>
+    </p:tnLst>
+  </p:timing>
+</p:sld>
+</file>
+
+<file path=ppt/slides/slide36.xml><?xml version="1.0" encoding="utf-8"?>
+<p:sld xmlns:a="http://schemas.openxmlformats.org/drawingml/2006/main" xmlns:r="http://schemas.openxmlformats.org/officeDocument/2006/relationships" xmlns:p="http://schemas.openxmlformats.org/presentationml/2006/main">
+  <p:cSld>
+    <p:spTree>
+      <p:nvGrpSpPr>
+        <p:cNvPr id="1" name=""/>
+        <p:cNvGrpSpPr/>
+        <p:nvPr/>
+      </p:nvGrpSpPr>
+      <p:grpSpPr>
+        <a:xfrm>
+          <a:off x="0" y="0"/>
+          <a:ext cx="0" cy="0"/>
+          <a:chOff x="0" y="0"/>
+          <a:chExt cx="0" cy="0"/>
+        </a:xfrm>
+      </p:grpSpPr>
+      <p:sp>
+        <p:nvSpPr>
+          <p:cNvPr id="2" name="Title 1"/>
+          <p:cNvSpPr>
+            <a:spLocks noGrp="1"/>
+          </p:cNvSpPr>
+          <p:nvPr>
+            <p:ph type="title"/>
+          </p:nvPr>
+        </p:nvSpPr>
+        <p:spPr/>
+        <p:txBody>
+          <a:bodyPr/>
+          <a:lstStyle/>
+          <a:p>
+            <a:r>
+              <a:rPr lang="en-US" dirty="0" smtClean="0"/>
+              <a:t>Implications for humans</a:t>
+            </a:r>
+            <a:endParaRPr lang="en-US" dirty="0"/>
+          </a:p>
+        </p:txBody>
+      </p:sp>
+      <p:sp>
+        <p:nvSpPr>
+          <p:cNvPr id="3" name="Content Placeholder 2"/>
+          <p:cNvSpPr>
+            <a:spLocks noGrp="1"/>
+          </p:cNvSpPr>
+          <p:nvPr>
+            <p:ph idx="1"/>
+          </p:nvPr>
+        </p:nvSpPr>
+        <p:spPr/>
+        <p:txBody>
+          <a:bodyPr/>
+          <a:lstStyle/>
+          <a:p>
+            <a:r>
+              <a:rPr lang="en-US" dirty="0" smtClean="0"/>
               <a:t>Architects focus on everything more and more. </a:t>
             </a:r>
           </a:p>
@@ -14719,7 +15063,7 @@
 </p:sld>
 </file>
 
-<file path=ppt/slides/slide36.xml><?xml version="1.0" encoding="utf-8"?>
+<file path=ppt/slides/slide37.xml><?xml version="1.0" encoding="utf-8"?>
 <p:sld xmlns:a="http://schemas.openxmlformats.org/drawingml/2006/main" xmlns:r="http://schemas.openxmlformats.org/officeDocument/2006/relationships" xmlns:p="http://schemas.openxmlformats.org/presentationml/2006/main">
   <p:cSld>
     <p:spTree>
@@ -14933,7 +15277,7 @@
 </p:sld>
 </file>
 
-<file path=ppt/slides/slide37.xml><?xml version="1.0" encoding="utf-8"?>
+<file path=ppt/slides/slide38.xml><?xml version="1.0" encoding="utf-8"?>
 <p:sld xmlns:a="http://schemas.openxmlformats.org/drawingml/2006/main" xmlns:r="http://schemas.openxmlformats.org/officeDocument/2006/relationships" xmlns:p="http://schemas.openxmlformats.org/presentationml/2006/main">
   <p:cSld>
     <p:spTree>
@@ -15068,102 +15412,6 @@
     <p:extLst>
       <p:ext uri="{BB962C8B-B14F-4D97-AF65-F5344CB8AC3E}">
         <p14:creationId xmlns:p14="http://schemas.microsoft.com/office/powerpoint/2010/main" val="3033768354"/>
-      </p:ext>
-    </p:extLst>
-  </p:cSld>
-  <p:clrMapOvr>
-    <a:masterClrMapping/>
-  </p:clrMapOvr>
-  <mc:AlternateContent xmlns:mc="http://schemas.openxmlformats.org/markup-compatibility/2006" xmlns:p14="http://schemas.microsoft.com/office/powerpoint/2010/main">
-    <mc:Choice Requires="p14">
-      <p:transition spd="med" p14:dur="700">
-        <p:fade/>
-      </p:transition>
-    </mc:Choice>
-    <mc:Fallback xmlns="">
-      <p:transition spd="med">
-        <p:fade/>
-      </p:transition>
-    </mc:Fallback>
-  </mc:AlternateContent>
-  <p:timing>
-    <p:tnLst>
-      <p:par>
-        <p:cTn id="1" dur="indefinite" restart="never" nodeType="tmRoot"/>
-      </p:par>
-    </p:tnLst>
-  </p:timing>
-</p:sld>
-</file>
-
-<file path=ppt/slides/slide38.xml><?xml version="1.0" encoding="utf-8"?>
-<p:sld xmlns:a="http://schemas.openxmlformats.org/drawingml/2006/main" xmlns:r="http://schemas.openxmlformats.org/officeDocument/2006/relationships" xmlns:p="http://schemas.openxmlformats.org/presentationml/2006/main">
-  <p:cSld>
-    <p:spTree>
-      <p:nvGrpSpPr>
-        <p:cNvPr id="1" name=""/>
-        <p:cNvGrpSpPr/>
-        <p:nvPr/>
-      </p:nvGrpSpPr>
-      <p:grpSpPr>
-        <a:xfrm>
-          <a:off x="0" y="0"/>
-          <a:ext cx="0" cy="0"/>
-          <a:chOff x="0" y="0"/>
-          <a:chExt cx="0" cy="0"/>
-        </a:xfrm>
-      </p:grpSpPr>
-      <p:sp>
-        <p:nvSpPr>
-          <p:cNvPr id="2" name="Title 1"/>
-          <p:cNvSpPr>
-            <a:spLocks noGrp="1"/>
-          </p:cNvSpPr>
-          <p:nvPr>
-            <p:ph type="title"/>
-          </p:nvPr>
-        </p:nvSpPr>
-        <p:spPr/>
-        <p:txBody>
-          <a:bodyPr/>
-          <a:lstStyle/>
-          <a:p>
-            <a:r>
-              <a:rPr lang="en-US" dirty="0" smtClean="0"/>
-              <a:t>Implications for humans</a:t>
-            </a:r>
-            <a:endParaRPr lang="en-US" dirty="0"/>
-          </a:p>
-        </p:txBody>
-      </p:sp>
-      <p:pic>
-        <p:nvPicPr>
-          <p:cNvPr id="6" name="Picture 5"/>
-          <p:cNvPicPr>
-            <a:picLocks noChangeAspect="1"/>
-          </p:cNvPicPr>
-          <p:nvPr/>
-        </p:nvPicPr>
-        <p:blipFill>
-          <a:blip r:embed="rId2"/>
-          <a:stretch>
-            <a:fillRect/>
-          </a:stretch>
-        </p:blipFill>
-        <p:spPr>
-          <a:xfrm>
-            <a:off x="2579988" y="1438918"/>
-            <a:ext cx="5829300" cy="4886325"/>
-          </a:xfrm>
-          <a:prstGeom prst="rect">
-            <a:avLst/>
-          </a:prstGeom>
-        </p:spPr>
-      </p:pic>
-    </p:spTree>
-    <p:extLst>
-      <p:ext uri="{BB962C8B-B14F-4D97-AF65-F5344CB8AC3E}">
-        <p14:creationId xmlns:p14="http://schemas.microsoft.com/office/powerpoint/2010/main" val="147203067"/>
       </p:ext>
     </p:extLst>
   </p:cSld>
@@ -15234,7 +15482,7 @@
       </p:sp>
       <p:pic>
         <p:nvPicPr>
-          <p:cNvPr id="3" name="Picture 2"/>
+          <p:cNvPr id="6" name="Picture 5"/>
           <p:cNvPicPr>
             <a:picLocks noChangeAspect="1"/>
           </p:cNvPicPr>
@@ -15248,8 +15496,8 @@
         </p:blipFill>
         <p:spPr>
           <a:xfrm>
-            <a:off x="2247441" y="1644736"/>
-            <a:ext cx="6515100" cy="4095750"/>
+            <a:off x="2579988" y="1438918"/>
+            <a:ext cx="5829300" cy="4886325"/>
           </a:xfrm>
           <a:prstGeom prst="rect">
             <a:avLst/>
@@ -15259,7 +15507,7 @@
     </p:spTree>
     <p:extLst>
       <p:ext uri="{BB962C8B-B14F-4D97-AF65-F5344CB8AC3E}">
-        <p14:creationId xmlns:p14="http://schemas.microsoft.com/office/powerpoint/2010/main" val="1708882300"/>
+        <p14:creationId xmlns:p14="http://schemas.microsoft.com/office/powerpoint/2010/main" val="147203067"/>
       </p:ext>
     </p:extLst>
   </p:cSld>
@@ -16202,6 +16450,102 @@
           <a:p>
             <a:r>
               <a:rPr lang="en-US" dirty="0" smtClean="0"/>
+              <a:t>Implications for humans</a:t>
+            </a:r>
+            <a:endParaRPr lang="en-US" dirty="0"/>
+          </a:p>
+        </p:txBody>
+      </p:sp>
+      <p:pic>
+        <p:nvPicPr>
+          <p:cNvPr id="3" name="Picture 2"/>
+          <p:cNvPicPr>
+            <a:picLocks noChangeAspect="1"/>
+          </p:cNvPicPr>
+          <p:nvPr/>
+        </p:nvPicPr>
+        <p:blipFill>
+          <a:blip r:embed="rId2"/>
+          <a:stretch>
+            <a:fillRect/>
+          </a:stretch>
+        </p:blipFill>
+        <p:spPr>
+          <a:xfrm>
+            <a:off x="2247441" y="1644736"/>
+            <a:ext cx="6515100" cy="4095750"/>
+          </a:xfrm>
+          <a:prstGeom prst="rect">
+            <a:avLst/>
+          </a:prstGeom>
+        </p:spPr>
+      </p:pic>
+    </p:spTree>
+    <p:extLst>
+      <p:ext uri="{BB962C8B-B14F-4D97-AF65-F5344CB8AC3E}">
+        <p14:creationId xmlns:p14="http://schemas.microsoft.com/office/powerpoint/2010/main" val="1708882300"/>
+      </p:ext>
+    </p:extLst>
+  </p:cSld>
+  <p:clrMapOvr>
+    <a:masterClrMapping/>
+  </p:clrMapOvr>
+  <mc:AlternateContent xmlns:mc="http://schemas.openxmlformats.org/markup-compatibility/2006" xmlns:p14="http://schemas.microsoft.com/office/powerpoint/2010/main">
+    <mc:Choice Requires="p14">
+      <p:transition spd="med" p14:dur="700">
+        <p:fade/>
+      </p:transition>
+    </mc:Choice>
+    <mc:Fallback xmlns="">
+      <p:transition spd="med">
+        <p:fade/>
+      </p:transition>
+    </mc:Fallback>
+  </mc:AlternateContent>
+  <p:timing>
+    <p:tnLst>
+      <p:par>
+        <p:cTn id="1" dur="indefinite" restart="never" nodeType="tmRoot"/>
+      </p:par>
+    </p:tnLst>
+  </p:timing>
+</p:sld>
+</file>
+
+<file path=ppt/slides/slide41.xml><?xml version="1.0" encoding="utf-8"?>
+<p:sld xmlns:a="http://schemas.openxmlformats.org/drawingml/2006/main" xmlns:r="http://schemas.openxmlformats.org/officeDocument/2006/relationships" xmlns:p="http://schemas.openxmlformats.org/presentationml/2006/main">
+  <p:cSld>
+    <p:spTree>
+      <p:nvGrpSpPr>
+        <p:cNvPr id="1" name=""/>
+        <p:cNvGrpSpPr/>
+        <p:nvPr/>
+      </p:nvGrpSpPr>
+      <p:grpSpPr>
+        <a:xfrm>
+          <a:off x="0" y="0"/>
+          <a:ext cx="0" cy="0"/>
+          <a:chOff x="0" y="0"/>
+          <a:chExt cx="0" cy="0"/>
+        </a:xfrm>
+      </p:grpSpPr>
+      <p:sp>
+        <p:nvSpPr>
+          <p:cNvPr id="2" name="Title 1"/>
+          <p:cNvSpPr>
+            <a:spLocks noGrp="1"/>
+          </p:cNvSpPr>
+          <p:nvPr>
+            <p:ph type="title"/>
+          </p:nvPr>
+        </p:nvSpPr>
+        <p:spPr/>
+        <p:txBody>
+          <a:bodyPr/>
+          <a:lstStyle/>
+          <a:p>
+            <a:r>
+              <a:rPr lang="en-US" dirty="0" smtClean="0"/>
               <a:t>Thing to </a:t>
             </a:r>
             <a:r>
@@ -16271,7 +16615,7 @@
 </p:sld>
 </file>
 
-<file path=ppt/slides/slide41.xml><?xml version="1.0" encoding="utf-8"?>
+<file path=ppt/slides/slide42.xml><?xml version="1.0" encoding="utf-8"?>
 <p:sld xmlns:a="http://schemas.openxmlformats.org/drawingml/2006/main" xmlns:r="http://schemas.openxmlformats.org/officeDocument/2006/relationships" xmlns:p="http://schemas.openxmlformats.org/presentationml/2006/main">
   <p:cSld>
     <p:spTree>
@@ -16448,7 +16792,7 @@
 </p:sld>
 </file>
 
-<file path=ppt/slides/slide42.xml><?xml version="1.0" encoding="utf-8"?>
+<file path=ppt/slides/slide43.xml><?xml version="1.0" encoding="utf-8"?>
 <p:sld xmlns:a="http://schemas.openxmlformats.org/drawingml/2006/main" xmlns:r="http://schemas.openxmlformats.org/officeDocument/2006/relationships" xmlns:p="http://schemas.openxmlformats.org/presentationml/2006/main">
   <p:cSld>
     <p:spTree>

</xml_diff>